<commit_message>
changed some comments and added to a slide
</commit_message>
<xml_diff>
--- a/Presentation.pptx
+++ b/Presentation.pptx
@@ -114,6 +114,11 @@
       </a:defRPr>
     </a:lvl9pPr>
   </p:defaultTextStyle>
+  <p:extLst>
+    <p:ext uri="{EFAFB233-063F-42B5-8137-9DF3F51BA10A}">
+      <p15:sldGuideLst xmlns:p15="http://schemas.microsoft.com/office/powerpoint/2012/main"/>
+    </p:ext>
+  </p:extLst>
 </p:presentation>
 </file>
 
@@ -264,7 +269,7 @@
           <a:p>
             <a:fld id="{59ED46AA-65FE-4AA6-90A6-8BABD663A628}" type="datetimeFigureOut">
               <a:rPr lang="en-US" smtClean="0"/>
-              <a:t>1/17/2021</a:t>
+              <a:t>1/21/2021</a:t>
             </a:fld>
             <a:endParaRPr lang="en-US"/>
           </a:p>
@@ -462,7 +467,7 @@
           <a:p>
             <a:fld id="{59ED46AA-65FE-4AA6-90A6-8BABD663A628}" type="datetimeFigureOut">
               <a:rPr lang="en-US" smtClean="0"/>
-              <a:t>1/17/2021</a:t>
+              <a:t>1/21/2021</a:t>
             </a:fld>
             <a:endParaRPr lang="en-US"/>
           </a:p>
@@ -670,7 +675,7 @@
           <a:p>
             <a:fld id="{59ED46AA-65FE-4AA6-90A6-8BABD663A628}" type="datetimeFigureOut">
               <a:rPr lang="en-US" smtClean="0"/>
-              <a:t>1/17/2021</a:t>
+              <a:t>1/21/2021</a:t>
             </a:fld>
             <a:endParaRPr lang="en-US"/>
           </a:p>
@@ -868,7 +873,7 @@
           <a:p>
             <a:fld id="{59ED46AA-65FE-4AA6-90A6-8BABD663A628}" type="datetimeFigureOut">
               <a:rPr lang="en-US" smtClean="0"/>
-              <a:t>1/17/2021</a:t>
+              <a:t>1/21/2021</a:t>
             </a:fld>
             <a:endParaRPr lang="en-US"/>
           </a:p>
@@ -1143,7 +1148,7 @@
           <a:p>
             <a:fld id="{59ED46AA-65FE-4AA6-90A6-8BABD663A628}" type="datetimeFigureOut">
               <a:rPr lang="en-US" smtClean="0"/>
-              <a:t>1/17/2021</a:t>
+              <a:t>1/21/2021</a:t>
             </a:fld>
             <a:endParaRPr lang="en-US"/>
           </a:p>
@@ -1408,7 +1413,7 @@
           <a:p>
             <a:fld id="{59ED46AA-65FE-4AA6-90A6-8BABD663A628}" type="datetimeFigureOut">
               <a:rPr lang="en-US" smtClean="0"/>
-              <a:t>1/17/2021</a:t>
+              <a:t>1/21/2021</a:t>
             </a:fld>
             <a:endParaRPr lang="en-US"/>
           </a:p>
@@ -1820,7 +1825,7 @@
           <a:p>
             <a:fld id="{59ED46AA-65FE-4AA6-90A6-8BABD663A628}" type="datetimeFigureOut">
               <a:rPr lang="en-US" smtClean="0"/>
-              <a:t>1/17/2021</a:t>
+              <a:t>1/21/2021</a:t>
             </a:fld>
             <a:endParaRPr lang="en-US"/>
           </a:p>
@@ -1961,7 +1966,7 @@
           <a:p>
             <a:fld id="{59ED46AA-65FE-4AA6-90A6-8BABD663A628}" type="datetimeFigureOut">
               <a:rPr lang="en-US" smtClean="0"/>
-              <a:t>1/17/2021</a:t>
+              <a:t>1/21/2021</a:t>
             </a:fld>
             <a:endParaRPr lang="en-US"/>
           </a:p>
@@ -2074,7 +2079,7 @@
           <a:p>
             <a:fld id="{59ED46AA-65FE-4AA6-90A6-8BABD663A628}" type="datetimeFigureOut">
               <a:rPr lang="en-US" smtClean="0"/>
-              <a:t>1/17/2021</a:t>
+              <a:t>1/21/2021</a:t>
             </a:fld>
             <a:endParaRPr lang="en-US"/>
           </a:p>
@@ -2385,7 +2390,7 @@
           <a:p>
             <a:fld id="{59ED46AA-65FE-4AA6-90A6-8BABD663A628}" type="datetimeFigureOut">
               <a:rPr lang="en-US" smtClean="0"/>
-              <a:t>1/17/2021</a:t>
+              <a:t>1/21/2021</a:t>
             </a:fld>
             <a:endParaRPr lang="en-US"/>
           </a:p>
@@ -2673,7 +2678,7 @@
           <a:p>
             <a:fld id="{59ED46AA-65FE-4AA6-90A6-8BABD663A628}" type="datetimeFigureOut">
               <a:rPr lang="en-US" smtClean="0"/>
-              <a:t>1/17/2021</a:t>
+              <a:t>1/21/2021</a:t>
             </a:fld>
             <a:endParaRPr lang="en-US"/>
           </a:p>
@@ -2914,7 +2919,7 @@
           <a:p>
             <a:fld id="{59ED46AA-65FE-4AA6-90A6-8BABD663A628}" type="datetimeFigureOut">
               <a:rPr lang="en-US" smtClean="0"/>
-              <a:t>1/17/2021</a:t>
+              <a:t>1/21/2021</a:t>
             </a:fld>
             <a:endParaRPr lang="en-US"/>
           </a:p>
@@ -4365,7 +4370,10 @@
     <p:bg>
       <p:bgPr>
         <a:solidFill>
-          <a:schemeClr val="bg1"/>
+          <a:schemeClr val="bg1">
+            <a:tint val="95000"/>
+            <a:satMod val="170000"/>
+          </a:schemeClr>
         </a:solidFill>
         <a:effectLst/>
       </p:bgPr>
@@ -4384,12 +4392,12 @@
           <a:chExt cx="0" cy="0"/>
         </a:xfrm>
       </p:grpSpPr>
-      <p:sp>
-        <p:nvSpPr>
-          <p:cNvPr id="13" name="Rectangle 8">
-            <a:extLst>
-              <a:ext uri="{FF2B5EF4-FFF2-40B4-BE49-F238E27FC236}">
-                <a16:creationId xmlns:a16="http://schemas.microsoft.com/office/drawing/2014/main" id="{02D886F1-CB4A-4FC1-AAA7-9402B0D0DDDD}"/>
+      <p:sp useBgFill="1">
+        <p:nvSpPr>
+          <p:cNvPr id="19" name="Rectangle 18">
+            <a:extLst>
+              <a:ext uri="{FF2B5EF4-FFF2-40B4-BE49-F238E27FC236}">
+                <a16:creationId xmlns:a16="http://schemas.microsoft.com/office/drawing/2014/main" id="{9B76D444-2756-434F-AE61-96D69830C13E}"/>
               </a:ext>
               <a:ext uri="{C183D7F6-B498-43B3-948B-1728B52AA6E4}">
                 <adec:decorative xmlns:adec="http://schemas.microsoft.com/office/drawing/2017/decorative" val="1"/>
@@ -4410,14 +4418,11 @@
         <p:spPr>
           <a:xfrm>
             <a:off x="0" y="0"/>
-            <a:ext cx="2013557" cy="6858000"/>
+            <a:ext cx="12188952" cy="6858000"/>
           </a:xfrm>
           <a:prstGeom prst="rect">
             <a:avLst/>
           </a:prstGeom>
-          <a:solidFill>
-            <a:srgbClr val="7F7F7F"/>
-          </a:solidFill>
           <a:ln>
             <a:noFill/>
           </a:ln>
@@ -4442,55 +4447,99 @@
           <a:bodyPr rtlCol="0" anchor="ctr"/>
           <a:lstStyle/>
           <a:p>
-            <a:pPr marL="0" marR="0" lvl="0" indent="0" algn="ctr" defTabSz="914400" rtl="0" eaLnBrk="1" fontAlgn="auto" latinLnBrk="0" hangingPunct="1">
-              <a:lnSpc>
-                <a:spcPct val="100000"/>
-              </a:lnSpc>
-              <a:spcBef>
-                <a:spcPts val="0"/>
-              </a:spcBef>
-              <a:spcAft>
-                <a:spcPts val="0"/>
-              </a:spcAft>
-              <a:buClrTx/>
-              <a:buSzTx/>
-              <a:buFontTx/>
-              <a:buNone/>
-              <a:tabLst/>
-              <a:defRPr/>
-            </a:pPr>
-            <a:endParaRPr kumimoji="0" lang="en-US" sz="1800" b="0" i="0" u="none" strike="noStrike" kern="1200" cap="none" spc="0" normalizeH="0" baseline="0" noProof="0">
-              <a:ln>
-                <a:noFill/>
-              </a:ln>
-              <a:solidFill>
-                <a:prstClr val="white"/>
-              </a:solidFill>
-              <a:effectLst/>
-              <a:uLnTx/>
-              <a:uFillTx/>
-              <a:latin typeface="Calibri" panose="020F0502020204030204"/>
-              <a:ea typeface="+mn-ea"/>
-              <a:cs typeface="+mn-cs"/>
-            </a:endParaRPr>
-          </a:p>
-        </p:txBody>
-      </p:sp>
-      <p:sp>
-        <p:nvSpPr>
-          <p:cNvPr id="14" name="Rectangle 10">
-            <a:extLst>
-              <a:ext uri="{FF2B5EF4-FFF2-40B4-BE49-F238E27FC236}">
-                <a16:creationId xmlns:a16="http://schemas.microsoft.com/office/drawing/2014/main" id="{762B7B97-C3EE-4AEE-A61F-AFA873FE2FCA}"/>
+            <a:pPr algn="ctr"/>
+            <a:endParaRPr lang="en-US"/>
+          </a:p>
+        </p:txBody>
+      </p:sp>
+      <p:sp>
+        <p:nvSpPr>
+          <p:cNvPr id="2" name="Title 1">
+            <a:extLst>
+              <a:ext uri="{FF2B5EF4-FFF2-40B4-BE49-F238E27FC236}">
+                <a16:creationId xmlns:a16="http://schemas.microsoft.com/office/drawing/2014/main" id="{416F4A36-D118-4435-A2EB-B07D35D2D7EF}"/>
+              </a:ext>
+            </a:extLst>
+          </p:cNvPr>
+          <p:cNvSpPr>
+            <a:spLocks noGrp="1"/>
+          </p:cNvSpPr>
+          <p:nvPr>
+            <p:ph type="title"/>
+          </p:nvPr>
+        </p:nvSpPr>
+        <p:spPr>
+          <a:xfrm>
+            <a:off x="6688181" y="573678"/>
+            <a:ext cx="4887685" cy="1293060"/>
+          </a:xfrm>
+          <a:prstGeom prst="ellipse">
+            <a:avLst/>
+          </a:prstGeom>
+        </p:spPr>
+        <p:txBody>
+          <a:bodyPr vert="horz" lIns="91440" tIns="45720" rIns="91440" bIns="45720" rtlCol="0" anchor="b">
+            <a:normAutofit/>
+          </a:bodyPr>
+          <a:lstStyle/>
+          <a:p>
+            <a:r>
+              <a:rPr lang="en-US" sz="4000" dirty="0"/>
+              <a:t>Doug Timothy</a:t>
+            </a:r>
+          </a:p>
+        </p:txBody>
+      </p:sp>
+      <p:pic>
+        <p:nvPicPr>
+          <p:cNvPr id="8" name="Picture 7" descr="A person with a beard&#10;&#10;Description automatically generated with low confidence">
+            <a:extLst>
+              <a:ext uri="{FF2B5EF4-FFF2-40B4-BE49-F238E27FC236}">
+                <a16:creationId xmlns:a16="http://schemas.microsoft.com/office/drawing/2014/main" id="{23DD5109-2832-4D30-8E9B-D642A9FD346D}"/>
+              </a:ext>
+            </a:extLst>
+          </p:cNvPr>
+          <p:cNvPicPr>
+            <a:picLocks noChangeAspect="1"/>
+          </p:cNvPicPr>
+          <p:nvPr/>
+        </p:nvPicPr>
+        <p:blipFill rotWithShape="1">
+          <a:blip r:embed="rId2">
+            <a:extLst>
+              <a:ext uri="{28A0092B-C50C-407E-A947-70E740481C1C}">
+                <a14:useLocalDpi xmlns:a14="http://schemas.microsoft.com/office/drawing/2010/main" val="0"/>
+              </a:ext>
+            </a:extLst>
+          </a:blip>
+          <a:srcRect t="8777" b="28277"/>
+          <a:stretch/>
+        </p:blipFill>
+        <p:spPr>
+          <a:xfrm>
+            <a:off x="391903" y="573678"/>
+            <a:ext cx="5103206" cy="5710645"/>
+          </a:xfrm>
+          <a:prstGeom prst="rect">
+            <a:avLst/>
+          </a:prstGeom>
+        </p:spPr>
+      </p:pic>
+      <p:cxnSp>
+        <p:nvCxnSpPr>
+          <p:cNvPr id="21" name="Straight Connector 20">
+            <a:extLst>
+              <a:ext uri="{FF2B5EF4-FFF2-40B4-BE49-F238E27FC236}">
+                <a16:creationId xmlns:a16="http://schemas.microsoft.com/office/drawing/2014/main" id="{CF8F36E2-BBE5-43FE-822F-AD8CAE08C071}"/>
               </a:ext>
               <a:ext uri="{C183D7F6-B498-43B3-948B-1728B52AA6E4}">
                 <adec:decorative xmlns:adec="http://schemas.microsoft.com/office/drawing/2017/decorative" val="1"/>
               </a:ext>
             </a:extLst>
           </p:cNvPr>
-          <p:cNvSpPr>
-            <a:spLocks noGrp="1" noRot="1" noChangeAspect="1" noMove="1" noResize="1" noEditPoints="1" noAdjustHandles="1" noChangeArrowheads="1" noChangeShapeType="1" noTextEdit="1"/>
-          </p:cNvSpPr>
+          <p:cNvCxnSpPr>
+            <a:cxnSpLocks noGrp="1" noRot="1" noChangeAspect="1" noMove="1" noResize="1" noEditPoints="1" noAdjustHandles="1" noChangeArrowheads="1" noChangeShapeType="1"/>
+          </p:cNvCxnSpPr>
           <p:nvPr>
             <p:extLst>
               <p:ext uri="{386F3935-93C4-4BCD-93E2-E3B085C9AB24}">
@@ -4498,85 +4547,42 @@
               </p:ext>
             </p:extLst>
           </p:nvPr>
-        </p:nvSpPr>
+        </p:nvCxnSpPr>
         <p:spPr>
-          <a:xfrm flipH="1">
-            <a:off x="2013557" y="0"/>
-            <a:ext cx="10178443" cy="6858000"/>
+          <a:xfrm>
+            <a:off x="6096000" y="1417320"/>
+            <a:ext cx="0" cy="4023360"/>
           </a:xfrm>
-          <a:prstGeom prst="rect">
+          <a:prstGeom prst="line">
             <a:avLst/>
           </a:prstGeom>
-          <a:solidFill>
-            <a:schemeClr val="tx1">
-              <a:lumMod val="75000"/>
-              <a:lumOff val="25000"/>
-            </a:schemeClr>
-          </a:solidFill>
-          <a:ln>
-            <a:noFill/>
+          <a:ln w="15875">
+            <a:solidFill>
+              <a:schemeClr val="tx1"/>
+            </a:solidFill>
           </a:ln>
         </p:spPr>
         <p:style>
-          <a:lnRef idx="2">
-            <a:schemeClr val="accent1">
-              <a:shade val="50000"/>
-            </a:schemeClr>
+          <a:lnRef idx="1">
+            <a:schemeClr val="accent1"/>
           </a:lnRef>
-          <a:fillRef idx="1">
+          <a:fillRef idx="0">
             <a:schemeClr val="accent1"/>
           </a:fillRef>
           <a:effectRef idx="0">
             <a:schemeClr val="accent1"/>
           </a:effectRef>
           <a:fontRef idx="minor">
-            <a:schemeClr val="lt1"/>
+            <a:schemeClr val="tx1"/>
           </a:fontRef>
         </p:style>
-        <p:txBody>
-          <a:bodyPr rtlCol="0" anchor="ctr"/>
-          <a:lstStyle/>
-          <a:p>
-            <a:pPr marL="0" marR="0" lvl="0" indent="0" algn="ctr" defTabSz="914400" rtl="0" eaLnBrk="1" fontAlgn="auto" latinLnBrk="0" hangingPunct="1">
-              <a:lnSpc>
-                <a:spcPct val="100000"/>
-              </a:lnSpc>
-              <a:spcBef>
-                <a:spcPts val="0"/>
-              </a:spcBef>
-              <a:spcAft>
-                <a:spcPts val="0"/>
-              </a:spcAft>
-              <a:buClrTx/>
-              <a:buSzTx/>
-              <a:buFontTx/>
-              <a:buNone/>
-              <a:tabLst/>
-              <a:defRPr/>
-            </a:pPr>
-            <a:endParaRPr kumimoji="0" lang="en-US" sz="1800" b="0" i="0" u="none" strike="noStrike" kern="1200" cap="none" spc="0" normalizeH="0" baseline="0" noProof="0">
-              <a:ln>
-                <a:noFill/>
-              </a:ln>
-              <a:solidFill>
-                <a:prstClr val="white"/>
-              </a:solidFill>
-              <a:effectLst/>
-              <a:uLnTx/>
-              <a:uFillTx/>
-              <a:latin typeface="Calibri" panose="020F0502020204030204"/>
-              <a:ea typeface="+mn-ea"/>
-              <a:cs typeface="+mn-cs"/>
-            </a:endParaRPr>
-          </a:p>
-        </p:txBody>
-      </p:sp>
-      <p:sp>
-        <p:nvSpPr>
-          <p:cNvPr id="2" name="Title 1">
-            <a:extLst>
-              <a:ext uri="{FF2B5EF4-FFF2-40B4-BE49-F238E27FC236}">
-                <a16:creationId xmlns:a16="http://schemas.microsoft.com/office/drawing/2014/main" id="{416F4A36-D118-4435-A2EB-B07D35D2D7EF}"/>
+      </p:cxnSp>
+      <p:sp>
+        <p:nvSpPr>
+          <p:cNvPr id="4" name="Text Placeholder 3">
+            <a:extLst>
+              <a:ext uri="{FF2B5EF4-FFF2-40B4-BE49-F238E27FC236}">
+                <a16:creationId xmlns:a16="http://schemas.microsoft.com/office/drawing/2014/main" id="{D022F3E7-16C9-42BB-8D8D-ACB507B3997E}"/>
               </a:ext>
             </a:extLst>
           </p:cNvPr>
@@ -4584,71 +4590,17 @@
             <a:spLocks noGrp="1"/>
           </p:cNvSpPr>
           <p:nvPr>
-            <p:ph type="title"/>
+            <p:ph type="body" sz="half" idx="2"/>
           </p:nvPr>
         </p:nvSpPr>
         <p:spPr>
           <a:xfrm>
-            <a:off x="623787" y="1635358"/>
-            <a:ext cx="2752344" cy="2706624"/>
-          </a:xfrm>
-          <a:prstGeom prst="ellipse">
-            <a:avLst/>
-          </a:prstGeom>
-          <a:solidFill>
-            <a:schemeClr val="bg1"/>
-          </a:solidFill>
-          <a:ln w="174625" cmpd="thinThick">
-            <a:solidFill>
-              <a:schemeClr val="bg1"/>
-            </a:solidFill>
-          </a:ln>
-        </p:spPr>
-        <p:txBody>
-          <a:bodyPr vert="horz" lIns="91440" tIns="45720" rIns="91440" bIns="45720" rtlCol="0" anchor="ctr">
-            <a:normAutofit/>
-          </a:bodyPr>
-          <a:lstStyle/>
-          <a:p>
-            <a:pPr algn="ctr"/>
-            <a:r>
-              <a:rPr lang="en-US" sz="2600" kern="1200" dirty="0">
-                <a:solidFill>
-                  <a:schemeClr val="tx1"/>
-                </a:solidFill>
-                <a:latin typeface="+mj-lt"/>
-                <a:ea typeface="+mj-ea"/>
-                <a:cs typeface="+mj-cs"/>
-              </a:rPr>
-              <a:t>Add Pic here</a:t>
-            </a:r>
-          </a:p>
-        </p:txBody>
-      </p:sp>
-      <p:sp>
-        <p:nvSpPr>
-          <p:cNvPr id="4" name="Text Placeholder 3">
-            <a:extLst>
-              <a:ext uri="{FF2B5EF4-FFF2-40B4-BE49-F238E27FC236}">
-                <a16:creationId xmlns:a16="http://schemas.microsoft.com/office/drawing/2014/main" id="{D022F3E7-16C9-42BB-8D8D-ACB507B3997E}"/>
-              </a:ext>
-            </a:extLst>
-          </p:cNvPr>
-          <p:cNvSpPr>
-            <a:spLocks noGrp="1"/>
-          </p:cNvSpPr>
-          <p:nvPr>
-            <p:ph type="body" sz="half" idx="2"/>
-          </p:nvPr>
-        </p:nvSpPr>
-        <p:spPr>
-          <a:xfrm>
-            <a:off x="4256690" y="1088137"/>
-            <a:ext cx="6180082" cy="3801067"/>
+            <a:off x="6544490" y="2440416"/>
+            <a:ext cx="4887685" cy="3210179"/>
           </a:xfrm>
         </p:spPr>
         <p:txBody>
-          <a:bodyPr vert="horz" lIns="91440" tIns="45720" rIns="91440" bIns="45720" rtlCol="0" anchor="ctr">
+          <a:bodyPr vert="horz" lIns="91440" tIns="45720" rIns="91440" bIns="45720" rtlCol="0" anchor="t">
             <a:normAutofit/>
           </a:bodyPr>
           <a:lstStyle/>
@@ -4657,45 +4609,59 @@
               <a:buFont typeface="Arial" panose="020B0604020202020204" pitchFamily="34" charset="0"/>
               <a:buChar char="•"/>
             </a:pPr>
-            <a:endParaRPr lang="en-US" sz="2000">
-              <a:solidFill>
-                <a:schemeClr val="bg1"/>
-              </a:solidFill>
-            </a:endParaRPr>
-          </a:p>
-        </p:txBody>
-      </p:sp>
-      <p:sp>
-        <p:nvSpPr>
-          <p:cNvPr id="6" name="TextBox 5">
-            <a:extLst>
-              <a:ext uri="{FF2B5EF4-FFF2-40B4-BE49-F238E27FC236}">
-                <a16:creationId xmlns:a16="http://schemas.microsoft.com/office/drawing/2014/main" id="{324EBCB6-052E-4AD8-8C9F-130202721071}"/>
-              </a:ext>
-            </a:extLst>
-          </p:cNvPr>
-          <p:cNvSpPr txBox="1"/>
-          <p:nvPr/>
-        </p:nvSpPr>
-        <p:spPr>
-          <a:xfrm>
-            <a:off x="1306211" y="4519872"/>
-            <a:ext cx="1584960" cy="369332"/>
-          </a:xfrm>
-          <a:prstGeom prst="rect">
-            <a:avLst/>
-          </a:prstGeom>
-          <a:noFill/>
-        </p:spPr>
-        <p:txBody>
-          <a:bodyPr wrap="square" rtlCol="0">
-            <a:spAutoFit/>
-          </a:bodyPr>
-          <a:lstStyle/>
-          <a:p>
             <a:r>
-              <a:rPr lang="en-US" dirty="0"/>
-              <a:t>Doug Timothy</a:t>
+              <a:rPr lang="en-US" sz="1900" dirty="0"/>
+              <a:t>BS in Mathematics</a:t>
+            </a:r>
+          </a:p>
+          <a:p>
+            <a:pPr indent="-228600">
+              <a:buFont typeface="Arial" panose="020B0604020202020204" pitchFamily="34" charset="0"/>
+              <a:buChar char="•"/>
+            </a:pPr>
+            <a:r>
+              <a:rPr lang="en-US" sz="1900" dirty="0"/>
+              <a:t>BS in Cartography</a:t>
+            </a:r>
+          </a:p>
+          <a:p>
+            <a:pPr indent="-228600">
+              <a:buFont typeface="Arial" panose="020B0604020202020204" pitchFamily="34" charset="0"/>
+              <a:buChar char="•"/>
+            </a:pPr>
+            <a:r>
+              <a:rPr lang="en-US" sz="1900" dirty="0"/>
+              <a:t>Professional Surveyor and Mapper since  Dec 2011</a:t>
+            </a:r>
+          </a:p>
+          <a:p>
+            <a:pPr indent="-228600">
+              <a:buFont typeface="Arial" panose="020B0604020202020204" pitchFamily="34" charset="0"/>
+              <a:buChar char="•"/>
+            </a:pPr>
+            <a:r>
+              <a:rPr lang="en-US" sz="1900" dirty="0"/>
+              <a:t>Been in the mapping field for about 23 years</a:t>
+            </a:r>
+          </a:p>
+          <a:p>
+            <a:pPr indent="-228600">
+              <a:buFont typeface="Arial" panose="020B0604020202020204" pitchFamily="34" charset="0"/>
+              <a:buChar char="•"/>
+            </a:pPr>
+            <a:r>
+              <a:rPr lang="en-US" sz="1900" dirty="0"/>
+              <a:t>Currently working for Pickett and Associates and have been with them for about 17 years</a:t>
+            </a:r>
+          </a:p>
+          <a:p>
+            <a:pPr indent="-228600">
+              <a:buFont typeface="Arial" panose="020B0604020202020204" pitchFamily="34" charset="0"/>
+              <a:buChar char="•"/>
+            </a:pPr>
+            <a:r>
+              <a:rPr lang="en-US" sz="1900" dirty="0"/>
+              <a:t>Soon-to-be graduate of Bethel Tech Coding Bootcamp</a:t>
             </a:r>
           </a:p>
         </p:txBody>
@@ -4708,7 +4674,7 @@
     </p:extLst>
   </p:cSld>
   <p:clrMapOvr>
-    <a:masterClrMapping/>
+    <a:overrideClrMapping bg1="dk1" tx1="lt1" bg2="dk2" tx2="lt2" accent1="accent1" accent2="accent2" accent3="accent3" accent4="accent4" accent5="accent5" accent6="accent6" hlink="hlink" folHlink="folHlink"/>
   </p:clrMapOvr>
 </p:sld>
 </file>

</xml_diff>

<commit_message>
added pictures and stuff
</commit_message>
<xml_diff>
--- a/Presentation.pptx
+++ b/Presentation.pptx
@@ -270,7 +270,7 @@
           <a:p>
             <a:fld id="{59ED46AA-65FE-4AA6-90A6-8BABD663A628}" type="datetimeFigureOut">
               <a:rPr lang="en-US" smtClean="0"/>
-              <a:t>1/23/2021</a:t>
+              <a:t>1/23/21</a:t>
             </a:fld>
             <a:endParaRPr lang="en-US"/>
           </a:p>
@@ -468,7 +468,7 @@
           <a:p>
             <a:fld id="{59ED46AA-65FE-4AA6-90A6-8BABD663A628}" type="datetimeFigureOut">
               <a:rPr lang="en-US" smtClean="0"/>
-              <a:t>1/23/2021</a:t>
+              <a:t>1/23/21</a:t>
             </a:fld>
             <a:endParaRPr lang="en-US"/>
           </a:p>
@@ -676,7 +676,7 @@
           <a:p>
             <a:fld id="{59ED46AA-65FE-4AA6-90A6-8BABD663A628}" type="datetimeFigureOut">
               <a:rPr lang="en-US" smtClean="0"/>
-              <a:t>1/23/2021</a:t>
+              <a:t>1/23/21</a:t>
             </a:fld>
             <a:endParaRPr lang="en-US"/>
           </a:p>
@@ -874,7 +874,7 @@
           <a:p>
             <a:fld id="{59ED46AA-65FE-4AA6-90A6-8BABD663A628}" type="datetimeFigureOut">
               <a:rPr lang="en-US" smtClean="0"/>
-              <a:t>1/23/2021</a:t>
+              <a:t>1/23/21</a:t>
             </a:fld>
             <a:endParaRPr lang="en-US"/>
           </a:p>
@@ -1149,7 +1149,7 @@
           <a:p>
             <a:fld id="{59ED46AA-65FE-4AA6-90A6-8BABD663A628}" type="datetimeFigureOut">
               <a:rPr lang="en-US" smtClean="0"/>
-              <a:t>1/23/2021</a:t>
+              <a:t>1/23/21</a:t>
             </a:fld>
             <a:endParaRPr lang="en-US"/>
           </a:p>
@@ -1414,7 +1414,7 @@
           <a:p>
             <a:fld id="{59ED46AA-65FE-4AA6-90A6-8BABD663A628}" type="datetimeFigureOut">
               <a:rPr lang="en-US" smtClean="0"/>
-              <a:t>1/23/2021</a:t>
+              <a:t>1/23/21</a:t>
             </a:fld>
             <a:endParaRPr lang="en-US"/>
           </a:p>
@@ -1826,7 +1826,7 @@
           <a:p>
             <a:fld id="{59ED46AA-65FE-4AA6-90A6-8BABD663A628}" type="datetimeFigureOut">
               <a:rPr lang="en-US" smtClean="0"/>
-              <a:t>1/23/2021</a:t>
+              <a:t>1/23/21</a:t>
             </a:fld>
             <a:endParaRPr lang="en-US"/>
           </a:p>
@@ -1967,7 +1967,7 @@
           <a:p>
             <a:fld id="{59ED46AA-65FE-4AA6-90A6-8BABD663A628}" type="datetimeFigureOut">
               <a:rPr lang="en-US" smtClean="0"/>
-              <a:t>1/23/2021</a:t>
+              <a:t>1/23/21</a:t>
             </a:fld>
             <a:endParaRPr lang="en-US"/>
           </a:p>
@@ -2080,7 +2080,7 @@
           <a:p>
             <a:fld id="{59ED46AA-65FE-4AA6-90A6-8BABD663A628}" type="datetimeFigureOut">
               <a:rPr lang="en-US" smtClean="0"/>
-              <a:t>1/23/2021</a:t>
+              <a:t>1/23/21</a:t>
             </a:fld>
             <a:endParaRPr lang="en-US"/>
           </a:p>
@@ -2391,7 +2391,7 @@
           <a:p>
             <a:fld id="{59ED46AA-65FE-4AA6-90A6-8BABD663A628}" type="datetimeFigureOut">
               <a:rPr lang="en-US" smtClean="0"/>
-              <a:t>1/23/2021</a:t>
+              <a:t>1/23/21</a:t>
             </a:fld>
             <a:endParaRPr lang="en-US"/>
           </a:p>
@@ -2679,7 +2679,7 @@
           <a:p>
             <a:fld id="{59ED46AA-65FE-4AA6-90A6-8BABD663A628}" type="datetimeFigureOut">
               <a:rPr lang="en-US" smtClean="0"/>
-              <a:t>1/23/2021</a:t>
+              <a:t>1/23/21</a:t>
             </a:fld>
             <a:endParaRPr lang="en-US"/>
           </a:p>
@@ -2920,7 +2920,7 @@
           <a:p>
             <a:fld id="{59ED46AA-65FE-4AA6-90A6-8BABD663A628}" type="datetimeFigureOut">
               <a:rPr lang="en-US" smtClean="0"/>
-              <a:t>1/23/2021</a:t>
+              <a:t>1/23/21</a:t>
             </a:fld>
             <a:endParaRPr lang="en-US"/>
           </a:p>
@@ -4302,7 +4302,10 @@
     <p:bg>
       <p:bgPr>
         <a:solidFill>
-          <a:schemeClr val="bg1"/>
+          <a:schemeClr val="bg1">
+            <a:tint val="95000"/>
+            <a:satMod val="170000"/>
+          </a:schemeClr>
         </a:solidFill>
         <a:effectLst/>
       </p:bgPr>
@@ -4321,12 +4324,12 @@
           <a:chExt cx="0" cy="0"/>
         </a:xfrm>
       </p:grpSpPr>
-      <p:sp>
-        <p:nvSpPr>
-          <p:cNvPr id="16" name="Rectangle 15">
-            <a:extLst>
-              <a:ext uri="{FF2B5EF4-FFF2-40B4-BE49-F238E27FC236}">
-                <a16:creationId xmlns:a16="http://schemas.microsoft.com/office/drawing/2014/main" id="{02D886F1-CB4A-4FC1-AAA7-9402B0D0DDDD}"/>
+      <p:sp useBgFill="1">
+        <p:nvSpPr>
+          <p:cNvPr id="39" name="Rectangle 38">
+            <a:extLst>
+              <a:ext uri="{FF2B5EF4-FFF2-40B4-BE49-F238E27FC236}">
+                <a16:creationId xmlns:a16="http://schemas.microsoft.com/office/drawing/2014/main" id="{9B76D444-2756-434F-AE61-96D69830C13E}"/>
               </a:ext>
               <a:ext uri="{C183D7F6-B498-43B3-948B-1728B52AA6E4}">
                 <adec:decorative xmlns:adec="http://schemas.microsoft.com/office/drawing/2017/decorative" val="1"/>
@@ -4347,14 +4350,11 @@
         <p:spPr>
           <a:xfrm>
             <a:off x="0" y="0"/>
-            <a:ext cx="2013557" cy="6858000"/>
+            <a:ext cx="12188952" cy="6858000"/>
           </a:xfrm>
           <a:prstGeom prst="rect">
             <a:avLst/>
           </a:prstGeom>
-          <a:solidFill>
-            <a:srgbClr val="7F7F7F"/>
-          </a:solidFill>
           <a:ln>
             <a:noFill/>
           </a:ln>
@@ -4379,55 +4379,99 @@
           <a:bodyPr rtlCol="0" anchor="ctr"/>
           <a:lstStyle/>
           <a:p>
-            <a:pPr marL="0" marR="0" lvl="0" indent="0" algn="ctr" defTabSz="914400" rtl="0" eaLnBrk="1" fontAlgn="auto" latinLnBrk="0" hangingPunct="1">
-              <a:lnSpc>
-                <a:spcPct val="100000"/>
-              </a:lnSpc>
-              <a:spcBef>
-                <a:spcPts val="0"/>
-              </a:spcBef>
-              <a:spcAft>
-                <a:spcPts val="0"/>
-              </a:spcAft>
-              <a:buClrTx/>
-              <a:buSzTx/>
-              <a:buFontTx/>
-              <a:buNone/>
-              <a:tabLst/>
-              <a:defRPr/>
-            </a:pPr>
-            <a:endParaRPr kumimoji="0" lang="en-US" sz="1800" b="0" i="0" u="none" strike="noStrike" kern="1200" cap="none" spc="0" normalizeH="0" baseline="0" noProof="0">
-              <a:ln>
-                <a:noFill/>
-              </a:ln>
-              <a:solidFill>
-                <a:prstClr val="white"/>
-              </a:solidFill>
-              <a:effectLst/>
-              <a:uLnTx/>
-              <a:uFillTx/>
-              <a:latin typeface="Calibri" panose="020F0502020204030204"/>
-              <a:ea typeface="+mn-ea"/>
-              <a:cs typeface="+mn-cs"/>
-            </a:endParaRPr>
-          </a:p>
-        </p:txBody>
-      </p:sp>
-      <p:sp>
-        <p:nvSpPr>
-          <p:cNvPr id="18" name="Rectangle 17">
-            <a:extLst>
-              <a:ext uri="{FF2B5EF4-FFF2-40B4-BE49-F238E27FC236}">
-                <a16:creationId xmlns:a16="http://schemas.microsoft.com/office/drawing/2014/main" id="{762B7B97-C3EE-4AEE-A61F-AFA873FE2FCA}"/>
+            <a:pPr algn="ctr"/>
+            <a:endParaRPr lang="en-US"/>
+          </a:p>
+        </p:txBody>
+      </p:sp>
+      <p:sp>
+        <p:nvSpPr>
+          <p:cNvPr id="2" name="Title 1">
+            <a:extLst>
+              <a:ext uri="{FF2B5EF4-FFF2-40B4-BE49-F238E27FC236}">
+                <a16:creationId xmlns:a16="http://schemas.microsoft.com/office/drawing/2014/main" id="{2023E108-7902-49D5-BC7A-ED1D37BFB8B2}"/>
+              </a:ext>
+            </a:extLst>
+          </p:cNvPr>
+          <p:cNvSpPr>
+            <a:spLocks noGrp="1"/>
+          </p:cNvSpPr>
+          <p:nvPr>
+            <p:ph type="title"/>
+          </p:nvPr>
+        </p:nvSpPr>
+        <p:spPr>
+          <a:xfrm>
+            <a:off x="6688182" y="932961"/>
+            <a:ext cx="4887685" cy="806939"/>
+          </a:xfrm>
+          <a:prstGeom prst="ellipse">
+            <a:avLst/>
+          </a:prstGeom>
+        </p:spPr>
+        <p:txBody>
+          <a:bodyPr vert="horz" lIns="91440" tIns="45720" rIns="91440" bIns="45720" rtlCol="0" anchor="b">
+            <a:normAutofit fontScale="90000"/>
+          </a:bodyPr>
+          <a:lstStyle/>
+          <a:p>
+            <a:r>
+              <a:rPr lang="en-US" sz="4000" dirty="0"/>
+              <a:t>Damon Manley</a:t>
+            </a:r>
+          </a:p>
+        </p:txBody>
+      </p:sp>
+      <p:pic>
+        <p:nvPicPr>
+          <p:cNvPr id="6" name="Picture 5">
+            <a:extLst>
+              <a:ext uri="{FF2B5EF4-FFF2-40B4-BE49-F238E27FC236}">
+                <a16:creationId xmlns:a16="http://schemas.microsoft.com/office/drawing/2014/main" id="{3CD41BEF-C8F9-CB40-A4F3-2A443970443F}"/>
+              </a:ext>
+            </a:extLst>
+          </p:cNvPr>
+          <p:cNvPicPr>
+            <a:picLocks noChangeAspect="1"/>
+          </p:cNvPicPr>
+          <p:nvPr/>
+        </p:nvPicPr>
+        <p:blipFill rotWithShape="1">
+          <a:blip r:embed="rId2">
+            <a:extLst>
+              <a:ext uri="{28A0092B-C50C-407E-A947-70E740481C1C}">
+                <a14:useLocalDpi xmlns:a14="http://schemas.microsoft.com/office/drawing/2010/main" val="0"/>
+              </a:ext>
+            </a:extLst>
+          </a:blip>
+          <a:srcRect t="16070" r="2" b="4"/>
+          <a:stretch/>
+        </p:blipFill>
+        <p:spPr>
+          <a:xfrm>
+            <a:off x="391903" y="573678"/>
+            <a:ext cx="5103206" cy="5710645"/>
+          </a:xfrm>
+          <a:prstGeom prst="rect">
+            <a:avLst/>
+          </a:prstGeom>
+        </p:spPr>
+      </p:pic>
+      <p:cxnSp>
+        <p:nvCxnSpPr>
+          <p:cNvPr id="41" name="Straight Connector 40">
+            <a:extLst>
+              <a:ext uri="{FF2B5EF4-FFF2-40B4-BE49-F238E27FC236}">
+                <a16:creationId xmlns:a16="http://schemas.microsoft.com/office/drawing/2014/main" id="{CF8F36E2-BBE5-43FE-822F-AD8CAE08C071}"/>
               </a:ext>
               <a:ext uri="{C183D7F6-B498-43B3-948B-1728B52AA6E4}">
                 <adec:decorative xmlns:adec="http://schemas.microsoft.com/office/drawing/2017/decorative" val="1"/>
               </a:ext>
             </a:extLst>
           </p:cNvPr>
-          <p:cNvSpPr>
-            <a:spLocks noGrp="1" noRot="1" noChangeAspect="1" noMove="1" noResize="1" noEditPoints="1" noAdjustHandles="1" noChangeArrowheads="1" noChangeShapeType="1" noTextEdit="1"/>
-          </p:cNvSpPr>
+          <p:cNvCxnSpPr>
+            <a:cxnSpLocks noGrp="1" noRot="1" noChangeAspect="1" noMove="1" noResize="1" noEditPoints="1" noAdjustHandles="1" noChangeArrowheads="1" noChangeShapeType="1"/>
+          </p:cNvCxnSpPr>
           <p:nvPr>
             <p:extLst>
               <p:ext uri="{386F3935-93C4-4BCD-93E2-E3B085C9AB24}">
@@ -4435,85 +4479,42 @@
               </p:ext>
             </p:extLst>
           </p:nvPr>
-        </p:nvSpPr>
+        </p:nvCxnSpPr>
         <p:spPr>
-          <a:xfrm flipH="1">
-            <a:off x="2013557" y="0"/>
-            <a:ext cx="10178443" cy="6858000"/>
+          <a:xfrm>
+            <a:off x="6096000" y="1417320"/>
+            <a:ext cx="0" cy="4023360"/>
           </a:xfrm>
-          <a:prstGeom prst="rect">
+          <a:prstGeom prst="line">
             <a:avLst/>
           </a:prstGeom>
-          <a:solidFill>
-            <a:schemeClr val="tx1">
-              <a:lumMod val="75000"/>
-              <a:lumOff val="25000"/>
-            </a:schemeClr>
-          </a:solidFill>
-          <a:ln>
-            <a:noFill/>
+          <a:ln w="15875">
+            <a:solidFill>
+              <a:schemeClr val="tx1"/>
+            </a:solidFill>
           </a:ln>
         </p:spPr>
         <p:style>
-          <a:lnRef idx="2">
-            <a:schemeClr val="accent1">
-              <a:shade val="50000"/>
-            </a:schemeClr>
+          <a:lnRef idx="1">
+            <a:schemeClr val="accent1"/>
           </a:lnRef>
-          <a:fillRef idx="1">
+          <a:fillRef idx="0">
             <a:schemeClr val="accent1"/>
           </a:fillRef>
           <a:effectRef idx="0">
             <a:schemeClr val="accent1"/>
           </a:effectRef>
           <a:fontRef idx="minor">
-            <a:schemeClr val="lt1"/>
+            <a:schemeClr val="tx1"/>
           </a:fontRef>
         </p:style>
-        <p:txBody>
-          <a:bodyPr rtlCol="0" anchor="ctr"/>
-          <a:lstStyle/>
-          <a:p>
-            <a:pPr marL="0" marR="0" lvl="0" indent="0" algn="ctr" defTabSz="914400" rtl="0" eaLnBrk="1" fontAlgn="auto" latinLnBrk="0" hangingPunct="1">
-              <a:lnSpc>
-                <a:spcPct val="100000"/>
-              </a:lnSpc>
-              <a:spcBef>
-                <a:spcPts val="0"/>
-              </a:spcBef>
-              <a:spcAft>
-                <a:spcPts val="0"/>
-              </a:spcAft>
-              <a:buClrTx/>
-              <a:buSzTx/>
-              <a:buFontTx/>
-              <a:buNone/>
-              <a:tabLst/>
-              <a:defRPr/>
-            </a:pPr>
-            <a:endParaRPr kumimoji="0" lang="en-US" sz="1800" b="0" i="0" u="none" strike="noStrike" kern="1200" cap="none" spc="0" normalizeH="0" baseline="0" noProof="0">
-              <a:ln>
-                <a:noFill/>
-              </a:ln>
-              <a:solidFill>
-                <a:prstClr val="white"/>
-              </a:solidFill>
-              <a:effectLst/>
-              <a:uLnTx/>
-              <a:uFillTx/>
-              <a:latin typeface="Calibri" panose="020F0502020204030204"/>
-              <a:ea typeface="+mn-ea"/>
-              <a:cs typeface="+mn-cs"/>
-            </a:endParaRPr>
-          </a:p>
-        </p:txBody>
-      </p:sp>
-      <p:sp>
-        <p:nvSpPr>
-          <p:cNvPr id="2" name="Title 1">
-            <a:extLst>
-              <a:ext uri="{FF2B5EF4-FFF2-40B4-BE49-F238E27FC236}">
-                <a16:creationId xmlns:a16="http://schemas.microsoft.com/office/drawing/2014/main" id="{2023E108-7902-49D5-BC7A-ED1D37BFB8B2}"/>
+      </p:cxnSp>
+      <p:sp>
+        <p:nvSpPr>
+          <p:cNvPr id="4" name="Text Placeholder 3">
+            <a:extLst>
+              <a:ext uri="{FF2B5EF4-FFF2-40B4-BE49-F238E27FC236}">
+                <a16:creationId xmlns:a16="http://schemas.microsoft.com/office/drawing/2014/main" id="{E840C4FF-09FE-4D7F-9594-9C7B51EFEFA9}"/>
               </a:ext>
             </a:extLst>
           </p:cNvPr>
@@ -4521,71 +4522,17 @@
             <a:spLocks noGrp="1"/>
           </p:cNvSpPr>
           <p:nvPr>
-            <p:ph type="title"/>
+            <p:ph type="body" sz="half" idx="2"/>
           </p:nvPr>
         </p:nvSpPr>
         <p:spPr>
           <a:xfrm>
-            <a:off x="623787" y="1635358"/>
-            <a:ext cx="2752344" cy="2706624"/>
-          </a:xfrm>
-          <a:prstGeom prst="ellipse">
-            <a:avLst/>
-          </a:prstGeom>
-          <a:solidFill>
-            <a:schemeClr val="bg1"/>
-          </a:solidFill>
-          <a:ln w="174625" cmpd="thinThick">
-            <a:solidFill>
-              <a:schemeClr val="bg1"/>
-            </a:solidFill>
-          </a:ln>
-        </p:spPr>
-        <p:txBody>
-          <a:bodyPr vert="horz" lIns="91440" tIns="45720" rIns="91440" bIns="45720" rtlCol="0" anchor="ctr">
-            <a:normAutofit/>
-          </a:bodyPr>
-          <a:lstStyle/>
-          <a:p>
-            <a:pPr algn="ctr"/>
-            <a:r>
-              <a:rPr lang="en-US" sz="2600" kern="1200" dirty="0">
-                <a:solidFill>
-                  <a:schemeClr val="tx1"/>
-                </a:solidFill>
-                <a:latin typeface="+mj-lt"/>
-                <a:ea typeface="+mj-ea"/>
-                <a:cs typeface="+mj-cs"/>
-              </a:rPr>
-              <a:t>Add picture here</a:t>
-            </a:r>
-          </a:p>
-        </p:txBody>
-      </p:sp>
-      <p:sp>
-        <p:nvSpPr>
-          <p:cNvPr id="4" name="Text Placeholder 3">
-            <a:extLst>
-              <a:ext uri="{FF2B5EF4-FFF2-40B4-BE49-F238E27FC236}">
-                <a16:creationId xmlns:a16="http://schemas.microsoft.com/office/drawing/2014/main" id="{E840C4FF-09FE-4D7F-9594-9C7B51EFEFA9}"/>
-              </a:ext>
-            </a:extLst>
-          </p:cNvPr>
-          <p:cNvSpPr>
-            <a:spLocks noGrp="1"/>
-          </p:cNvSpPr>
-          <p:nvPr>
-            <p:ph type="body" sz="half" idx="2"/>
-          </p:nvPr>
-        </p:nvSpPr>
-        <p:spPr>
-          <a:xfrm>
-            <a:off x="4256690" y="1088137"/>
-            <a:ext cx="6180082" cy="3801067"/>
+            <a:off x="6688181" y="1907922"/>
+            <a:ext cx="4887685" cy="3210179"/>
           </a:xfrm>
         </p:spPr>
         <p:txBody>
-          <a:bodyPr vert="horz" lIns="91440" tIns="45720" rIns="91440" bIns="45720" rtlCol="0" anchor="ctr">
+          <a:bodyPr vert="horz" lIns="91440" tIns="45720" rIns="91440" bIns="45720" rtlCol="0" anchor="t">
             <a:normAutofit/>
           </a:bodyPr>
           <a:lstStyle/>
@@ -4594,45 +4541,39 @@
               <a:buFont typeface="Arial" panose="020B0604020202020204" pitchFamily="34" charset="0"/>
               <a:buChar char="•"/>
             </a:pPr>
-            <a:endParaRPr lang="en-US" sz="2000" dirty="0">
-              <a:solidFill>
-                <a:schemeClr val="bg1"/>
-              </a:solidFill>
-            </a:endParaRPr>
-          </a:p>
-        </p:txBody>
-      </p:sp>
-      <p:sp>
-        <p:nvSpPr>
-          <p:cNvPr id="5" name="TextBox 4">
-            <a:extLst>
-              <a:ext uri="{FF2B5EF4-FFF2-40B4-BE49-F238E27FC236}">
-                <a16:creationId xmlns:a16="http://schemas.microsoft.com/office/drawing/2014/main" id="{F9EBA4F3-75A7-4184-90D9-7CC96B9776E0}"/>
-              </a:ext>
-            </a:extLst>
-          </p:cNvPr>
-          <p:cNvSpPr txBox="1"/>
-          <p:nvPr/>
-        </p:nvSpPr>
-        <p:spPr>
-          <a:xfrm>
-            <a:off x="1280873" y="4519872"/>
-            <a:ext cx="1854250" cy="369332"/>
-          </a:xfrm>
-          <a:prstGeom prst="rect">
-            <a:avLst/>
-          </a:prstGeom>
-          <a:noFill/>
-        </p:spPr>
-        <p:txBody>
-          <a:bodyPr wrap="square" rtlCol="0">
-            <a:spAutoFit/>
-          </a:bodyPr>
-          <a:lstStyle/>
-          <a:p>
-            <a:r>
-              <a:rPr lang="en-US" dirty="0"/>
-              <a:t>Damon Manley</a:t>
+            <a:r>
+              <a:rPr lang="en-US" sz="2400" dirty="0"/>
+              <a:t>BS in Exercise Science</a:t>
+            </a:r>
+          </a:p>
+          <a:p>
+            <a:pPr indent="-228600">
+              <a:buFont typeface="Arial" panose="020B0604020202020204" pitchFamily="34" charset="0"/>
+              <a:buChar char="•"/>
+            </a:pPr>
+            <a:r>
+              <a:rPr lang="en-US" sz="2400" dirty="0"/>
+              <a:t>Director of Hospitality at Chick-fil-A</a:t>
+            </a:r>
+          </a:p>
+          <a:p>
+            <a:pPr indent="-228600">
+              <a:buFont typeface="Arial" panose="020B0604020202020204" pitchFamily="34" charset="0"/>
+              <a:buChar char="•"/>
+            </a:pPr>
+            <a:r>
+              <a:rPr lang="en-US" sz="2400" dirty="0"/>
+              <a:t>Working in Chick-fil-A since 2016</a:t>
+            </a:r>
+          </a:p>
+          <a:p>
+            <a:pPr indent="-228600">
+              <a:buFont typeface="Arial" panose="020B0604020202020204" pitchFamily="34" charset="0"/>
+              <a:buChar char="•"/>
+            </a:pPr>
+            <a:r>
+              <a:rPr lang="en-US" sz="2400" dirty="0"/>
+              <a:t>Analyzing business trends has helped in my career at Chick-fil-A and has led me to pursue the path to data science</a:t>
             </a:r>
           </a:p>
         </p:txBody>
@@ -4645,7 +4586,7 @@
     </p:extLst>
   </p:cSld>
   <p:clrMapOvr>
-    <a:masterClrMapping/>
+    <a:overrideClrMapping bg1="dk1" tx1="lt1" bg2="dk2" tx2="lt2" accent1="accent1" accent2="accent2" accent3="accent3" accent4="accent4" accent5="accent5" accent6="accent6" hlink="hlink" folHlink="folHlink"/>
   </p:clrMapOvr>
 </p:sld>
 </file>
@@ -5077,7 +5018,7 @@
         </p:blipFill>
         <p:spPr>
           <a:xfrm>
-            <a:off x="30480" y="0"/>
+            <a:off x="1" y="0"/>
             <a:ext cx="12191999" cy="6857990"/>
           </a:xfrm>
           <a:prstGeom prst="rect">
@@ -5220,7 +5161,7 @@
                 <a:latin typeface="Helvetica" panose="020B0604020202020204" pitchFamily="34" charset="0"/>
                 <a:ea typeface="Times New Roman" panose="02020603050405020304" pitchFamily="18" charset="0"/>
               </a:rPr>
-              <a:t>Covid 19 has negatively impacted the restaurant industry, but how has it impacted one specific location of the CFA restaurant chain?  This project will analyze data from a CFA location in Charleston, SC.   CFA has given access to unlimited data but due to the time constraints of this project the we will only be considering a few questions.</a:t>
+              <a:t>Covid 19 has negatively impacted the restaurant industry, but how has it impacted one specific location of the CFA restaurant chain?  This project will analyze data from a CFA location in Charleston, SC.   CFA has given access to unlimited data but due to the time constraints of this project, we will only be considering a few questions.</a:t>
             </a:r>
             <a:br>
               <a:rPr lang="en-US" sz="2400" b="1" i="1" dirty="0">
@@ -5584,23 +5525,7 @@
                   <a:schemeClr val="bg1"/>
                 </a:solidFill>
               </a:rPr>
-              <a:t>Objective 1 – We used the </a:t>
-            </a:r>
-            <a:r>
-              <a:rPr lang="en-US" sz="2400" dirty="0" err="1">
-                <a:solidFill>
-                  <a:schemeClr val="bg1"/>
-                </a:solidFill>
-              </a:rPr>
-              <a:t>anova</a:t>
-            </a:r>
-            <a:r>
-              <a:rPr lang="en-US" sz="2400" dirty="0">
-                <a:solidFill>
-                  <a:schemeClr val="bg1"/>
-                </a:solidFill>
-              </a:rPr>
-              <a:t> analysis and the following variables: Sales, NormDT, 3rdParty and Time.</a:t>
+              <a:t>Objective 1 – We used an ANOVA analysis and the following variables: Sales, NormDT, 3rdParty and Time.</a:t>
             </a:r>
           </a:p>
           <a:p>
@@ -5634,23 +5559,7 @@
                   <a:schemeClr val="bg1"/>
                 </a:solidFill>
               </a:rPr>
-              <a:t>Objective 3 – We used the </a:t>
-            </a:r>
-            <a:r>
-              <a:rPr lang="en-US" sz="2400" dirty="0" err="1">
-                <a:solidFill>
-                  <a:schemeClr val="bg1"/>
-                </a:solidFill>
-              </a:rPr>
-              <a:t>manova</a:t>
-            </a:r>
-            <a:r>
-              <a:rPr lang="en-US" sz="2400" dirty="0">
-                <a:solidFill>
-                  <a:schemeClr val="bg1"/>
-                </a:solidFill>
-              </a:rPr>
-              <a:t> analysis and looked at the following variables: MobCO, MobDI, DineIn, Catering, CarryO, NormDT, 3rdParty, and Time.</a:t>
+              <a:t>Objective 3 – We used a MANOVA analysis and looked at the following variables: MobCO, MobDI, DineIn, Catering, CarryO, NormDT, 3rdParty, and Time.</a:t>
             </a:r>
           </a:p>
           <a:p>

</xml_diff>

<commit_message>
Been working a lot this morning on presentation and code
will update you
</commit_message>
<xml_diff>
--- a/Presentation.pptx
+++ b/Presentation.pptx
@@ -10,13 +10,14 @@
     <p:sldId id="265" r:id="rId4"/>
     <p:sldId id="256" r:id="rId5"/>
     <p:sldId id="269" r:id="rId6"/>
-    <p:sldId id="271" r:id="rId7"/>
-    <p:sldId id="259" r:id="rId8"/>
-    <p:sldId id="268" r:id="rId9"/>
-    <p:sldId id="267" r:id="rId10"/>
-    <p:sldId id="257" r:id="rId11"/>
-    <p:sldId id="266" r:id="rId12"/>
-    <p:sldId id="260" r:id="rId13"/>
+    <p:sldId id="272" r:id="rId7"/>
+    <p:sldId id="271" r:id="rId8"/>
+    <p:sldId id="259" r:id="rId9"/>
+    <p:sldId id="268" r:id="rId10"/>
+    <p:sldId id="267" r:id="rId11"/>
+    <p:sldId id="257" r:id="rId12"/>
+    <p:sldId id="266" r:id="rId13"/>
+    <p:sldId id="260" r:id="rId14"/>
   </p:sldIdLst>
   <p:sldSz cx="12192000" cy="6858000"/>
   <p:notesSz cx="6858000" cy="9144000"/>
@@ -270,7 +271,7 @@
           <a:p>
             <a:fld id="{59ED46AA-65FE-4AA6-90A6-8BABD663A628}" type="datetimeFigureOut">
               <a:rPr lang="en-US" smtClean="0"/>
-              <a:t>1/23/21</a:t>
+              <a:t>1/24/21</a:t>
             </a:fld>
             <a:endParaRPr lang="en-US"/>
           </a:p>
@@ -468,7 +469,7 @@
           <a:p>
             <a:fld id="{59ED46AA-65FE-4AA6-90A6-8BABD663A628}" type="datetimeFigureOut">
               <a:rPr lang="en-US" smtClean="0"/>
-              <a:t>1/23/21</a:t>
+              <a:t>1/24/21</a:t>
             </a:fld>
             <a:endParaRPr lang="en-US"/>
           </a:p>
@@ -676,7 +677,7 @@
           <a:p>
             <a:fld id="{59ED46AA-65FE-4AA6-90A6-8BABD663A628}" type="datetimeFigureOut">
               <a:rPr lang="en-US" smtClean="0"/>
-              <a:t>1/23/21</a:t>
+              <a:t>1/24/21</a:t>
             </a:fld>
             <a:endParaRPr lang="en-US"/>
           </a:p>
@@ -874,7 +875,7 @@
           <a:p>
             <a:fld id="{59ED46AA-65FE-4AA6-90A6-8BABD663A628}" type="datetimeFigureOut">
               <a:rPr lang="en-US" smtClean="0"/>
-              <a:t>1/23/21</a:t>
+              <a:t>1/24/21</a:t>
             </a:fld>
             <a:endParaRPr lang="en-US"/>
           </a:p>
@@ -1149,7 +1150,7 @@
           <a:p>
             <a:fld id="{59ED46AA-65FE-4AA6-90A6-8BABD663A628}" type="datetimeFigureOut">
               <a:rPr lang="en-US" smtClean="0"/>
-              <a:t>1/23/21</a:t>
+              <a:t>1/24/21</a:t>
             </a:fld>
             <a:endParaRPr lang="en-US"/>
           </a:p>
@@ -1414,7 +1415,7 @@
           <a:p>
             <a:fld id="{59ED46AA-65FE-4AA6-90A6-8BABD663A628}" type="datetimeFigureOut">
               <a:rPr lang="en-US" smtClean="0"/>
-              <a:t>1/23/21</a:t>
+              <a:t>1/24/21</a:t>
             </a:fld>
             <a:endParaRPr lang="en-US"/>
           </a:p>
@@ -1826,7 +1827,7 @@
           <a:p>
             <a:fld id="{59ED46AA-65FE-4AA6-90A6-8BABD663A628}" type="datetimeFigureOut">
               <a:rPr lang="en-US" smtClean="0"/>
-              <a:t>1/23/21</a:t>
+              <a:t>1/24/21</a:t>
             </a:fld>
             <a:endParaRPr lang="en-US"/>
           </a:p>
@@ -1967,7 +1968,7 @@
           <a:p>
             <a:fld id="{59ED46AA-65FE-4AA6-90A6-8BABD663A628}" type="datetimeFigureOut">
               <a:rPr lang="en-US" smtClean="0"/>
-              <a:t>1/23/21</a:t>
+              <a:t>1/24/21</a:t>
             </a:fld>
             <a:endParaRPr lang="en-US"/>
           </a:p>
@@ -2080,7 +2081,7 @@
           <a:p>
             <a:fld id="{59ED46AA-65FE-4AA6-90A6-8BABD663A628}" type="datetimeFigureOut">
               <a:rPr lang="en-US" smtClean="0"/>
-              <a:t>1/23/21</a:t>
+              <a:t>1/24/21</a:t>
             </a:fld>
             <a:endParaRPr lang="en-US"/>
           </a:p>
@@ -2391,7 +2392,7 @@
           <a:p>
             <a:fld id="{59ED46AA-65FE-4AA6-90A6-8BABD663A628}" type="datetimeFigureOut">
               <a:rPr lang="en-US" smtClean="0"/>
-              <a:t>1/23/21</a:t>
+              <a:t>1/24/21</a:t>
             </a:fld>
             <a:endParaRPr lang="en-US"/>
           </a:p>
@@ -2679,7 +2680,7 @@
           <a:p>
             <a:fld id="{59ED46AA-65FE-4AA6-90A6-8BABD663A628}" type="datetimeFigureOut">
               <a:rPr lang="en-US" smtClean="0"/>
-              <a:t>1/23/21</a:t>
+              <a:t>1/24/21</a:t>
             </a:fld>
             <a:endParaRPr lang="en-US"/>
           </a:p>
@@ -2920,7 +2921,7 @@
           <a:p>
             <a:fld id="{59ED46AA-65FE-4AA6-90A6-8BABD663A628}" type="datetimeFigureOut">
               <a:rPr lang="en-US" smtClean="0"/>
-              <a:t>1/23/21</a:t>
+              <a:t>1/24/21</a:t>
             </a:fld>
             <a:endParaRPr lang="en-US"/>
           </a:p>
@@ -3495,7 +3496,35 @@
                 <a:ea typeface="+mj-ea"/>
                 <a:cs typeface="+mj-cs"/>
               </a:rPr>
-              <a:t>Effects of Covid 19</a:t>
+              <a:t>Effects of </a:t>
+            </a:r>
+            <a:r>
+              <a:rPr lang="en-US" sz="3600" dirty="0" err="1">
+                <a:solidFill>
+                  <a:schemeClr val="tx1">
+                    <a:lumMod val="85000"/>
+                    <a:lumOff val="15000"/>
+                  </a:schemeClr>
+                </a:solidFill>
+                <a:latin typeface="+mj-lt"/>
+                <a:ea typeface="+mj-ea"/>
+                <a:cs typeface="+mj-cs"/>
+              </a:rPr>
+              <a:t>Covid</a:t>
+            </a:r>
+            <a:r>
+              <a:rPr lang="en-US" sz="3600" dirty="0">
+                <a:solidFill>
+                  <a:schemeClr val="tx1">
+                    <a:lumMod val="85000"/>
+                    <a:lumOff val="15000"/>
+                  </a:schemeClr>
+                </a:solidFill>
+                <a:latin typeface="+mj-lt"/>
+                <a:ea typeface="+mj-ea"/>
+                <a:cs typeface="+mj-cs"/>
+              </a:rPr>
+              <a:t> 19 on a Quick-Service Restaurant</a:t>
             </a:r>
           </a:p>
         </p:txBody>
@@ -3622,6 +3651,1672 @@
 </file>
 
 <file path=ppt/slides/slide10.xml><?xml version="1.0" encoding="utf-8"?>
+<p:sld xmlns:a="http://schemas.openxmlformats.org/drawingml/2006/main" xmlns:r="http://schemas.openxmlformats.org/officeDocument/2006/relationships" xmlns:p="http://schemas.openxmlformats.org/presentationml/2006/main">
+  <p:cSld>
+    <p:bg>
+      <p:bgPr>
+        <a:solidFill>
+          <a:schemeClr val="bg1"/>
+        </a:solidFill>
+        <a:effectLst/>
+      </p:bgPr>
+    </p:bg>
+    <p:spTree>
+      <p:nvGrpSpPr>
+        <p:cNvPr id="1" name=""/>
+        <p:cNvGrpSpPr/>
+        <p:nvPr/>
+      </p:nvGrpSpPr>
+      <p:grpSpPr>
+        <a:xfrm>
+          <a:off x="0" y="0"/>
+          <a:ext cx="0" cy="0"/>
+          <a:chOff x="0" y="0"/>
+          <a:chExt cx="0" cy="0"/>
+        </a:xfrm>
+      </p:grpSpPr>
+      <p:sp>
+        <p:nvSpPr>
+          <p:cNvPr id="15" name="Freeform 5">
+            <a:extLst>
+              <a:ext uri="{FF2B5EF4-FFF2-40B4-BE49-F238E27FC236}">
+                <a16:creationId xmlns:a16="http://schemas.microsoft.com/office/drawing/2014/main" id="{07322A9E-F1EC-405E-8971-BA906EFFCCB8}"/>
+              </a:ext>
+              <a:ext uri="{C183D7F6-B498-43B3-948B-1728B52AA6E4}">
+                <adec:decorative xmlns:adec="http://schemas.microsoft.com/office/drawing/2017/decorative" val="1"/>
+              </a:ext>
+            </a:extLst>
+          </p:cNvPr>
+          <p:cNvSpPr>
+            <a:spLocks noGrp="1" noRot="1" noChangeAspect="1" noMove="1" noResize="1" noEditPoints="1" noAdjustHandles="1" noChangeArrowheads="1" noChangeShapeType="1" noTextEdit="1"/>
+          </p:cNvSpPr>
+          <p:nvPr>
+            <p:extLst>
+              <p:ext uri="{386F3935-93C4-4BCD-93E2-E3B085C9AB24}">
+                <p16:designElem xmlns:p16="http://schemas.microsoft.com/office/powerpoint/2015/main" val="1"/>
+              </p:ext>
+            </p:extLst>
+          </p:nvPr>
+        </p:nvSpPr>
+        <p:spPr bwMode="auto">
+          <a:xfrm>
+            <a:off x="-329674" y="1290909"/>
+            <a:ext cx="9702800" cy="5573512"/>
+          </a:xfrm>
+          <a:custGeom>
+            <a:avLst/>
+            <a:gdLst>
+              <a:gd name="T0" fmla="*/ 1752 w 2038"/>
+              <a:gd name="T1" fmla="*/ 1169 h 1169"/>
+              <a:gd name="T2" fmla="*/ 1487 w 2038"/>
+              <a:gd name="T3" fmla="*/ 334 h 1169"/>
+              <a:gd name="T4" fmla="*/ 860 w 2038"/>
+              <a:gd name="T5" fmla="*/ 22 h 1169"/>
+              <a:gd name="T6" fmla="*/ 199 w 2038"/>
+              <a:gd name="T7" fmla="*/ 318 h 1169"/>
+              <a:gd name="T8" fmla="*/ 399 w 2038"/>
+              <a:gd name="T9" fmla="*/ 1165 h 1169"/>
+            </a:gdLst>
+            <a:ahLst/>
+            <a:cxnLst>
+              <a:cxn ang="0">
+                <a:pos x="T0" y="T1"/>
+              </a:cxn>
+              <a:cxn ang="0">
+                <a:pos x="T2" y="T3"/>
+              </a:cxn>
+              <a:cxn ang="0">
+                <a:pos x="T4" y="T5"/>
+              </a:cxn>
+              <a:cxn ang="0">
+                <a:pos x="T6" y="T7"/>
+              </a:cxn>
+              <a:cxn ang="0">
+                <a:pos x="T8" y="T9"/>
+              </a:cxn>
+            </a:cxnLst>
+            <a:rect l="0" t="0" r="r" b="b"/>
+            <a:pathLst>
+              <a:path w="2038" h="1169">
+                <a:moveTo>
+                  <a:pt x="1752" y="1169"/>
+                </a:moveTo>
+                <a:cubicBezTo>
+                  <a:pt x="2038" y="928"/>
+                  <a:pt x="1673" y="513"/>
+                  <a:pt x="1487" y="334"/>
+                </a:cubicBezTo>
+                <a:cubicBezTo>
+                  <a:pt x="1316" y="170"/>
+                  <a:pt x="1099" y="43"/>
+                  <a:pt x="860" y="22"/>
+                </a:cubicBezTo>
+                <a:cubicBezTo>
+                  <a:pt x="621" y="0"/>
+                  <a:pt x="341" y="128"/>
+                  <a:pt x="199" y="318"/>
+                </a:cubicBezTo>
+                <a:cubicBezTo>
+                  <a:pt x="0" y="586"/>
+                  <a:pt x="184" y="965"/>
+                  <a:pt x="399" y="1165"/>
+                </a:cubicBezTo>
+              </a:path>
+            </a:pathLst>
+          </a:custGeom>
+          <a:noFill/>
+          <a:ln w="9525" cap="flat">
+            <a:solidFill>
+              <a:schemeClr val="tx1">
+                <a:alpha val="20000"/>
+              </a:schemeClr>
+            </a:solidFill>
+            <a:prstDash val="solid"/>
+            <a:miter lim="800000"/>
+            <a:headEnd/>
+            <a:tailEnd/>
+          </a:ln>
+          <a:extLst>
+            <a:ext uri="{909E8E84-426E-40DD-AFC4-6F175D3DCCD1}">
+              <a14:hiddenFill xmlns:a14="http://schemas.microsoft.com/office/drawing/2010/main">
+                <a:solidFill>
+                  <a:srgbClr val="FFFFFF"/>
+                </a:solidFill>
+              </a14:hiddenFill>
+            </a:ext>
+          </a:extLst>
+        </p:spPr>
+        <p:txBody>
+          <a:bodyPr vert="horz" wrap="square" lIns="91440" tIns="45720" rIns="91440" bIns="45720" numCol="1" anchor="t" anchorCtr="0" compatLnSpc="1">
+            <a:prstTxWarp prst="textNoShape">
+              <a:avLst/>
+            </a:prstTxWarp>
+          </a:bodyPr>
+          <a:lstStyle/>
+          <a:p>
+            <a:endParaRPr lang="en-US"/>
+          </a:p>
+        </p:txBody>
+      </p:sp>
+      <p:sp>
+        <p:nvSpPr>
+          <p:cNvPr id="17" name="Freeform 6">
+            <a:extLst>
+              <a:ext uri="{FF2B5EF4-FFF2-40B4-BE49-F238E27FC236}">
+                <a16:creationId xmlns:a16="http://schemas.microsoft.com/office/drawing/2014/main" id="{A5704422-1118-4FD1-95AD-29A064EB80D9}"/>
+              </a:ext>
+              <a:ext uri="{C183D7F6-B498-43B3-948B-1728B52AA6E4}">
+                <adec:decorative xmlns:adec="http://schemas.microsoft.com/office/drawing/2017/decorative" val="1"/>
+              </a:ext>
+            </a:extLst>
+          </p:cNvPr>
+          <p:cNvSpPr>
+            <a:spLocks noGrp="1" noRot="1" noChangeAspect="1" noMove="1" noResize="1" noEditPoints="1" noAdjustHandles="1" noChangeArrowheads="1" noChangeShapeType="1" noTextEdit="1"/>
+          </p:cNvSpPr>
+          <p:nvPr>
+            <p:extLst>
+              <p:ext uri="{386F3935-93C4-4BCD-93E2-E3B085C9AB24}">
+                <p16:designElem xmlns:p16="http://schemas.microsoft.com/office/powerpoint/2015/main" val="1"/>
+              </p:ext>
+            </p:extLst>
+          </p:nvPr>
+        </p:nvSpPr>
+        <p:spPr bwMode="auto">
+          <a:xfrm>
+            <a:off x="670451" y="2010741"/>
+            <a:ext cx="7373938" cy="4848892"/>
+          </a:xfrm>
+          <a:custGeom>
+            <a:avLst/>
+            <a:gdLst>
+              <a:gd name="T0" fmla="*/ 1025 w 1549"/>
+              <a:gd name="T1" fmla="*/ 1016 h 1017"/>
+              <a:gd name="T2" fmla="*/ 1443 w 1549"/>
+              <a:gd name="T3" fmla="*/ 592 h 1017"/>
+              <a:gd name="T4" fmla="*/ 782 w 1549"/>
+              <a:gd name="T5" fmla="*/ 53 h 1017"/>
+              <a:gd name="T6" fmla="*/ 150 w 1549"/>
+              <a:gd name="T7" fmla="*/ 329 h 1017"/>
+              <a:gd name="T8" fmla="*/ 477 w 1549"/>
+              <a:gd name="T9" fmla="*/ 1017 h 1017"/>
+            </a:gdLst>
+            <a:ahLst/>
+            <a:cxnLst>
+              <a:cxn ang="0">
+                <a:pos x="T0" y="T1"/>
+              </a:cxn>
+              <a:cxn ang="0">
+                <a:pos x="T2" y="T3"/>
+              </a:cxn>
+              <a:cxn ang="0">
+                <a:pos x="T4" y="T5"/>
+              </a:cxn>
+              <a:cxn ang="0">
+                <a:pos x="T6" y="T7"/>
+              </a:cxn>
+              <a:cxn ang="0">
+                <a:pos x="T8" y="T9"/>
+              </a:cxn>
+            </a:cxnLst>
+            <a:rect l="0" t="0" r="r" b="b"/>
+            <a:pathLst>
+              <a:path w="1549" h="1017">
+                <a:moveTo>
+                  <a:pt x="1025" y="1016"/>
+                </a:moveTo>
+                <a:cubicBezTo>
+                  <a:pt x="1223" y="971"/>
+                  <a:pt x="1549" y="857"/>
+                  <a:pt x="1443" y="592"/>
+                </a:cubicBezTo>
+                <a:cubicBezTo>
+                  <a:pt x="1344" y="344"/>
+                  <a:pt x="1041" y="111"/>
+                  <a:pt x="782" y="53"/>
+                </a:cubicBezTo>
+                <a:cubicBezTo>
+                  <a:pt x="545" y="0"/>
+                  <a:pt x="275" y="117"/>
+                  <a:pt x="150" y="329"/>
+                </a:cubicBezTo>
+                <a:cubicBezTo>
+                  <a:pt x="0" y="584"/>
+                  <a:pt x="243" y="911"/>
+                  <a:pt x="477" y="1017"/>
+                </a:cubicBezTo>
+              </a:path>
+            </a:pathLst>
+          </a:custGeom>
+          <a:noFill/>
+          <a:ln w="9525" cap="flat">
+            <a:solidFill>
+              <a:schemeClr val="tx1">
+                <a:alpha val="20000"/>
+              </a:schemeClr>
+            </a:solidFill>
+            <a:prstDash val="solid"/>
+            <a:miter lim="800000"/>
+            <a:headEnd/>
+            <a:tailEnd/>
+          </a:ln>
+          <a:extLst>
+            <a:ext uri="{909E8E84-426E-40DD-AFC4-6F175D3DCCD1}">
+              <a14:hiddenFill xmlns:a14="http://schemas.microsoft.com/office/drawing/2010/main">
+                <a:solidFill>
+                  <a:srgbClr val="FFFFFF"/>
+                </a:solidFill>
+              </a14:hiddenFill>
+            </a:ext>
+          </a:extLst>
+        </p:spPr>
+        <p:txBody>
+          <a:bodyPr vert="horz" wrap="square" lIns="91440" tIns="45720" rIns="91440" bIns="45720" numCol="1" anchor="t" anchorCtr="0" compatLnSpc="1">
+            <a:prstTxWarp prst="textNoShape">
+              <a:avLst/>
+            </a:prstTxWarp>
+          </a:bodyPr>
+          <a:lstStyle/>
+          <a:p>
+            <a:endParaRPr lang="en-US"/>
+          </a:p>
+        </p:txBody>
+      </p:sp>
+      <p:sp>
+        <p:nvSpPr>
+          <p:cNvPr id="19" name="Freeform 7">
+            <a:extLst>
+              <a:ext uri="{FF2B5EF4-FFF2-40B4-BE49-F238E27FC236}">
+                <a16:creationId xmlns:a16="http://schemas.microsoft.com/office/drawing/2014/main" id="{A88B2AAA-B805-498E-A9E6-98B885855498}"/>
+              </a:ext>
+              <a:ext uri="{C183D7F6-B498-43B3-948B-1728B52AA6E4}">
+                <adec:decorative xmlns:adec="http://schemas.microsoft.com/office/drawing/2017/decorative" val="1"/>
+              </a:ext>
+            </a:extLst>
+          </p:cNvPr>
+          <p:cNvSpPr>
+            <a:spLocks noGrp="1" noRot="1" noChangeAspect="1" noMove="1" noResize="1" noEditPoints="1" noAdjustHandles="1" noChangeArrowheads="1" noChangeShapeType="1" noTextEdit="1"/>
+          </p:cNvSpPr>
+          <p:nvPr>
+            <p:extLst>
+              <p:ext uri="{386F3935-93C4-4BCD-93E2-E3B085C9AB24}">
+                <p16:designElem xmlns:p16="http://schemas.microsoft.com/office/powerpoint/2015/main" val="1"/>
+              </p:ext>
+            </p:extLst>
+          </p:nvPr>
+        </p:nvSpPr>
+        <p:spPr bwMode="auto">
+          <a:xfrm>
+            <a:off x="251351" y="1780905"/>
+            <a:ext cx="8035925" cy="5083516"/>
+          </a:xfrm>
+          <a:custGeom>
+            <a:avLst/>
+            <a:gdLst>
+              <a:gd name="T0" fmla="*/ 1302 w 1688"/>
+              <a:gd name="T1" fmla="*/ 1066 h 1066"/>
+              <a:gd name="T2" fmla="*/ 1613 w 1688"/>
+              <a:gd name="T3" fmla="*/ 850 h 1066"/>
+              <a:gd name="T4" fmla="*/ 1517 w 1688"/>
+              <a:gd name="T5" fmla="*/ 471 h 1066"/>
+              <a:gd name="T6" fmla="*/ 798 w 1688"/>
+              <a:gd name="T7" fmla="*/ 28 h 1066"/>
+              <a:gd name="T8" fmla="*/ 181 w 1688"/>
+              <a:gd name="T9" fmla="*/ 333 h 1066"/>
+              <a:gd name="T10" fmla="*/ 420 w 1688"/>
+              <a:gd name="T11" fmla="*/ 1066 h 1066"/>
+            </a:gdLst>
+            <a:ahLst/>
+            <a:cxnLst>
+              <a:cxn ang="0">
+                <a:pos x="T0" y="T1"/>
+              </a:cxn>
+              <a:cxn ang="0">
+                <a:pos x="T2" y="T3"/>
+              </a:cxn>
+              <a:cxn ang="0">
+                <a:pos x="T4" y="T5"/>
+              </a:cxn>
+              <a:cxn ang="0">
+                <a:pos x="T6" y="T7"/>
+              </a:cxn>
+              <a:cxn ang="0">
+                <a:pos x="T8" y="T9"/>
+              </a:cxn>
+              <a:cxn ang="0">
+                <a:pos x="T10" y="T11"/>
+              </a:cxn>
+            </a:cxnLst>
+            <a:rect l="0" t="0" r="r" b="b"/>
+            <a:pathLst>
+              <a:path w="1688" h="1066">
+                <a:moveTo>
+                  <a:pt x="1302" y="1066"/>
+                </a:moveTo>
+                <a:cubicBezTo>
+                  <a:pt x="1416" y="1024"/>
+                  <a:pt x="1551" y="962"/>
+                  <a:pt x="1613" y="850"/>
+                </a:cubicBezTo>
+                <a:cubicBezTo>
+                  <a:pt x="1688" y="715"/>
+                  <a:pt x="1606" y="575"/>
+                  <a:pt x="1517" y="471"/>
+                </a:cubicBezTo>
+                <a:cubicBezTo>
+                  <a:pt x="1336" y="258"/>
+                  <a:pt x="1084" y="62"/>
+                  <a:pt x="798" y="28"/>
+                </a:cubicBezTo>
+                <a:cubicBezTo>
+                  <a:pt x="559" y="0"/>
+                  <a:pt x="317" y="138"/>
+                  <a:pt x="181" y="333"/>
+                </a:cubicBezTo>
+                <a:cubicBezTo>
+                  <a:pt x="0" y="592"/>
+                  <a:pt x="191" y="907"/>
+                  <a:pt x="420" y="1066"/>
+                </a:cubicBezTo>
+              </a:path>
+            </a:pathLst>
+          </a:custGeom>
+          <a:noFill/>
+          <a:ln w="9525" cap="flat">
+            <a:solidFill>
+              <a:schemeClr val="tx1">
+                <a:alpha val="20000"/>
+              </a:schemeClr>
+            </a:solidFill>
+            <a:prstDash val="dash"/>
+            <a:miter lim="800000"/>
+            <a:headEnd/>
+            <a:tailEnd/>
+          </a:ln>
+          <a:extLst>
+            <a:ext uri="{909E8E84-426E-40DD-AFC4-6F175D3DCCD1}">
+              <a14:hiddenFill xmlns:a14="http://schemas.microsoft.com/office/drawing/2010/main">
+                <a:solidFill>
+                  <a:srgbClr val="FFFFFF"/>
+                </a:solidFill>
+              </a14:hiddenFill>
+            </a:ext>
+          </a:extLst>
+        </p:spPr>
+        <p:txBody>
+          <a:bodyPr vert="horz" wrap="square" lIns="91440" tIns="45720" rIns="91440" bIns="45720" numCol="1" anchor="t" anchorCtr="0" compatLnSpc="1">
+            <a:prstTxWarp prst="textNoShape">
+              <a:avLst/>
+            </a:prstTxWarp>
+          </a:bodyPr>
+          <a:lstStyle/>
+          <a:p>
+            <a:endParaRPr lang="en-US"/>
+          </a:p>
+        </p:txBody>
+      </p:sp>
+      <p:sp>
+        <p:nvSpPr>
+          <p:cNvPr id="21" name="Freeform 8">
+            <a:extLst>
+              <a:ext uri="{FF2B5EF4-FFF2-40B4-BE49-F238E27FC236}">
+                <a16:creationId xmlns:a16="http://schemas.microsoft.com/office/drawing/2014/main" id="{9B8051E0-19D7-43E1-BFD9-E6DBFEB3A3F1}"/>
+              </a:ext>
+              <a:ext uri="{C183D7F6-B498-43B3-948B-1728B52AA6E4}">
+                <adec:decorative xmlns:adec="http://schemas.microsoft.com/office/drawing/2017/decorative" val="1"/>
+              </a:ext>
+            </a:extLst>
+          </p:cNvPr>
+          <p:cNvSpPr>
+            <a:spLocks noGrp="1" noRot="1" noChangeAspect="1" noMove="1" noResize="1" noEditPoints="1" noAdjustHandles="1" noChangeArrowheads="1" noChangeShapeType="1" noTextEdit="1"/>
+          </p:cNvSpPr>
+          <p:nvPr>
+            <p:extLst>
+              <p:ext uri="{386F3935-93C4-4BCD-93E2-E3B085C9AB24}">
+                <p16:designElem xmlns:p16="http://schemas.microsoft.com/office/powerpoint/2015/main" val="1"/>
+              </p:ext>
+            </p:extLst>
+          </p:nvPr>
+        </p:nvSpPr>
+        <p:spPr bwMode="auto">
+          <a:xfrm>
+            <a:off x="-1061" y="542347"/>
+            <a:ext cx="10334625" cy="6322075"/>
+          </a:xfrm>
+          <a:custGeom>
+            <a:avLst/>
+            <a:gdLst>
+              <a:gd name="T0" fmla="*/ 1873 w 2171"/>
+              <a:gd name="T1" fmla="*/ 1326 h 1326"/>
+              <a:gd name="T2" fmla="*/ 1609 w 2171"/>
+              <a:gd name="T3" fmla="*/ 473 h 1326"/>
+              <a:gd name="T4" fmla="*/ 880 w 2171"/>
+              <a:gd name="T5" fmla="*/ 63 h 1326"/>
+              <a:gd name="T6" fmla="*/ 0 w 2171"/>
+              <a:gd name="T7" fmla="*/ 423 h 1326"/>
+            </a:gdLst>
+            <a:ahLst/>
+            <a:cxnLst>
+              <a:cxn ang="0">
+                <a:pos x="T0" y="T1"/>
+              </a:cxn>
+              <a:cxn ang="0">
+                <a:pos x="T2" y="T3"/>
+              </a:cxn>
+              <a:cxn ang="0">
+                <a:pos x="T4" y="T5"/>
+              </a:cxn>
+              <a:cxn ang="0">
+                <a:pos x="T6" y="T7"/>
+              </a:cxn>
+            </a:cxnLst>
+            <a:rect l="0" t="0" r="r" b="b"/>
+            <a:pathLst>
+              <a:path w="2171" h="1326">
+                <a:moveTo>
+                  <a:pt x="1873" y="1326"/>
+                </a:moveTo>
+                <a:cubicBezTo>
+                  <a:pt x="2171" y="1045"/>
+                  <a:pt x="1825" y="678"/>
+                  <a:pt x="1609" y="473"/>
+                </a:cubicBezTo>
+                <a:cubicBezTo>
+                  <a:pt x="1406" y="281"/>
+                  <a:pt x="1159" y="116"/>
+                  <a:pt x="880" y="63"/>
+                </a:cubicBezTo>
+                <a:cubicBezTo>
+                  <a:pt x="545" y="0"/>
+                  <a:pt x="214" y="161"/>
+                  <a:pt x="0" y="423"/>
+                </a:cubicBezTo>
+              </a:path>
+            </a:pathLst>
+          </a:custGeom>
+          <a:noFill/>
+          <a:ln w="9525" cap="flat">
+            <a:solidFill>
+              <a:schemeClr val="tx1">
+                <a:alpha val="20000"/>
+              </a:schemeClr>
+            </a:solidFill>
+            <a:prstDash val="solid"/>
+            <a:miter lim="800000"/>
+            <a:headEnd/>
+            <a:tailEnd/>
+          </a:ln>
+          <a:extLst>
+            <a:ext uri="{909E8E84-426E-40DD-AFC4-6F175D3DCCD1}">
+              <a14:hiddenFill xmlns:a14="http://schemas.microsoft.com/office/drawing/2010/main">
+                <a:solidFill>
+                  <a:srgbClr val="FFFFFF"/>
+                </a:solidFill>
+              </a14:hiddenFill>
+            </a:ext>
+          </a:extLst>
+        </p:spPr>
+        <p:txBody>
+          <a:bodyPr vert="horz" wrap="square" lIns="91440" tIns="45720" rIns="91440" bIns="45720" numCol="1" anchor="t" anchorCtr="0" compatLnSpc="1">
+            <a:prstTxWarp prst="textNoShape">
+              <a:avLst/>
+            </a:prstTxWarp>
+          </a:bodyPr>
+          <a:lstStyle/>
+          <a:p>
+            <a:endParaRPr lang="en-US"/>
+          </a:p>
+        </p:txBody>
+      </p:sp>
+      <p:sp>
+        <p:nvSpPr>
+          <p:cNvPr id="23" name="Freeform 9">
+            <a:extLst>
+              <a:ext uri="{FF2B5EF4-FFF2-40B4-BE49-F238E27FC236}">
+                <a16:creationId xmlns:a16="http://schemas.microsoft.com/office/drawing/2014/main" id="{4EDB2B02-86A2-46F5-A4BE-B7D9B10411D6}"/>
+              </a:ext>
+              <a:ext uri="{C183D7F6-B498-43B3-948B-1728B52AA6E4}">
+                <adec:decorative xmlns:adec="http://schemas.microsoft.com/office/drawing/2017/decorative" val="1"/>
+              </a:ext>
+            </a:extLst>
+          </p:cNvPr>
+          <p:cNvSpPr>
+            <a:spLocks noGrp="1" noRot="1" noChangeAspect="1" noMove="1" noResize="1" noEditPoints="1" noAdjustHandles="1" noChangeArrowheads="1" noChangeShapeType="1" noTextEdit="1"/>
+          </p:cNvSpPr>
+          <p:nvPr>
+            <p:extLst>
+              <p:ext uri="{386F3935-93C4-4BCD-93E2-E3B085C9AB24}">
+                <p16:designElem xmlns:p16="http://schemas.microsoft.com/office/powerpoint/2015/main" val="1"/>
+              </p:ext>
+            </p:extLst>
+          </p:nvPr>
+        </p:nvSpPr>
+        <p:spPr bwMode="auto">
+          <a:xfrm>
+            <a:off x="3701" y="6178751"/>
+            <a:ext cx="504825" cy="681527"/>
+          </a:xfrm>
+          <a:custGeom>
+            <a:avLst/>
+            <a:gdLst>
+              <a:gd name="T0" fmla="*/ 0 w 106"/>
+              <a:gd name="T1" fmla="*/ 0 h 143"/>
+              <a:gd name="T2" fmla="*/ 106 w 106"/>
+              <a:gd name="T3" fmla="*/ 143 h 143"/>
+            </a:gdLst>
+            <a:ahLst/>
+            <a:cxnLst>
+              <a:cxn ang="0">
+                <a:pos x="T0" y="T1"/>
+              </a:cxn>
+              <a:cxn ang="0">
+                <a:pos x="T2" y="T3"/>
+              </a:cxn>
+            </a:cxnLst>
+            <a:rect l="0" t="0" r="r" b="b"/>
+            <a:pathLst>
+              <a:path w="106" h="143">
+                <a:moveTo>
+                  <a:pt x="0" y="0"/>
+                </a:moveTo>
+                <a:cubicBezTo>
+                  <a:pt x="35" y="54"/>
+                  <a:pt x="70" y="101"/>
+                  <a:pt x="106" y="143"/>
+                </a:cubicBezTo>
+              </a:path>
+            </a:pathLst>
+          </a:custGeom>
+          <a:noFill/>
+          <a:ln w="4763" cap="flat">
+            <a:solidFill>
+              <a:schemeClr val="tx1">
+                <a:alpha val="20000"/>
+              </a:schemeClr>
+            </a:solidFill>
+            <a:prstDash val="solid"/>
+            <a:miter lim="800000"/>
+            <a:headEnd/>
+            <a:tailEnd/>
+          </a:ln>
+          <a:extLst>
+            <a:ext uri="{909E8E84-426E-40DD-AFC4-6F175D3DCCD1}">
+              <a14:hiddenFill xmlns:a14="http://schemas.microsoft.com/office/drawing/2010/main">
+                <a:solidFill>
+                  <a:srgbClr val="FFFFFF"/>
+                </a:solidFill>
+              </a14:hiddenFill>
+            </a:ext>
+          </a:extLst>
+        </p:spPr>
+        <p:txBody>
+          <a:bodyPr vert="horz" wrap="square" lIns="91440" tIns="45720" rIns="91440" bIns="45720" numCol="1" anchor="t" anchorCtr="0" compatLnSpc="1">
+            <a:prstTxWarp prst="textNoShape">
+              <a:avLst/>
+            </a:prstTxWarp>
+          </a:bodyPr>
+          <a:lstStyle/>
+          <a:p>
+            <a:endParaRPr lang="en-US"/>
+          </a:p>
+        </p:txBody>
+      </p:sp>
+      <p:sp>
+        <p:nvSpPr>
+          <p:cNvPr id="25" name="Freeform 10">
+            <a:extLst>
+              <a:ext uri="{FF2B5EF4-FFF2-40B4-BE49-F238E27FC236}">
+                <a16:creationId xmlns:a16="http://schemas.microsoft.com/office/drawing/2014/main" id="{43954639-FB5D-41F4-9560-6F6DFE778425}"/>
+              </a:ext>
+              <a:ext uri="{C183D7F6-B498-43B3-948B-1728B52AA6E4}">
+                <adec:decorative xmlns:adec="http://schemas.microsoft.com/office/drawing/2017/decorative" val="1"/>
+              </a:ext>
+            </a:extLst>
+          </p:cNvPr>
+          <p:cNvSpPr>
+            <a:spLocks noGrp="1" noRot="1" noChangeAspect="1" noMove="1" noResize="1" noEditPoints="1" noAdjustHandles="1" noChangeArrowheads="1" noChangeShapeType="1" noTextEdit="1"/>
+          </p:cNvSpPr>
+          <p:nvPr>
+            <p:extLst>
+              <p:ext uri="{386F3935-93C4-4BCD-93E2-E3B085C9AB24}">
+                <p16:designElem xmlns:p16="http://schemas.microsoft.com/office/powerpoint/2015/main" val="1"/>
+              </p:ext>
+            </p:extLst>
+          </p:nvPr>
+        </p:nvSpPr>
+        <p:spPr bwMode="auto">
+          <a:xfrm>
+            <a:off x="-1061" y="-59376"/>
+            <a:ext cx="11091863" cy="6923796"/>
+          </a:xfrm>
+          <a:custGeom>
+            <a:avLst/>
+            <a:gdLst>
+              <a:gd name="T0" fmla="*/ 2046 w 2330"/>
+              <a:gd name="T1" fmla="*/ 1452 h 1452"/>
+              <a:gd name="T2" fmla="*/ 1813 w 2330"/>
+              <a:gd name="T3" fmla="*/ 601 h 1452"/>
+              <a:gd name="T4" fmla="*/ 956 w 2330"/>
+              <a:gd name="T5" fmla="*/ 97 h 1452"/>
+              <a:gd name="T6" fmla="*/ 0 w 2330"/>
+              <a:gd name="T7" fmla="*/ 366 h 1452"/>
+            </a:gdLst>
+            <a:ahLst/>
+            <a:cxnLst>
+              <a:cxn ang="0">
+                <a:pos x="T0" y="T1"/>
+              </a:cxn>
+              <a:cxn ang="0">
+                <a:pos x="T2" y="T3"/>
+              </a:cxn>
+              <a:cxn ang="0">
+                <a:pos x="T4" y="T5"/>
+              </a:cxn>
+              <a:cxn ang="0">
+                <a:pos x="T6" y="T7"/>
+              </a:cxn>
+            </a:cxnLst>
+            <a:rect l="0" t="0" r="r" b="b"/>
+            <a:pathLst>
+              <a:path w="2330" h="1452">
+                <a:moveTo>
+                  <a:pt x="2046" y="1452"/>
+                </a:moveTo>
+                <a:cubicBezTo>
+                  <a:pt x="2330" y="1153"/>
+                  <a:pt x="2049" y="821"/>
+                  <a:pt x="1813" y="601"/>
+                </a:cubicBezTo>
+                <a:cubicBezTo>
+                  <a:pt x="1569" y="375"/>
+                  <a:pt x="1282" y="179"/>
+                  <a:pt x="956" y="97"/>
+                </a:cubicBezTo>
+                <a:cubicBezTo>
+                  <a:pt x="572" y="0"/>
+                  <a:pt x="292" y="101"/>
+                  <a:pt x="0" y="366"/>
+                </a:cubicBezTo>
+              </a:path>
+            </a:pathLst>
+          </a:custGeom>
+          <a:noFill/>
+          <a:ln w="9525" cap="flat">
+            <a:solidFill>
+              <a:schemeClr val="tx1">
+                <a:alpha val="20000"/>
+              </a:schemeClr>
+            </a:solidFill>
+            <a:prstDash val="solid"/>
+            <a:miter lim="800000"/>
+            <a:headEnd/>
+            <a:tailEnd/>
+          </a:ln>
+          <a:extLst>
+            <a:ext uri="{909E8E84-426E-40DD-AFC4-6F175D3DCCD1}">
+              <a14:hiddenFill xmlns:a14="http://schemas.microsoft.com/office/drawing/2010/main">
+                <a:solidFill>
+                  <a:srgbClr val="FFFFFF"/>
+                </a:solidFill>
+              </a14:hiddenFill>
+            </a:ext>
+          </a:extLst>
+        </p:spPr>
+        <p:txBody>
+          <a:bodyPr vert="horz" wrap="square" lIns="91440" tIns="45720" rIns="91440" bIns="45720" numCol="1" anchor="t" anchorCtr="0" compatLnSpc="1">
+            <a:prstTxWarp prst="textNoShape">
+              <a:avLst/>
+            </a:prstTxWarp>
+          </a:bodyPr>
+          <a:lstStyle/>
+          <a:p>
+            <a:endParaRPr lang="en-US"/>
+          </a:p>
+        </p:txBody>
+      </p:sp>
+      <p:sp>
+        <p:nvSpPr>
+          <p:cNvPr id="27" name="Freeform 12">
+            <a:extLst>
+              <a:ext uri="{FF2B5EF4-FFF2-40B4-BE49-F238E27FC236}">
+                <a16:creationId xmlns:a16="http://schemas.microsoft.com/office/drawing/2014/main" id="{E898931C-0323-41FA-A036-20F818B1FF81}"/>
+              </a:ext>
+              <a:ext uri="{C183D7F6-B498-43B3-948B-1728B52AA6E4}">
+                <adec:decorative xmlns:adec="http://schemas.microsoft.com/office/drawing/2017/decorative" val="1"/>
+              </a:ext>
+            </a:extLst>
+          </p:cNvPr>
+          <p:cNvSpPr>
+            <a:spLocks noGrp="1" noRot="1" noChangeAspect="1" noMove="1" noResize="1" noEditPoints="1" noAdjustHandles="1" noChangeArrowheads="1" noChangeShapeType="1" noTextEdit="1"/>
+          </p:cNvSpPr>
+          <p:nvPr>
+            <p:extLst>
+              <p:ext uri="{386F3935-93C4-4BCD-93E2-E3B085C9AB24}">
+                <p16:designElem xmlns:p16="http://schemas.microsoft.com/office/powerpoint/2015/main" val="1"/>
+              </p:ext>
+            </p:extLst>
+          </p:nvPr>
+        </p:nvSpPr>
+        <p:spPr bwMode="auto">
+          <a:xfrm>
+            <a:off x="-1061" y="-1916"/>
+            <a:ext cx="1057275" cy="614491"/>
+          </a:xfrm>
+          <a:custGeom>
+            <a:avLst/>
+            <a:gdLst>
+              <a:gd name="T0" fmla="*/ 222 w 222"/>
+              <a:gd name="T1" fmla="*/ 0 h 129"/>
+              <a:gd name="T2" fmla="*/ 0 w 222"/>
+              <a:gd name="T3" fmla="*/ 129 h 129"/>
+            </a:gdLst>
+            <a:ahLst/>
+            <a:cxnLst>
+              <a:cxn ang="0">
+                <a:pos x="T0" y="T1"/>
+              </a:cxn>
+              <a:cxn ang="0">
+                <a:pos x="T2" y="T3"/>
+              </a:cxn>
+            </a:cxnLst>
+            <a:rect l="0" t="0" r="r" b="b"/>
+            <a:pathLst>
+              <a:path w="222" h="129">
+                <a:moveTo>
+                  <a:pt x="222" y="0"/>
+                </a:moveTo>
+                <a:cubicBezTo>
+                  <a:pt x="152" y="35"/>
+                  <a:pt x="76" y="78"/>
+                  <a:pt x="0" y="129"/>
+                </a:cubicBezTo>
+              </a:path>
+            </a:pathLst>
+          </a:custGeom>
+          <a:noFill/>
+          <a:ln w="9525" cap="flat">
+            <a:solidFill>
+              <a:schemeClr val="tx1">
+                <a:alpha val="20000"/>
+              </a:schemeClr>
+            </a:solidFill>
+            <a:prstDash val="solid"/>
+            <a:miter lim="800000"/>
+            <a:headEnd/>
+            <a:tailEnd/>
+          </a:ln>
+          <a:extLst>
+            <a:ext uri="{909E8E84-426E-40DD-AFC4-6F175D3DCCD1}">
+              <a14:hiddenFill xmlns:a14="http://schemas.microsoft.com/office/drawing/2010/main">
+                <a:solidFill>
+                  <a:srgbClr val="FFFFFF"/>
+                </a:solidFill>
+              </a14:hiddenFill>
+            </a:ext>
+          </a:extLst>
+        </p:spPr>
+        <p:txBody>
+          <a:bodyPr vert="horz" wrap="square" lIns="91440" tIns="45720" rIns="91440" bIns="45720" numCol="1" anchor="t" anchorCtr="0" compatLnSpc="1">
+            <a:prstTxWarp prst="textNoShape">
+              <a:avLst/>
+            </a:prstTxWarp>
+          </a:bodyPr>
+          <a:lstStyle/>
+          <a:p>
+            <a:endParaRPr lang="en-US"/>
+          </a:p>
+        </p:txBody>
+      </p:sp>
+      <p:sp>
+        <p:nvSpPr>
+          <p:cNvPr id="29" name="Freeform 14">
+            <a:extLst>
+              <a:ext uri="{FF2B5EF4-FFF2-40B4-BE49-F238E27FC236}">
+                <a16:creationId xmlns:a16="http://schemas.microsoft.com/office/drawing/2014/main" id="{89AFE9DD-0792-4B98-B4EB-97ACA17E6AA8}"/>
+              </a:ext>
+              <a:ext uri="{C183D7F6-B498-43B3-948B-1728B52AA6E4}">
+                <adec:decorative xmlns:adec="http://schemas.microsoft.com/office/drawing/2017/decorative" val="1"/>
+              </a:ext>
+            </a:extLst>
+          </p:cNvPr>
+          <p:cNvSpPr>
+            <a:spLocks noGrp="1" noRot="1" noChangeAspect="1" noMove="1" noResize="1" noEditPoints="1" noAdjustHandles="1" noChangeArrowheads="1" noChangeShapeType="1" noTextEdit="1"/>
+          </p:cNvSpPr>
+          <p:nvPr>
+            <p:extLst>
+              <p:ext uri="{386F3935-93C4-4BCD-93E2-E3B085C9AB24}">
+                <p16:designElem xmlns:p16="http://schemas.microsoft.com/office/powerpoint/2015/main" val="1"/>
+              </p:ext>
+            </p:extLst>
+          </p:nvPr>
+        </p:nvSpPr>
+        <p:spPr bwMode="auto">
+          <a:xfrm>
+            <a:off x="3701" y="-6705"/>
+            <a:ext cx="595313" cy="352734"/>
+          </a:xfrm>
+          <a:custGeom>
+            <a:avLst/>
+            <a:gdLst>
+              <a:gd name="T0" fmla="*/ 125 w 125"/>
+              <a:gd name="T1" fmla="*/ 0 h 74"/>
+              <a:gd name="T2" fmla="*/ 0 w 125"/>
+              <a:gd name="T3" fmla="*/ 74 h 74"/>
+            </a:gdLst>
+            <a:ahLst/>
+            <a:cxnLst>
+              <a:cxn ang="0">
+                <a:pos x="T0" y="T1"/>
+              </a:cxn>
+              <a:cxn ang="0">
+                <a:pos x="T2" y="T3"/>
+              </a:cxn>
+            </a:cxnLst>
+            <a:rect l="0" t="0" r="r" b="b"/>
+            <a:pathLst>
+              <a:path w="125" h="74">
+                <a:moveTo>
+                  <a:pt x="125" y="0"/>
+                </a:moveTo>
+                <a:cubicBezTo>
+                  <a:pt x="85" y="22"/>
+                  <a:pt x="43" y="47"/>
+                  <a:pt x="0" y="74"/>
+                </a:cubicBezTo>
+              </a:path>
+            </a:pathLst>
+          </a:custGeom>
+          <a:noFill/>
+          <a:ln w="9525" cap="flat">
+            <a:solidFill>
+              <a:schemeClr val="tx1">
+                <a:alpha val="20000"/>
+              </a:schemeClr>
+            </a:solidFill>
+            <a:prstDash val="dash"/>
+            <a:miter lim="800000"/>
+            <a:headEnd/>
+            <a:tailEnd/>
+          </a:ln>
+          <a:extLst>
+            <a:ext uri="{909E8E84-426E-40DD-AFC4-6F175D3DCCD1}">
+              <a14:hiddenFill xmlns:a14="http://schemas.microsoft.com/office/drawing/2010/main">
+                <a:solidFill>
+                  <a:srgbClr val="FFFFFF"/>
+                </a:solidFill>
+              </a14:hiddenFill>
+            </a:ext>
+          </a:extLst>
+        </p:spPr>
+        <p:txBody>
+          <a:bodyPr vert="horz" wrap="square" lIns="91440" tIns="45720" rIns="91440" bIns="45720" numCol="1" anchor="t" anchorCtr="0" compatLnSpc="1">
+            <a:prstTxWarp prst="textNoShape">
+              <a:avLst/>
+            </a:prstTxWarp>
+          </a:bodyPr>
+          <a:lstStyle/>
+          <a:p>
+            <a:endParaRPr lang="en-US"/>
+          </a:p>
+        </p:txBody>
+      </p:sp>
+      <p:sp>
+        <p:nvSpPr>
+          <p:cNvPr id="31" name="Freeform 16">
+            <a:extLst>
+              <a:ext uri="{FF2B5EF4-FFF2-40B4-BE49-F238E27FC236}">
+                <a16:creationId xmlns:a16="http://schemas.microsoft.com/office/drawing/2014/main" id="{3981F5C4-9AE1-404E-AF44-A4E6DB374F9D}"/>
+              </a:ext>
+              <a:ext uri="{C183D7F6-B498-43B3-948B-1728B52AA6E4}">
+                <adec:decorative xmlns:adec="http://schemas.microsoft.com/office/drawing/2017/decorative" val="1"/>
+              </a:ext>
+            </a:extLst>
+          </p:cNvPr>
+          <p:cNvSpPr>
+            <a:spLocks noGrp="1" noRot="1" noChangeAspect="1" noMove="1" noResize="1" noEditPoints="1" noAdjustHandles="1" noChangeArrowheads="1" noChangeShapeType="1" noTextEdit="1"/>
+          </p:cNvSpPr>
+          <p:nvPr>
+            <p:extLst>
+              <p:ext uri="{386F3935-93C4-4BCD-93E2-E3B085C9AB24}">
+                <p16:designElem xmlns:p16="http://schemas.microsoft.com/office/powerpoint/2015/main" val="1"/>
+              </p:ext>
+            </p:extLst>
+          </p:nvPr>
+        </p:nvSpPr>
+        <p:spPr bwMode="auto">
+          <a:xfrm>
+            <a:off x="-1061" y="-1916"/>
+            <a:ext cx="357188" cy="213875"/>
+          </a:xfrm>
+          <a:custGeom>
+            <a:avLst/>
+            <a:gdLst>
+              <a:gd name="T0" fmla="*/ 75 w 75"/>
+              <a:gd name="T1" fmla="*/ 0 h 45"/>
+              <a:gd name="T2" fmla="*/ 0 w 75"/>
+              <a:gd name="T3" fmla="*/ 45 h 45"/>
+            </a:gdLst>
+            <a:ahLst/>
+            <a:cxnLst>
+              <a:cxn ang="0">
+                <a:pos x="T0" y="T1"/>
+              </a:cxn>
+              <a:cxn ang="0">
+                <a:pos x="T2" y="T3"/>
+              </a:cxn>
+            </a:cxnLst>
+            <a:rect l="0" t="0" r="r" b="b"/>
+            <a:pathLst>
+              <a:path w="75" h="45">
+                <a:moveTo>
+                  <a:pt x="75" y="0"/>
+                </a:moveTo>
+                <a:cubicBezTo>
+                  <a:pt x="50" y="14"/>
+                  <a:pt x="25" y="29"/>
+                  <a:pt x="0" y="45"/>
+                </a:cubicBezTo>
+              </a:path>
+            </a:pathLst>
+          </a:custGeom>
+          <a:noFill/>
+          <a:ln w="12700" cap="flat">
+            <a:solidFill>
+              <a:schemeClr val="tx1">
+                <a:alpha val="20000"/>
+              </a:schemeClr>
+            </a:solidFill>
+            <a:prstDash val="dashDot"/>
+            <a:miter lim="800000"/>
+            <a:headEnd/>
+            <a:tailEnd/>
+          </a:ln>
+          <a:extLst>
+            <a:ext uri="{909E8E84-426E-40DD-AFC4-6F175D3DCCD1}">
+              <a14:hiddenFill xmlns:a14="http://schemas.microsoft.com/office/drawing/2010/main">
+                <a:solidFill>
+                  <a:srgbClr val="FFFFFF"/>
+                </a:solidFill>
+              </a14:hiddenFill>
+            </a:ext>
+          </a:extLst>
+        </p:spPr>
+        <p:txBody>
+          <a:bodyPr vert="horz" wrap="square" lIns="91440" tIns="45720" rIns="91440" bIns="45720" numCol="1" anchor="t" anchorCtr="0" compatLnSpc="1">
+            <a:prstTxWarp prst="textNoShape">
+              <a:avLst/>
+            </a:prstTxWarp>
+          </a:bodyPr>
+          <a:lstStyle/>
+          <a:p>
+            <a:endParaRPr lang="en-US"/>
+          </a:p>
+        </p:txBody>
+      </p:sp>
+      <p:sp>
+        <p:nvSpPr>
+          <p:cNvPr id="33" name="Freeform 11">
+            <a:extLst>
+              <a:ext uri="{FF2B5EF4-FFF2-40B4-BE49-F238E27FC236}">
+                <a16:creationId xmlns:a16="http://schemas.microsoft.com/office/drawing/2014/main" id="{763C1781-8726-4FAC-8C45-FF40376BE409}"/>
+              </a:ext>
+              <a:ext uri="{C183D7F6-B498-43B3-948B-1728B52AA6E4}">
+                <adec:decorative xmlns:adec="http://schemas.microsoft.com/office/drawing/2017/decorative" val="1"/>
+              </a:ext>
+            </a:extLst>
+          </p:cNvPr>
+          <p:cNvSpPr>
+            <a:spLocks noGrp="1" noRot="1" noChangeAspect="1" noMove="1" noResize="1" noEditPoints="1" noAdjustHandles="1" noChangeArrowheads="1" noChangeShapeType="1" noTextEdit="1"/>
+          </p:cNvSpPr>
+          <p:nvPr>
+            <p:extLst>
+              <p:ext uri="{386F3935-93C4-4BCD-93E2-E3B085C9AB24}">
+                <p16:designElem xmlns:p16="http://schemas.microsoft.com/office/powerpoint/2015/main" val="1"/>
+              </p:ext>
+            </p:extLst>
+          </p:nvPr>
+        </p:nvSpPr>
+        <p:spPr bwMode="auto">
+          <a:xfrm>
+            <a:off x="5426601" y="-1916"/>
+            <a:ext cx="5788025" cy="6847184"/>
+          </a:xfrm>
+          <a:custGeom>
+            <a:avLst/>
+            <a:gdLst>
+              <a:gd name="T0" fmla="*/ 1094 w 1216"/>
+              <a:gd name="T1" fmla="*/ 1436 h 1436"/>
+              <a:gd name="T2" fmla="*/ 709 w 1216"/>
+              <a:gd name="T3" fmla="*/ 551 h 1436"/>
+              <a:gd name="T4" fmla="*/ 0 w 1216"/>
+              <a:gd name="T5" fmla="*/ 0 h 1436"/>
+            </a:gdLst>
+            <a:ahLst/>
+            <a:cxnLst>
+              <a:cxn ang="0">
+                <a:pos x="T0" y="T1"/>
+              </a:cxn>
+              <a:cxn ang="0">
+                <a:pos x="T2" y="T3"/>
+              </a:cxn>
+              <a:cxn ang="0">
+                <a:pos x="T4" y="T5"/>
+              </a:cxn>
+            </a:cxnLst>
+            <a:rect l="0" t="0" r="r" b="b"/>
+            <a:pathLst>
+              <a:path w="1216" h="1436">
+                <a:moveTo>
+                  <a:pt x="1094" y="1436"/>
+                </a:moveTo>
+                <a:cubicBezTo>
+                  <a:pt x="1216" y="1114"/>
+                  <a:pt x="904" y="770"/>
+                  <a:pt x="709" y="551"/>
+                </a:cubicBezTo>
+                <a:cubicBezTo>
+                  <a:pt x="509" y="327"/>
+                  <a:pt x="274" y="127"/>
+                  <a:pt x="0" y="0"/>
+                </a:cubicBezTo>
+              </a:path>
+            </a:pathLst>
+          </a:custGeom>
+          <a:noFill/>
+          <a:ln w="9525" cap="flat">
+            <a:solidFill>
+              <a:schemeClr val="tx1">
+                <a:alpha val="20000"/>
+              </a:schemeClr>
+            </a:solidFill>
+            <a:prstDash val="solid"/>
+            <a:miter lim="800000"/>
+            <a:headEnd/>
+            <a:tailEnd/>
+          </a:ln>
+          <a:extLst>
+            <a:ext uri="{909E8E84-426E-40DD-AFC4-6F175D3DCCD1}">
+              <a14:hiddenFill xmlns:a14="http://schemas.microsoft.com/office/drawing/2010/main">
+                <a:solidFill>
+                  <a:srgbClr val="FFFFFF"/>
+                </a:solidFill>
+              </a14:hiddenFill>
+            </a:ext>
+          </a:extLst>
+        </p:spPr>
+        <p:txBody>
+          <a:bodyPr vert="horz" wrap="square" lIns="91440" tIns="45720" rIns="91440" bIns="45720" numCol="1" anchor="t" anchorCtr="0" compatLnSpc="1">
+            <a:prstTxWarp prst="textNoShape">
+              <a:avLst/>
+            </a:prstTxWarp>
+          </a:bodyPr>
+          <a:lstStyle/>
+          <a:p>
+            <a:endParaRPr lang="en-US"/>
+          </a:p>
+        </p:txBody>
+      </p:sp>
+      <p:sp>
+        <p:nvSpPr>
+          <p:cNvPr id="35" name="Freeform 21">
+            <a:extLst>
+              <a:ext uri="{FF2B5EF4-FFF2-40B4-BE49-F238E27FC236}">
+                <a16:creationId xmlns:a16="http://schemas.microsoft.com/office/drawing/2014/main" id="{301491B5-56C7-43DC-A3D9-861EECCA056A}"/>
+              </a:ext>
+              <a:ext uri="{C183D7F6-B498-43B3-948B-1728B52AA6E4}">
+                <adec:decorative xmlns:adec="http://schemas.microsoft.com/office/drawing/2017/decorative" val="1"/>
+              </a:ext>
+            </a:extLst>
+          </p:cNvPr>
+          <p:cNvSpPr>
+            <a:spLocks noGrp="1" noRot="1" noChangeAspect="1" noMove="1" noResize="1" noEditPoints="1" noAdjustHandles="1" noChangeArrowheads="1" noChangeShapeType="1" noTextEdit="1"/>
+          </p:cNvSpPr>
+          <p:nvPr>
+            <p:extLst>
+              <p:ext uri="{386F3935-93C4-4BCD-93E2-E3B085C9AB24}">
+                <p16:designElem xmlns:p16="http://schemas.microsoft.com/office/powerpoint/2015/main" val="1"/>
+              </p:ext>
+            </p:extLst>
+          </p:nvPr>
+        </p:nvSpPr>
+        <p:spPr bwMode="auto">
+          <a:xfrm>
+            <a:off x="9235014" y="2872"/>
+            <a:ext cx="2951163" cy="2555325"/>
+          </a:xfrm>
+          <a:custGeom>
+            <a:avLst/>
+            <a:gdLst>
+              <a:gd name="T0" fmla="*/ 620 w 620"/>
+              <a:gd name="T1" fmla="*/ 536 h 536"/>
+              <a:gd name="T2" fmla="*/ 0 w 620"/>
+              <a:gd name="T3" fmla="*/ 0 h 536"/>
+            </a:gdLst>
+            <a:ahLst/>
+            <a:cxnLst>
+              <a:cxn ang="0">
+                <a:pos x="T0" y="T1"/>
+              </a:cxn>
+              <a:cxn ang="0">
+                <a:pos x="T2" y="T3"/>
+              </a:cxn>
+            </a:cxnLst>
+            <a:rect l="0" t="0" r="r" b="b"/>
+            <a:pathLst>
+              <a:path w="620" h="536">
+                <a:moveTo>
+                  <a:pt x="620" y="536"/>
+                </a:moveTo>
+                <a:cubicBezTo>
+                  <a:pt x="404" y="314"/>
+                  <a:pt x="196" y="138"/>
+                  <a:pt x="0" y="0"/>
+                </a:cubicBezTo>
+              </a:path>
+            </a:pathLst>
+          </a:custGeom>
+          <a:noFill/>
+          <a:ln w="9525" cap="flat">
+            <a:solidFill>
+              <a:schemeClr val="tx1">
+                <a:alpha val="20000"/>
+              </a:schemeClr>
+            </a:solidFill>
+            <a:prstDash val="solid"/>
+            <a:miter lim="800000"/>
+            <a:headEnd/>
+            <a:tailEnd/>
+          </a:ln>
+          <a:extLst>
+            <a:ext uri="{909E8E84-426E-40DD-AFC4-6F175D3DCCD1}">
+              <a14:hiddenFill xmlns:a14="http://schemas.microsoft.com/office/drawing/2010/main">
+                <a:solidFill>
+                  <a:srgbClr val="FFFFFF"/>
+                </a:solidFill>
+              </a14:hiddenFill>
+            </a:ext>
+          </a:extLst>
+        </p:spPr>
+        <p:txBody>
+          <a:bodyPr vert="horz" wrap="square" lIns="91440" tIns="45720" rIns="91440" bIns="45720" numCol="1" anchor="t" anchorCtr="0" compatLnSpc="1">
+            <a:prstTxWarp prst="textNoShape">
+              <a:avLst/>
+            </a:prstTxWarp>
+          </a:bodyPr>
+          <a:lstStyle/>
+          <a:p>
+            <a:endParaRPr lang="en-US"/>
+          </a:p>
+        </p:txBody>
+      </p:sp>
+      <p:sp>
+        <p:nvSpPr>
+          <p:cNvPr id="2" name="Title 1">
+            <a:extLst>
+              <a:ext uri="{FF2B5EF4-FFF2-40B4-BE49-F238E27FC236}">
+                <a16:creationId xmlns:a16="http://schemas.microsoft.com/office/drawing/2014/main" id="{D1CAD71B-8A0D-4167-B114-8C9D3F9ED1D2}"/>
+              </a:ext>
+            </a:extLst>
+          </p:cNvPr>
+          <p:cNvSpPr>
+            <a:spLocks noGrp="1"/>
+          </p:cNvSpPr>
+          <p:nvPr>
+            <p:ph type="title"/>
+          </p:nvPr>
+        </p:nvSpPr>
+        <p:spPr>
+          <a:xfrm>
+            <a:off x="251351" y="214385"/>
+            <a:ext cx="11591607" cy="748561"/>
+          </a:xfrm>
+        </p:spPr>
+        <p:txBody>
+          <a:bodyPr vert="horz" lIns="91440" tIns="45720" rIns="91440" bIns="45720" rtlCol="0" anchor="b">
+            <a:normAutofit/>
+          </a:bodyPr>
+          <a:lstStyle/>
+          <a:p>
+            <a:r>
+              <a:rPr lang="en-US" sz="4000" dirty="0"/>
+              <a:t>Obj 3:  How has ordering changed during Covid?</a:t>
+            </a:r>
+          </a:p>
+        </p:txBody>
+      </p:sp>
+      <p:sp>
+        <p:nvSpPr>
+          <p:cNvPr id="37" name="Freeform 22">
+            <a:extLst>
+              <a:ext uri="{FF2B5EF4-FFF2-40B4-BE49-F238E27FC236}">
+                <a16:creationId xmlns:a16="http://schemas.microsoft.com/office/drawing/2014/main" id="{237E2353-22DF-46E0-A200-FB30F8F394E2}"/>
+              </a:ext>
+              <a:ext uri="{C183D7F6-B498-43B3-948B-1728B52AA6E4}">
+                <adec:decorative xmlns:adec="http://schemas.microsoft.com/office/drawing/2017/decorative" val="1"/>
+              </a:ext>
+            </a:extLst>
+          </p:cNvPr>
+          <p:cNvSpPr>
+            <a:spLocks noGrp="1" noRot="1" noChangeAspect="1" noMove="1" noResize="1" noEditPoints="1" noAdjustHandles="1" noChangeArrowheads="1" noChangeShapeType="1" noTextEdit="1"/>
+          </p:cNvSpPr>
+          <p:nvPr>
+            <p:extLst>
+              <p:ext uri="{386F3935-93C4-4BCD-93E2-E3B085C9AB24}">
+                <p16:designElem xmlns:p16="http://schemas.microsoft.com/office/powerpoint/2015/main" val="1"/>
+              </p:ext>
+            </p:extLst>
+          </p:nvPr>
+        </p:nvSpPr>
+        <p:spPr bwMode="auto">
+          <a:xfrm>
+            <a:off x="10020826" y="-1916"/>
+            <a:ext cx="2165350" cy="1358265"/>
+          </a:xfrm>
+          <a:custGeom>
+            <a:avLst/>
+            <a:gdLst>
+              <a:gd name="T0" fmla="*/ 0 w 455"/>
+              <a:gd name="T1" fmla="*/ 0 h 285"/>
+              <a:gd name="T2" fmla="*/ 455 w 455"/>
+              <a:gd name="T3" fmla="*/ 285 h 285"/>
+            </a:gdLst>
+            <a:ahLst/>
+            <a:cxnLst>
+              <a:cxn ang="0">
+                <a:pos x="T0" y="T1"/>
+              </a:cxn>
+              <a:cxn ang="0">
+                <a:pos x="T2" y="T3"/>
+              </a:cxn>
+            </a:cxnLst>
+            <a:rect l="0" t="0" r="r" b="b"/>
+            <a:pathLst>
+              <a:path w="455" h="285">
+                <a:moveTo>
+                  <a:pt x="0" y="0"/>
+                </a:moveTo>
+                <a:cubicBezTo>
+                  <a:pt x="153" y="85"/>
+                  <a:pt x="308" y="180"/>
+                  <a:pt x="455" y="285"/>
+                </a:cubicBezTo>
+              </a:path>
+            </a:pathLst>
+          </a:custGeom>
+          <a:noFill/>
+          <a:ln w="9525" cap="flat">
+            <a:solidFill>
+              <a:schemeClr val="tx1">
+                <a:alpha val="20000"/>
+              </a:schemeClr>
+            </a:solidFill>
+            <a:prstDash val="dash"/>
+            <a:miter lim="800000"/>
+            <a:headEnd/>
+            <a:tailEnd/>
+          </a:ln>
+          <a:extLst>
+            <a:ext uri="{909E8E84-426E-40DD-AFC4-6F175D3DCCD1}">
+              <a14:hiddenFill xmlns:a14="http://schemas.microsoft.com/office/drawing/2010/main">
+                <a:solidFill>
+                  <a:srgbClr val="FFFFFF"/>
+                </a:solidFill>
+              </a14:hiddenFill>
+            </a:ext>
+          </a:extLst>
+        </p:spPr>
+        <p:txBody>
+          <a:bodyPr vert="horz" wrap="square" lIns="91440" tIns="45720" rIns="91440" bIns="45720" numCol="1" anchor="t" anchorCtr="0" compatLnSpc="1">
+            <a:prstTxWarp prst="textNoShape">
+              <a:avLst/>
+            </a:prstTxWarp>
+          </a:bodyPr>
+          <a:lstStyle/>
+          <a:p>
+            <a:endParaRPr lang="en-US"/>
+          </a:p>
+        </p:txBody>
+      </p:sp>
+      <p:sp>
+        <p:nvSpPr>
+          <p:cNvPr id="39" name="Freeform 23">
+            <a:extLst>
+              <a:ext uri="{FF2B5EF4-FFF2-40B4-BE49-F238E27FC236}">
+                <a16:creationId xmlns:a16="http://schemas.microsoft.com/office/drawing/2014/main" id="{DD6138DB-057B-45F7-A5F4-E7BFDA20D02C}"/>
+              </a:ext>
+              <a:ext uri="{C183D7F6-B498-43B3-948B-1728B52AA6E4}">
+                <adec:decorative xmlns:adec="http://schemas.microsoft.com/office/drawing/2017/decorative" val="1"/>
+              </a:ext>
+            </a:extLst>
+          </p:cNvPr>
+          <p:cNvSpPr>
+            <a:spLocks noGrp="1" noRot="1" noChangeAspect="1" noMove="1" noResize="1" noEditPoints="1" noAdjustHandles="1" noChangeArrowheads="1" noChangeShapeType="1" noTextEdit="1"/>
+          </p:cNvSpPr>
+          <p:nvPr>
+            <p:extLst>
+              <p:ext uri="{386F3935-93C4-4BCD-93E2-E3B085C9AB24}">
+                <p16:designElem xmlns:p16="http://schemas.microsoft.com/office/powerpoint/2015/main" val="1"/>
+              </p:ext>
+            </p:extLst>
+          </p:nvPr>
+        </p:nvSpPr>
+        <p:spPr bwMode="auto">
+          <a:xfrm>
+            <a:off x="11290826" y="-1916"/>
+            <a:ext cx="895350" cy="534687"/>
+          </a:xfrm>
+          <a:custGeom>
+            <a:avLst/>
+            <a:gdLst>
+              <a:gd name="T0" fmla="*/ 0 w 188"/>
+              <a:gd name="T1" fmla="*/ 0 h 112"/>
+              <a:gd name="T2" fmla="*/ 188 w 188"/>
+              <a:gd name="T3" fmla="*/ 112 h 112"/>
+            </a:gdLst>
+            <a:ahLst/>
+            <a:cxnLst>
+              <a:cxn ang="0">
+                <a:pos x="T0" y="T1"/>
+              </a:cxn>
+              <a:cxn ang="0">
+                <a:pos x="T2" y="T3"/>
+              </a:cxn>
+            </a:cxnLst>
+            <a:rect l="0" t="0" r="r" b="b"/>
+            <a:pathLst>
+              <a:path w="188" h="112">
+                <a:moveTo>
+                  <a:pt x="0" y="0"/>
+                </a:moveTo>
+                <a:cubicBezTo>
+                  <a:pt x="63" y="36"/>
+                  <a:pt x="126" y="73"/>
+                  <a:pt x="188" y="112"/>
+                </a:cubicBezTo>
+              </a:path>
+            </a:pathLst>
+          </a:custGeom>
+          <a:noFill/>
+          <a:ln w="9525" cap="flat">
+            <a:solidFill>
+              <a:schemeClr val="tx1">
+                <a:alpha val="20000"/>
+              </a:schemeClr>
+            </a:solidFill>
+            <a:prstDash val="solid"/>
+            <a:miter lim="800000"/>
+            <a:headEnd/>
+            <a:tailEnd/>
+          </a:ln>
+          <a:extLst>
+            <a:ext uri="{909E8E84-426E-40DD-AFC4-6F175D3DCCD1}">
+              <a14:hiddenFill xmlns:a14="http://schemas.microsoft.com/office/drawing/2010/main">
+                <a:solidFill>
+                  <a:srgbClr val="FFFFFF"/>
+                </a:solidFill>
+              </a14:hiddenFill>
+            </a:ext>
+          </a:extLst>
+        </p:spPr>
+        <p:txBody>
+          <a:bodyPr vert="horz" wrap="square" lIns="91440" tIns="45720" rIns="91440" bIns="45720" numCol="1" anchor="t" anchorCtr="0" compatLnSpc="1">
+            <a:prstTxWarp prst="textNoShape">
+              <a:avLst/>
+            </a:prstTxWarp>
+          </a:bodyPr>
+          <a:lstStyle/>
+          <a:p>
+            <a:endParaRPr lang="en-US"/>
+          </a:p>
+        </p:txBody>
+      </p:sp>
+      <p:sp>
+        <p:nvSpPr>
+          <p:cNvPr id="41" name="Freeform: Shape 40">
+            <a:extLst>
+              <a:ext uri="{FF2B5EF4-FFF2-40B4-BE49-F238E27FC236}">
+                <a16:creationId xmlns:a16="http://schemas.microsoft.com/office/drawing/2014/main" id="{79A54AB1-B64F-4843-BFAB-81CB74E66B65}"/>
+              </a:ext>
+              <a:ext uri="{C183D7F6-B498-43B3-948B-1728B52AA6E4}">
+                <adec:decorative xmlns:adec="http://schemas.microsoft.com/office/drawing/2017/decorative" val="1"/>
+              </a:ext>
+            </a:extLst>
+          </p:cNvPr>
+          <p:cNvSpPr>
+            <a:spLocks noGrp="1" noRot="1" noChangeAspect="1" noMove="1" noResize="1" noEditPoints="1" noAdjustHandles="1" noChangeArrowheads="1" noChangeShapeType="1" noTextEdit="1"/>
+          </p:cNvSpPr>
+          <p:nvPr>
+            <p:extLst>
+              <p:ext uri="{386F3935-93C4-4BCD-93E2-E3B085C9AB24}">
+                <p16:designElem xmlns:p16="http://schemas.microsoft.com/office/powerpoint/2015/main" val="1"/>
+              </p:ext>
+            </p:extLst>
+          </p:nvPr>
+        </p:nvSpPr>
+        <p:spPr>
+          <a:xfrm rot="20931529">
+            <a:off x="752078" y="2218040"/>
+            <a:ext cx="4418757" cy="4259609"/>
+          </a:xfrm>
+          <a:custGeom>
+            <a:avLst/>
+            <a:gdLst>
+              <a:gd name="connsiteX0" fmla="*/ 404107 w 4507111"/>
+              <a:gd name="connsiteY0" fmla="*/ 0 h 4344781"/>
+              <a:gd name="connsiteX1" fmla="*/ 371857 w 4507111"/>
+              <a:gd name="connsiteY1" fmla="*/ 117359 h 4344781"/>
+              <a:gd name="connsiteX2" fmla="*/ 307833 w 4507111"/>
+              <a:gd name="connsiteY2" fmla="*/ 632970 h 4344781"/>
+              <a:gd name="connsiteX3" fmla="*/ 3569418 w 4507111"/>
+              <a:gd name="connsiteY3" fmla="*/ 4141149 h 4344781"/>
+              <a:gd name="connsiteX4" fmla="*/ 4440861 w 4507111"/>
+              <a:gd name="connsiteY4" fmla="*/ 4332480 h 4344781"/>
+              <a:gd name="connsiteX5" fmla="*/ 4507111 w 4507111"/>
+              <a:gd name="connsiteY5" fmla="*/ 4341752 h 4344781"/>
+              <a:gd name="connsiteX6" fmla="*/ 4296045 w 4507111"/>
+              <a:gd name="connsiteY6" fmla="*/ 4344781 h 4344781"/>
+              <a:gd name="connsiteX7" fmla="*/ 3749565 w 4507111"/>
+              <a:gd name="connsiteY7" fmla="*/ 4321853 h 4344781"/>
+              <a:gd name="connsiteX8" fmla="*/ 36764 w 4507111"/>
+              <a:gd name="connsiteY8" fmla="*/ 1629794 h 4344781"/>
+              <a:gd name="connsiteX9" fmla="*/ 300069 w 4507111"/>
+              <a:gd name="connsiteY9" fmla="*/ 144750 h 4344781"/>
+            </a:gdLst>
+            <a:ahLst/>
+            <a:cxnLst>
+              <a:cxn ang="0">
+                <a:pos x="connsiteX0" y="connsiteY0"/>
+              </a:cxn>
+              <a:cxn ang="0">
+                <a:pos x="connsiteX1" y="connsiteY1"/>
+              </a:cxn>
+              <a:cxn ang="0">
+                <a:pos x="connsiteX2" y="connsiteY2"/>
+              </a:cxn>
+              <a:cxn ang="0">
+                <a:pos x="connsiteX3" y="connsiteY3"/>
+              </a:cxn>
+              <a:cxn ang="0">
+                <a:pos x="connsiteX4" y="connsiteY4"/>
+              </a:cxn>
+              <a:cxn ang="0">
+                <a:pos x="connsiteX5" y="connsiteY5"/>
+              </a:cxn>
+              <a:cxn ang="0">
+                <a:pos x="connsiteX6" y="connsiteY6"/>
+              </a:cxn>
+              <a:cxn ang="0">
+                <a:pos x="connsiteX7" y="connsiteY7"/>
+              </a:cxn>
+              <a:cxn ang="0">
+                <a:pos x="connsiteX8" y="connsiteY8"/>
+              </a:cxn>
+              <a:cxn ang="0">
+                <a:pos x="connsiteX9" y="connsiteY9"/>
+              </a:cxn>
+            </a:cxnLst>
+            <a:rect l="l" t="t" r="r" b="b"/>
+            <a:pathLst>
+              <a:path w="4507111" h="4344781">
+                <a:moveTo>
+                  <a:pt x="404107" y="0"/>
+                </a:moveTo>
+                <a:lnTo>
+                  <a:pt x="371857" y="117359"/>
+                </a:lnTo>
+                <a:cubicBezTo>
+                  <a:pt x="333827" y="278567"/>
+                  <a:pt x="311875" y="450459"/>
+                  <a:pt x="307833" y="632970"/>
+                </a:cubicBezTo>
+                <a:cubicBezTo>
+                  <a:pt x="264711" y="2579752"/>
+                  <a:pt x="2253987" y="3769243"/>
+                  <a:pt x="3569418" y="4141149"/>
+                </a:cubicBezTo>
+                <a:cubicBezTo>
+                  <a:pt x="3816061" y="4210881"/>
+                  <a:pt x="4114807" y="4279754"/>
+                  <a:pt x="4440861" y="4332480"/>
+                </a:cubicBezTo>
+                <a:lnTo>
+                  <a:pt x="4507111" y="4341752"/>
+                </a:lnTo>
+                <a:lnTo>
+                  <a:pt x="4296045" y="4344781"/>
+                </a:lnTo>
+                <a:cubicBezTo>
+                  <a:pt x="4097363" y="4343711"/>
+                  <a:pt x="3912623" y="4335104"/>
+                  <a:pt x="3749565" y="4321853"/>
+                </a:cubicBezTo>
+                <a:cubicBezTo>
+                  <a:pt x="2445102" y="4215850"/>
+                  <a:pt x="356405" y="3466499"/>
+                  <a:pt x="36764" y="1629794"/>
+                </a:cubicBezTo>
+                <a:cubicBezTo>
+                  <a:pt x="-63123" y="1055823"/>
+                  <a:pt x="45741" y="555869"/>
+                  <a:pt x="300069" y="144750"/>
+                </a:cubicBezTo>
+                <a:close/>
+              </a:path>
+            </a:pathLst>
+          </a:custGeom>
+          <a:solidFill>
+            <a:schemeClr val="tx1">
+              <a:alpha val="70000"/>
+            </a:schemeClr>
+          </a:solidFill>
+          <a:ln>
+            <a:noFill/>
+          </a:ln>
+        </p:spPr>
+        <p:style>
+          <a:lnRef idx="2">
+            <a:schemeClr val="accent1">
+              <a:shade val="50000"/>
+            </a:schemeClr>
+          </a:lnRef>
+          <a:fillRef idx="1">
+            <a:schemeClr val="accent1"/>
+          </a:fillRef>
+          <a:effectRef idx="0">
+            <a:schemeClr val="accent1"/>
+          </a:effectRef>
+          <a:fontRef idx="minor">
+            <a:schemeClr val="lt1"/>
+          </a:fontRef>
+        </p:style>
+        <p:txBody>
+          <a:bodyPr wrap="square" rtlCol="0" anchor="ctr">
+            <a:noAutofit/>
+          </a:bodyPr>
+          <a:lstStyle/>
+          <a:p>
+            <a:pPr marL="0" marR="0" lvl="0" indent="0" algn="ctr" defTabSz="457200" rtl="0" eaLnBrk="1" fontAlgn="auto" latinLnBrk="0" hangingPunct="1">
+              <a:lnSpc>
+                <a:spcPct val="100000"/>
+              </a:lnSpc>
+              <a:spcBef>
+                <a:spcPts val="0"/>
+              </a:spcBef>
+              <a:spcAft>
+                <a:spcPts val="0"/>
+              </a:spcAft>
+              <a:buClrTx/>
+              <a:buSzTx/>
+              <a:buFontTx/>
+              <a:buNone/>
+              <a:tabLst/>
+              <a:defRPr/>
+            </a:pPr>
+            <a:endParaRPr kumimoji="0" lang="en-US" sz="1800" b="0" i="0" u="none" strike="noStrike" kern="1200" cap="none" spc="0" normalizeH="0" baseline="0" noProof="0">
+              <a:ln>
+                <a:noFill/>
+              </a:ln>
+              <a:solidFill>
+                <a:prstClr val="white"/>
+              </a:solidFill>
+              <a:effectLst/>
+              <a:uLnTx/>
+              <a:uFillTx/>
+              <a:latin typeface="Rockwell" panose="02060603020205020403"/>
+              <a:ea typeface="+mn-ea"/>
+              <a:cs typeface="+mn-cs"/>
+            </a:endParaRPr>
+          </a:p>
+        </p:txBody>
+      </p:sp>
+      <p:pic>
+        <p:nvPicPr>
+          <p:cNvPr id="7" name="Content Placeholder 6" descr="A hamburger on a plate&#10;&#10;Description automatically generated with low confidence">
+            <a:extLst>
+              <a:ext uri="{FF2B5EF4-FFF2-40B4-BE49-F238E27FC236}">
+                <a16:creationId xmlns:a16="http://schemas.microsoft.com/office/drawing/2014/main" id="{3AACC0DC-68F9-4C1D-8808-B5923ED94969}"/>
+              </a:ext>
+            </a:extLst>
+          </p:cNvPr>
+          <p:cNvPicPr>
+            <a:picLocks noGrp="1" noChangeAspect="1"/>
+          </p:cNvPicPr>
+          <p:nvPr>
+            <p:ph idx="1"/>
+          </p:nvPr>
+        </p:nvPicPr>
+        <p:blipFill>
+          <a:blip r:embed="rId2">
+            <a:extLst>
+              <a:ext uri="{28A0092B-C50C-407E-A947-70E740481C1C}">
+                <a14:useLocalDpi xmlns:a14="http://schemas.microsoft.com/office/drawing/2010/main" val="0"/>
+              </a:ext>
+            </a:extLst>
+          </a:blip>
+          <a:stretch>
+            <a:fillRect/>
+          </a:stretch>
+        </p:blipFill>
+        <p:spPr>
+          <a:xfrm>
+            <a:off x="1617394" y="1827413"/>
+            <a:ext cx="4351338" cy="4351338"/>
+          </a:xfrm>
+        </p:spPr>
+      </p:pic>
+    </p:spTree>
+    <p:extLst>
+      <p:ext uri="{BB962C8B-B14F-4D97-AF65-F5344CB8AC3E}">
+        <p14:creationId xmlns:p14="http://schemas.microsoft.com/office/powerpoint/2010/main" val="3304196944"/>
+      </p:ext>
+    </p:extLst>
+  </p:cSld>
+  <p:clrMapOvr>
+    <a:masterClrMapping/>
+  </p:clrMapOvr>
+</p:sld>
+</file>
+
+<file path=ppt/slides/slide11.xml><?xml version="1.0" encoding="utf-8"?>
 <p:sld xmlns:a="http://schemas.openxmlformats.org/drawingml/2006/main" xmlns:r="http://schemas.openxmlformats.org/officeDocument/2006/relationships" xmlns:p="http://schemas.openxmlformats.org/presentationml/2006/main">
   <p:cSld>
     <p:bg>
@@ -3906,7 +5601,7 @@
 </p:sld>
 </file>
 
-<file path=ppt/slides/slide11.xml><?xml version="1.0" encoding="utf-8"?>
+<file path=ppt/slides/slide12.xml><?xml version="1.0" encoding="utf-8"?>
 <p:sld xmlns:a="http://schemas.openxmlformats.org/drawingml/2006/main" xmlns:r="http://schemas.openxmlformats.org/officeDocument/2006/relationships" xmlns:p="http://schemas.openxmlformats.org/presentationml/2006/main">
   <p:cSld>
     <p:spTree>
@@ -4007,7 +5702,7 @@
 </p:sld>
 </file>
 
-<file path=ppt/slides/slide12.xml><?xml version="1.0" encoding="utf-8"?>
+<file path=ppt/slides/slide13.xml><?xml version="1.0" encoding="utf-8"?>
 <p:sld xmlns:a="http://schemas.openxmlformats.org/drawingml/2006/main" xmlns:r="http://schemas.openxmlformats.org/officeDocument/2006/relationships" xmlns:p="http://schemas.openxmlformats.org/presentationml/2006/main">
   <p:cSld>
     <p:bg>
@@ -4527,13 +6222,13 @@
         </p:nvSpPr>
         <p:spPr>
           <a:xfrm>
-            <a:off x="6688181" y="1907922"/>
-            <a:ext cx="4887685" cy="3210179"/>
+            <a:off x="6688181" y="1739900"/>
+            <a:ext cx="4887685" cy="3700780"/>
           </a:xfrm>
         </p:spPr>
         <p:txBody>
           <a:bodyPr vert="horz" lIns="91440" tIns="45720" rIns="91440" bIns="45720" rtlCol="0" anchor="t">
-            <a:normAutofit/>
+            <a:normAutofit fontScale="92500" lnSpcReduction="20000"/>
           </a:bodyPr>
           <a:lstStyle/>
           <a:p>
@@ -4543,7 +6238,7 @@
             </a:pPr>
             <a:r>
               <a:rPr lang="en-US" sz="2400" dirty="0"/>
-              <a:t>BS in Exercise Science</a:t>
+              <a:t>Born and raised in Charleston, South Carolina</a:t>
             </a:r>
           </a:p>
           <a:p>
@@ -4553,7 +6248,7 @@
             </a:pPr>
             <a:r>
               <a:rPr lang="en-US" sz="2400" dirty="0"/>
-              <a:t>Director of Hospitality at Chick-fil-A</a:t>
+              <a:t>Graduated with a BS in Exercise Science from College of Charleston in 2017</a:t>
             </a:r>
           </a:p>
           <a:p>
@@ -4563,7 +6258,27 @@
             </a:pPr>
             <a:r>
               <a:rPr lang="en-US" sz="2400" dirty="0"/>
-              <a:t>Working in Chick-fil-A since 2016</a:t>
+              <a:t>Married to my wife Kelsey in November 2017</a:t>
+            </a:r>
+          </a:p>
+          <a:p>
+            <a:pPr indent="-228600">
+              <a:buFont typeface="Arial" panose="020B0604020202020204" pitchFamily="34" charset="0"/>
+              <a:buChar char="•"/>
+            </a:pPr>
+            <a:r>
+              <a:rPr lang="en-US" sz="2400" dirty="0"/>
+              <a:t>Working at Chick-fil-A since 2016</a:t>
+            </a:r>
+          </a:p>
+          <a:p>
+            <a:pPr indent="-228600">
+              <a:buFont typeface="Arial" panose="020B0604020202020204" pitchFamily="34" charset="0"/>
+              <a:buChar char="•"/>
+            </a:pPr>
+            <a:r>
+              <a:rPr lang="en-US" sz="2400" dirty="0"/>
+              <a:t>Director of Hospitality, Kitchen Director, Scheduling, Inventory</a:t>
             </a:r>
           </a:p>
           <a:p>
@@ -5018,7 +6733,7 @@
         </p:blipFill>
         <p:spPr>
           <a:xfrm>
-            <a:off x="1" y="0"/>
+            <a:off x="-3049" y="10"/>
             <a:ext cx="12191999" cy="6857990"/>
           </a:xfrm>
           <a:prstGeom prst="rect">
@@ -5198,7 +6913,7 @@
         <p:spPr>
           <a:xfrm>
             <a:off x="4053017" y="2108738"/>
-            <a:ext cx="6801982" cy="2265406"/>
+            <a:ext cx="6801982" cy="2249506"/>
           </a:xfrm>
           <a:prstGeom prst="rect">
             <a:avLst/>
@@ -5213,7 +6928,7 @@
         </p:spPr>
         <p:txBody>
           <a:bodyPr vert="horz" lIns="91440" tIns="45720" rIns="91440" bIns="45720" rtlCol="0" anchor="b">
-            <a:normAutofit/>
+            <a:normAutofit lnSpcReduction="10000"/>
           </a:bodyPr>
           <a:lstStyle>
             <a:lvl1pPr algn="ctr" defTabSz="914400" rtl="0" eaLnBrk="1" latinLnBrk="0" hangingPunct="1">
@@ -5243,7 +6958,7 @@
                 <a:latin typeface="Helvetica" panose="020B0604020202020204" pitchFamily="34" charset="0"/>
                 <a:ea typeface="Times New Roman" panose="02020603050405020304" pitchFamily="18" charset="0"/>
               </a:rPr>
-              <a:t>How successful has CFA evolved to fit the new norm of drive-thru only?</a:t>
+              <a:t>How has CFA evolved to fit the new norm of drive-thru only?</a:t>
             </a:r>
           </a:p>
           <a:p>
@@ -5262,7 +6977,7 @@
                 </a:solidFill>
                 <a:latin typeface="Helvetica" panose="020B0604020202020204" pitchFamily="34" charset="0"/>
               </a:rPr>
-              <a:t>How have labor cost been affected by Covid?</a:t>
+              <a:t>How has labor been affected by Covid?</a:t>
             </a:r>
           </a:p>
           <a:p>
@@ -5281,7 +6996,7 @@
                 </a:solidFill>
                 <a:latin typeface="Helvetica" panose="020B0604020202020204" pitchFamily="34" charset="0"/>
               </a:rPr>
-              <a:t>How has ordering changed during Covid?</a:t>
+              <a:t>How has the way guests order changed during Covid?</a:t>
             </a:r>
             <a:endParaRPr lang="en-US" sz="2400" b="1" i="1" dirty="0">
               <a:solidFill>
@@ -5418,8 +7133,8 @@
         </p:nvSpPr>
         <p:spPr>
           <a:xfrm>
-            <a:off x="838200" y="631825"/>
-            <a:ext cx="10515600" cy="1325563"/>
+            <a:off x="838200" y="928838"/>
+            <a:ext cx="10515600" cy="1028549"/>
           </a:xfrm>
         </p:spPr>
         <p:txBody>
@@ -5434,7 +7149,7 @@
                   <a:schemeClr val="bg1"/>
                 </a:solidFill>
               </a:rPr>
-              <a:t>Methods of Analysis used for this project:</a:t>
+              <a:t>Methods of Analysis:</a:t>
             </a:r>
           </a:p>
         </p:txBody>
@@ -5525,10 +7240,26 @@
                   <a:schemeClr val="bg1"/>
                 </a:solidFill>
               </a:rPr>
-              <a:t>Objective 1 – We used an ANOVA analysis and the following variables: Sales, NormDT, 3rdParty and Time.</a:t>
-            </a:r>
-          </a:p>
-          <a:p>
+              <a:t>Gathered data from the Sales Activity from November 2019 through November 2020. </a:t>
+            </a:r>
+          </a:p>
+          <a:p>
+            <a:r>
+              <a:rPr lang="en-US" sz="2400" dirty="0">
+                <a:solidFill>
+                  <a:schemeClr val="bg1"/>
+                </a:solidFill>
+              </a:rPr>
+              <a:t>Added Productivity column: Sales divided by </a:t>
+            </a:r>
+            <a:r>
+              <a:rPr lang="en-US" sz="2400" dirty="0" err="1">
+                <a:solidFill>
+                  <a:schemeClr val="bg1"/>
+                </a:solidFill>
+              </a:rPr>
+              <a:t>HoursUsed</a:t>
+            </a:r>
             <a:endParaRPr lang="en-US" sz="2400" dirty="0">
               <a:solidFill>
                 <a:schemeClr val="bg1"/>
@@ -5542,32 +7273,55 @@
                   <a:schemeClr val="bg1"/>
                 </a:solidFill>
               </a:rPr>
-              <a:t>Objective 2 – We used a linear regression analysis using the variables Productivity and Time.</a:t>
-            </a:r>
-          </a:p>
-          <a:p>
-            <a:endParaRPr lang="en-US" sz="2400" dirty="0">
-              <a:solidFill>
-                <a:schemeClr val="bg1"/>
-              </a:solidFill>
-            </a:endParaRPr>
-          </a:p>
-          <a:p>
+              <a:t>Added </a:t>
+            </a:r>
+            <a:r>
+              <a:rPr lang="en-US" sz="2400" dirty="0" err="1">
+                <a:solidFill>
+                  <a:schemeClr val="bg1"/>
+                </a:solidFill>
+              </a:rPr>
+              <a:t>WeekNum</a:t>
+            </a:r>
             <a:r>
               <a:rPr lang="en-US" sz="2400" dirty="0">
                 <a:solidFill>
                   <a:schemeClr val="bg1"/>
                 </a:solidFill>
               </a:rPr>
-              <a:t>Objective 3 – We used a MANOVA analysis and looked at the following variables: MobCO, MobDI, DineIn, Catering, CarryO, NormDT, 3rdParty, and Time.</a:t>
-            </a:r>
-          </a:p>
-          <a:p>
-            <a:endParaRPr lang="en-US" sz="2400" dirty="0">
-              <a:solidFill>
-                <a:schemeClr val="bg1"/>
-              </a:solidFill>
-            </a:endParaRPr>
+              <a:t> column: Actual week of the year, where 1 is the first week of January.</a:t>
+            </a:r>
+          </a:p>
+          <a:p>
+            <a:pPr lvl="1"/>
+            <a:r>
+              <a:rPr lang="en-US" sz="2000" dirty="0">
+                <a:solidFill>
+                  <a:schemeClr val="bg1"/>
+                </a:solidFill>
+              </a:rPr>
+              <a:t>Different from the “Week” column where 1 is the first week accounted for. </a:t>
+            </a:r>
+          </a:p>
+          <a:p>
+            <a:r>
+              <a:rPr lang="en-US" sz="2400" dirty="0">
+                <a:solidFill>
+                  <a:schemeClr val="bg1"/>
+                </a:solidFill>
+              </a:rPr>
+              <a:t>Added Time column: Before (pre-lockdown), During (lockdown) and After (post-lockdown)</a:t>
+            </a:r>
+          </a:p>
+          <a:p>
+            <a:r>
+              <a:rPr lang="en-US" sz="2400" dirty="0">
+                <a:solidFill>
+                  <a:schemeClr val="bg1"/>
+                </a:solidFill>
+              </a:rPr>
+              <a:t>The dataset has a sample size of 52 weeks.</a:t>
+            </a:r>
           </a:p>
           <a:p>
             <a:endParaRPr lang="en-US" sz="2400" dirty="0">
@@ -5592,6 +7346,354 @@
 </file>
 
 <file path=ppt/slides/slide6.xml><?xml version="1.0" encoding="utf-8"?>
+<p:sld xmlns:a="http://schemas.openxmlformats.org/drawingml/2006/main" xmlns:r="http://schemas.openxmlformats.org/officeDocument/2006/relationships" xmlns:p="http://schemas.openxmlformats.org/presentationml/2006/main">
+  <p:cSld>
+    <p:bg>
+      <p:bgPr>
+        <a:solidFill>
+          <a:schemeClr val="bg1"/>
+        </a:solidFill>
+        <a:effectLst/>
+      </p:bgPr>
+    </p:bg>
+    <p:spTree>
+      <p:nvGrpSpPr>
+        <p:cNvPr id="1" name=""/>
+        <p:cNvGrpSpPr/>
+        <p:nvPr/>
+      </p:nvGrpSpPr>
+      <p:grpSpPr>
+        <a:xfrm>
+          <a:off x="0" y="0"/>
+          <a:ext cx="0" cy="0"/>
+          <a:chOff x="0" y="0"/>
+          <a:chExt cx="0" cy="0"/>
+        </a:xfrm>
+      </p:grpSpPr>
+      <p:sp>
+        <p:nvSpPr>
+          <p:cNvPr id="12" name="Rectangle 7">
+            <a:extLst>
+              <a:ext uri="{FF2B5EF4-FFF2-40B4-BE49-F238E27FC236}">
+                <a16:creationId xmlns:a16="http://schemas.microsoft.com/office/drawing/2014/main" id="{F98ED85F-DCEE-4B50-802E-71A6E3E12B04}"/>
+              </a:ext>
+              <a:ext uri="{C183D7F6-B498-43B3-948B-1728B52AA6E4}">
+                <adec:decorative xmlns:adec="http://schemas.microsoft.com/office/drawing/2017/decorative" val="1"/>
+              </a:ext>
+            </a:extLst>
+          </p:cNvPr>
+          <p:cNvSpPr>
+            <a:spLocks noGrp="1" noRot="1" noChangeAspect="1" noMove="1" noResize="1" noEditPoints="1" noAdjustHandles="1" noChangeArrowheads="1" noChangeShapeType="1" noTextEdit="1"/>
+          </p:cNvSpPr>
+          <p:nvPr>
+            <p:extLst>
+              <p:ext uri="{386F3935-93C4-4BCD-93E2-E3B085C9AB24}">
+                <p16:designElem xmlns:p16="http://schemas.microsoft.com/office/powerpoint/2015/main" val="1"/>
+              </p:ext>
+            </p:extLst>
+          </p:nvPr>
+        </p:nvSpPr>
+        <p:spPr bwMode="ltGray">
+          <a:xfrm>
+            <a:off x="321564" y="320040"/>
+            <a:ext cx="11548872" cy="6217920"/>
+          </a:xfrm>
+          <a:prstGeom prst="rect">
+            <a:avLst/>
+          </a:prstGeom>
+          <a:solidFill>
+            <a:schemeClr val="tx1">
+              <a:lumMod val="75000"/>
+              <a:lumOff val="25000"/>
+            </a:schemeClr>
+          </a:solidFill>
+          <a:ln w="127000" cap="sq" cmpd="thinThick">
+            <a:solidFill>
+              <a:schemeClr val="tx1">
+                <a:lumMod val="75000"/>
+                <a:lumOff val="25000"/>
+              </a:schemeClr>
+            </a:solidFill>
+          </a:ln>
+        </p:spPr>
+        <p:style>
+          <a:lnRef idx="2">
+            <a:schemeClr val="accent1">
+              <a:shade val="50000"/>
+            </a:schemeClr>
+          </a:lnRef>
+          <a:fillRef idx="1">
+            <a:schemeClr val="accent1"/>
+          </a:fillRef>
+          <a:effectRef idx="0">
+            <a:schemeClr val="accent1"/>
+          </a:effectRef>
+          <a:fontRef idx="minor">
+            <a:schemeClr val="lt1"/>
+          </a:fontRef>
+        </p:style>
+        <p:txBody>
+          <a:bodyPr rtlCol="0" anchor="ctr"/>
+          <a:lstStyle/>
+          <a:p>
+            <a:pPr algn="ctr"/>
+            <a:endParaRPr lang="en-US"/>
+          </a:p>
+        </p:txBody>
+      </p:sp>
+      <p:sp>
+        <p:nvSpPr>
+          <p:cNvPr id="2" name="Title 1">
+            <a:extLst>
+              <a:ext uri="{FF2B5EF4-FFF2-40B4-BE49-F238E27FC236}">
+                <a16:creationId xmlns:a16="http://schemas.microsoft.com/office/drawing/2014/main" id="{7AE5B17A-4206-4076-AF15-34373FC0737A}"/>
+              </a:ext>
+            </a:extLst>
+          </p:cNvPr>
+          <p:cNvSpPr>
+            <a:spLocks noGrp="1"/>
+          </p:cNvSpPr>
+          <p:nvPr>
+            <p:ph type="title"/>
+          </p:nvPr>
+        </p:nvSpPr>
+        <p:spPr>
+          <a:xfrm>
+            <a:off x="838200" y="631825"/>
+            <a:ext cx="10515600" cy="1325563"/>
+          </a:xfrm>
+        </p:spPr>
+        <p:txBody>
+          <a:bodyPr>
+            <a:normAutofit/>
+          </a:bodyPr>
+          <a:lstStyle/>
+          <a:p>
+            <a:r>
+              <a:rPr lang="en-US" dirty="0">
+                <a:solidFill>
+                  <a:schemeClr val="bg1"/>
+                </a:solidFill>
+              </a:rPr>
+              <a:t>Methods of Analysis (</a:t>
+            </a:r>
+            <a:r>
+              <a:rPr lang="en-US" dirty="0" err="1">
+                <a:solidFill>
+                  <a:schemeClr val="bg1"/>
+                </a:solidFill>
+              </a:rPr>
+              <a:t>cont</a:t>
+            </a:r>
+            <a:r>
+              <a:rPr lang="en-US" dirty="0">
+                <a:solidFill>
+                  <a:schemeClr val="bg1"/>
+                </a:solidFill>
+              </a:rPr>
+              <a:t>):</a:t>
+            </a:r>
+          </a:p>
+        </p:txBody>
+      </p:sp>
+      <p:cxnSp>
+        <p:nvCxnSpPr>
+          <p:cNvPr id="13" name="Straight Connector 9">
+            <a:extLst>
+              <a:ext uri="{FF2B5EF4-FFF2-40B4-BE49-F238E27FC236}">
+                <a16:creationId xmlns:a16="http://schemas.microsoft.com/office/drawing/2014/main" id="{E8E35B83-1EC3-4F87-9D54-D863463351B9}"/>
+              </a:ext>
+              <a:ext uri="{C183D7F6-B498-43B3-948B-1728B52AA6E4}">
+                <adec:decorative xmlns:adec="http://schemas.microsoft.com/office/drawing/2017/decorative" val="1"/>
+              </a:ext>
+            </a:extLst>
+          </p:cNvPr>
+          <p:cNvCxnSpPr>
+            <a:cxnSpLocks noGrp="1" noRot="1" noChangeAspect="1" noMove="1" noResize="1" noEditPoints="1" noAdjustHandles="1" noChangeArrowheads="1" noChangeShapeType="1"/>
+          </p:cNvCxnSpPr>
+          <p:nvPr>
+            <p:extLst>
+              <p:ext uri="{386F3935-93C4-4BCD-93E2-E3B085C9AB24}">
+                <p16:designElem xmlns:p16="http://schemas.microsoft.com/office/powerpoint/2015/main" val="1"/>
+              </p:ext>
+            </p:extLst>
+          </p:nvPr>
+        </p:nvCxnSpPr>
+        <p:spPr>
+          <a:xfrm>
+            <a:off x="897636" y="1957388"/>
+            <a:ext cx="10396728" cy="0"/>
+          </a:xfrm>
+          <a:prstGeom prst="line">
+            <a:avLst/>
+          </a:prstGeom>
+          <a:ln w="22225">
+            <a:solidFill>
+              <a:schemeClr val="bg1"/>
+            </a:solidFill>
+          </a:ln>
+        </p:spPr>
+        <p:style>
+          <a:lnRef idx="1">
+            <a:schemeClr val="accent1"/>
+          </a:lnRef>
+          <a:fillRef idx="0">
+            <a:schemeClr val="accent1"/>
+          </a:fillRef>
+          <a:effectRef idx="0">
+            <a:schemeClr val="accent1"/>
+          </a:effectRef>
+          <a:fontRef idx="minor">
+            <a:schemeClr val="tx1"/>
+          </a:fontRef>
+        </p:style>
+      </p:cxnSp>
+      <p:sp>
+        <p:nvSpPr>
+          <p:cNvPr id="3" name="Content Placeholder 2">
+            <a:extLst>
+              <a:ext uri="{FF2B5EF4-FFF2-40B4-BE49-F238E27FC236}">
+                <a16:creationId xmlns:a16="http://schemas.microsoft.com/office/drawing/2014/main" id="{83EA27C2-97B2-419A-91A7-038692070155}"/>
+              </a:ext>
+            </a:extLst>
+          </p:cNvPr>
+          <p:cNvSpPr>
+            <a:spLocks noGrp="1"/>
+          </p:cNvSpPr>
+          <p:nvPr>
+            <p:ph idx="1"/>
+          </p:nvPr>
+        </p:nvSpPr>
+        <p:spPr>
+          <a:xfrm>
+            <a:off x="838200" y="2269173"/>
+            <a:ext cx="10515600" cy="3659988"/>
+          </a:xfrm>
+        </p:spPr>
+        <p:txBody>
+          <a:bodyPr>
+            <a:normAutofit/>
+          </a:bodyPr>
+          <a:lstStyle/>
+          <a:p>
+            <a:r>
+              <a:rPr lang="en-US" sz="2400" dirty="0">
+                <a:solidFill>
+                  <a:schemeClr val="bg1"/>
+                </a:solidFill>
+              </a:rPr>
+              <a:t>Statistical analyses that were used:</a:t>
+            </a:r>
+          </a:p>
+          <a:p>
+            <a:pPr lvl="1"/>
+            <a:r>
+              <a:rPr lang="en-US" sz="2000" dirty="0">
+                <a:solidFill>
+                  <a:schemeClr val="bg1"/>
+                </a:solidFill>
+              </a:rPr>
+              <a:t>ANOVA </a:t>
+            </a:r>
+            <a:r>
+              <a:rPr lang="en-US" sz="2000">
+                <a:solidFill>
+                  <a:schemeClr val="bg1"/>
+                </a:solidFill>
+              </a:rPr>
+              <a:t>analysis to…</a:t>
+            </a:r>
+            <a:endParaRPr lang="en-US" sz="2000" dirty="0">
+              <a:solidFill>
+                <a:schemeClr val="bg1"/>
+              </a:solidFill>
+            </a:endParaRPr>
+          </a:p>
+          <a:p>
+            <a:pPr lvl="2"/>
+            <a:r>
+              <a:rPr lang="en-US" sz="1600" dirty="0">
+                <a:solidFill>
+                  <a:schemeClr val="bg1"/>
+                </a:solidFill>
+              </a:rPr>
+              <a:t>Important Variables: Sales, NormDT, 3rdParty and Time</a:t>
+            </a:r>
+          </a:p>
+          <a:p>
+            <a:pPr lvl="1"/>
+            <a:r>
+              <a:rPr lang="en-US" sz="2000" dirty="0">
+                <a:solidFill>
+                  <a:schemeClr val="bg1"/>
+                </a:solidFill>
+              </a:rPr>
+              <a:t>Linear regression analysis to…</a:t>
+            </a:r>
+          </a:p>
+          <a:p>
+            <a:pPr lvl="2"/>
+            <a:r>
+              <a:rPr lang="en-US" sz="1600" dirty="0">
+                <a:solidFill>
+                  <a:schemeClr val="bg1"/>
+                </a:solidFill>
+              </a:rPr>
+              <a:t>Important Variables Productivity and Time.</a:t>
+            </a:r>
+          </a:p>
+          <a:p>
+            <a:pPr lvl="1"/>
+            <a:r>
+              <a:rPr lang="en-US" sz="2000" dirty="0">
+                <a:solidFill>
+                  <a:schemeClr val="bg1"/>
+                </a:solidFill>
+              </a:rPr>
+              <a:t>MANOVA analysis to…</a:t>
+            </a:r>
+          </a:p>
+          <a:p>
+            <a:pPr lvl="2"/>
+            <a:r>
+              <a:rPr lang="en-US" sz="1600" dirty="0">
+                <a:solidFill>
+                  <a:schemeClr val="bg1"/>
+                </a:solidFill>
+              </a:rPr>
+              <a:t>Important Variables: MobCO, MobDI, DineIn, Catering, CarryO, NormDT, 3rdParty, and Time.</a:t>
+            </a:r>
+          </a:p>
+          <a:p>
+            <a:endParaRPr lang="en-US" sz="2400" dirty="0">
+              <a:solidFill>
+                <a:schemeClr val="bg1"/>
+              </a:solidFill>
+            </a:endParaRPr>
+          </a:p>
+          <a:p>
+            <a:endParaRPr lang="en-US" sz="2400" dirty="0">
+              <a:solidFill>
+                <a:schemeClr val="bg1"/>
+              </a:solidFill>
+            </a:endParaRPr>
+          </a:p>
+        </p:txBody>
+      </p:sp>
+    </p:spTree>
+    <p:extLst>
+      <p:ext uri="{BB962C8B-B14F-4D97-AF65-F5344CB8AC3E}">
+        <p14:creationId xmlns:p14="http://schemas.microsoft.com/office/powerpoint/2010/main" val="634833510"/>
+      </p:ext>
+    </p:extLst>
+  </p:cSld>
+  <p:clrMapOvr>
+    <a:masterClrMapping/>
+  </p:clrMapOvr>
+</p:sld>
+</file>
+
+<file path=ppt/slides/slide7.xml><?xml version="1.0" encoding="utf-8"?>
 <p:sld xmlns:a="http://schemas.openxmlformats.org/drawingml/2006/main" xmlns:r="http://schemas.openxmlformats.org/officeDocument/2006/relationships" xmlns:p="http://schemas.openxmlformats.org/presentationml/2006/main">
   <p:cSld>
     <p:bg>
@@ -5653,7 +7755,7 @@
                   <a:schemeClr val="bg1"/>
                 </a:solidFill>
               </a:rPr>
-              <a:t>Variables used in analysis:                           </a:t>
+              <a:t>Variables used in analysis (Meta-Data):                           </a:t>
             </a:r>
             <a:endParaRPr lang="en-US" sz="4800" u="sng" dirty="0"/>
           </a:p>
@@ -5677,8 +7779,8 @@
         </p:nvSpPr>
         <p:spPr>
           <a:xfrm>
-            <a:off x="838200" y="1769758"/>
-            <a:ext cx="10515600" cy="4723116"/>
+            <a:off x="838200" y="1247242"/>
+            <a:ext cx="10515600" cy="5245631"/>
           </a:xfrm>
         </p:spPr>
         <p:txBody>
@@ -5721,7 +7823,7 @@
                 <a:ea typeface="Calibri" panose="020F0502020204030204" pitchFamily="34" charset="0"/>
                 <a:cs typeface="Times New Roman" panose="02020603050405020304" pitchFamily="18" charset="0"/>
               </a:rPr>
-              <a:t>: Total amount of sales in USD.</a:t>
+              <a:t>: Total amount of sales in each week in USD.</a:t>
             </a:r>
           </a:p>
           <a:p>
@@ -5759,7 +7861,7 @@
                 <a:ea typeface="Calibri" panose="020F0502020204030204" pitchFamily="34" charset="0"/>
                 <a:cs typeface="Times New Roman" panose="02020603050405020304" pitchFamily="18" charset="0"/>
               </a:rPr>
-              <a:t>: Total number of man hours. </a:t>
+              <a:t>: Total number of man hours used each week. </a:t>
             </a:r>
           </a:p>
           <a:p>
@@ -5797,7 +7899,76 @@
                 <a:ea typeface="Calibri" panose="020F0502020204030204" pitchFamily="34" charset="0"/>
                 <a:cs typeface="Times New Roman" panose="02020603050405020304" pitchFamily="18" charset="0"/>
               </a:rPr>
-              <a:t>: Total sales by Mobile Carryout orders - guests orders on the app, pick up order in restaurant, and leaves with order.</a:t>
+              <a:t>: Total sales by Mobile Carryout - guest orders on the app, pick up </a:t>
+            </a:r>
+            <a:r>
+              <a:rPr lang="en-US" sz="2900" dirty="0">
+                <a:solidFill>
+                  <a:schemeClr val="bg1"/>
+                </a:solidFill>
+                <a:latin typeface="Calibri" panose="020F0502020204030204" pitchFamily="34" charset="0"/>
+                <a:ea typeface="Calibri" panose="020F0502020204030204" pitchFamily="34" charset="0"/>
+                <a:cs typeface="Times New Roman" panose="02020603050405020304" pitchFamily="18" charset="0"/>
+              </a:rPr>
+              <a:t>meal</a:t>
+            </a:r>
+            <a:r>
+              <a:rPr lang="en-US" sz="2900" dirty="0">
+                <a:solidFill>
+                  <a:schemeClr val="bg1"/>
+                </a:solidFill>
+                <a:effectLst/>
+                <a:latin typeface="Calibri" panose="020F0502020204030204" pitchFamily="34" charset="0"/>
+                <a:ea typeface="Calibri" panose="020F0502020204030204" pitchFamily="34" charset="0"/>
+                <a:cs typeface="Times New Roman" panose="02020603050405020304" pitchFamily="18" charset="0"/>
+              </a:rPr>
+              <a:t> inside the restaurant, and </a:t>
+            </a:r>
+            <a:r>
+              <a:rPr lang="en-US" sz="2900" dirty="0">
+                <a:solidFill>
+                  <a:schemeClr val="bg1"/>
+                </a:solidFill>
+                <a:latin typeface="Calibri" panose="020F0502020204030204" pitchFamily="34" charset="0"/>
+                <a:ea typeface="Calibri" panose="020F0502020204030204" pitchFamily="34" charset="0"/>
+                <a:cs typeface="Times New Roman" panose="02020603050405020304" pitchFamily="18" charset="0"/>
+              </a:rPr>
+              <a:t>take</a:t>
+            </a:r>
+            <a:r>
+              <a:rPr lang="en-US" sz="2900" dirty="0">
+                <a:solidFill>
+                  <a:schemeClr val="bg1"/>
+                </a:solidFill>
+                <a:effectLst/>
+                <a:latin typeface="Calibri" panose="020F0502020204030204" pitchFamily="34" charset="0"/>
+                <a:ea typeface="Calibri" panose="020F0502020204030204" pitchFamily="34" charset="0"/>
+                <a:cs typeface="Times New Roman" panose="02020603050405020304" pitchFamily="18" charset="0"/>
+              </a:rPr>
+              <a:t> </a:t>
+            </a:r>
+            <a:r>
+              <a:rPr lang="en-US" sz="2900" dirty="0">
+                <a:solidFill>
+                  <a:schemeClr val="bg1"/>
+                </a:solidFill>
+                <a:latin typeface="Calibri" panose="020F0502020204030204" pitchFamily="34" charset="0"/>
+                <a:ea typeface="Calibri" panose="020F0502020204030204" pitchFamily="34" charset="0"/>
+                <a:cs typeface="Times New Roman" panose="02020603050405020304" pitchFamily="18" charset="0"/>
+              </a:rPr>
+              <a:t>their meal to go</a:t>
+            </a:r>
+            <a:r>
+              <a:rPr lang="en-US" sz="2900" dirty="0">
+                <a:solidFill>
+                  <a:schemeClr val="bg1"/>
+                </a:solidFill>
+                <a:effectLst/>
+                <a:latin typeface="Calibri" panose="020F0502020204030204" pitchFamily="34" charset="0"/>
+                <a:ea typeface="Calibri" panose="020F0502020204030204" pitchFamily="34" charset="0"/>
+                <a:cs typeface="Times New Roman" panose="02020603050405020304" pitchFamily="18" charset="0"/>
+              </a:rPr>
+              <a:t>.</a:t>
             </a:r>
           </a:p>
           <a:p>
@@ -5835,7 +8006,53 @@
                 <a:ea typeface="Calibri" panose="020F0502020204030204" pitchFamily="34" charset="0"/>
                 <a:cs typeface="Times New Roman" panose="02020603050405020304" pitchFamily="18" charset="0"/>
               </a:rPr>
-              <a:t>: Total sales by Mobile Dine-In orders - orders on the app, finds and scan a table in the dining room, order is brought to you.</a:t>
+              <a:t>: Total sales by Mobile Dine-In orders – guest orders on the app, finds a table and </a:t>
+            </a:r>
+            <a:r>
+              <a:rPr lang="en-US" sz="2900" dirty="0">
+                <a:solidFill>
+                  <a:schemeClr val="bg1"/>
+                </a:solidFill>
+                <a:latin typeface="Calibri" panose="020F0502020204030204" pitchFamily="34" charset="0"/>
+                <a:ea typeface="Calibri" panose="020F0502020204030204" pitchFamily="34" charset="0"/>
+                <a:cs typeface="Times New Roman" panose="02020603050405020304" pitchFamily="18" charset="0"/>
+              </a:rPr>
+              <a:t>scan the barcode</a:t>
+            </a:r>
+            <a:r>
+              <a:rPr lang="en-US" sz="2900" dirty="0">
+                <a:solidFill>
+                  <a:schemeClr val="bg1"/>
+                </a:solidFill>
+                <a:effectLst/>
+                <a:latin typeface="Calibri" panose="020F0502020204030204" pitchFamily="34" charset="0"/>
+                <a:ea typeface="Calibri" panose="020F0502020204030204" pitchFamily="34" charset="0"/>
+                <a:cs typeface="Times New Roman" panose="02020603050405020304" pitchFamily="18" charset="0"/>
+              </a:rPr>
+              <a:t> in the dining room, and order is brought to </a:t>
+            </a:r>
+            <a:r>
+              <a:rPr lang="en-US" sz="2900" dirty="0">
+                <a:solidFill>
+                  <a:schemeClr val="bg1"/>
+                </a:solidFill>
+                <a:latin typeface="Calibri" panose="020F0502020204030204" pitchFamily="34" charset="0"/>
+                <a:ea typeface="Calibri" panose="020F0502020204030204" pitchFamily="34" charset="0"/>
+                <a:cs typeface="Times New Roman" panose="02020603050405020304" pitchFamily="18" charset="0"/>
+              </a:rPr>
+              <a:t>them</a:t>
+            </a:r>
+            <a:r>
+              <a:rPr lang="en-US" sz="2900" dirty="0">
+                <a:solidFill>
+                  <a:schemeClr val="bg1"/>
+                </a:solidFill>
+                <a:effectLst/>
+                <a:latin typeface="Calibri" panose="020F0502020204030204" pitchFamily="34" charset="0"/>
+                <a:ea typeface="Calibri" panose="020F0502020204030204" pitchFamily="34" charset="0"/>
+                <a:cs typeface="Times New Roman" panose="02020603050405020304" pitchFamily="18" charset="0"/>
+              </a:rPr>
+              <a:t>.</a:t>
             </a:r>
           </a:p>
           <a:p>
@@ -5873,7 +8090,7 @@
                 <a:ea typeface="Calibri" panose="020F0502020204030204" pitchFamily="34" charset="0"/>
                 <a:cs typeface="Times New Roman" panose="02020603050405020304" pitchFamily="18" charset="0"/>
               </a:rPr>
-              <a:t>: Total sales by Mobile Drive-Thru orders - guests orders on the app and picks up the order in the drive-thru line.</a:t>
+              <a:t>: Total sales by Mobile Drive-Thru orders - guest orders on the app and picks up their meal in the drive-thru line.</a:t>
             </a:r>
           </a:p>
           <a:p>
@@ -5911,8 +8128,77 @@
                 <a:ea typeface="Calibri" panose="020F0502020204030204" pitchFamily="34" charset="0"/>
                 <a:cs typeface="Times New Roman" panose="02020603050405020304" pitchFamily="18" charset="0"/>
               </a:rPr>
-              <a:t>: Total sales done through the mobile app.</a:t>
-            </a:r>
+              <a:t>: Total sales done through the mobile app in total. </a:t>
+            </a:r>
+            <a:r>
+              <a:rPr lang="en-US" sz="2900" dirty="0" err="1">
+                <a:solidFill>
+                  <a:schemeClr val="bg1"/>
+                </a:solidFill>
+                <a:effectLst/>
+                <a:latin typeface="Calibri" panose="020F0502020204030204" pitchFamily="34" charset="0"/>
+                <a:ea typeface="Calibri" panose="020F0502020204030204" pitchFamily="34" charset="0"/>
+                <a:cs typeface="Times New Roman" panose="02020603050405020304" pitchFamily="18" charset="0"/>
+              </a:rPr>
+              <a:t>MobCO</a:t>
+            </a:r>
+            <a:r>
+              <a:rPr lang="en-US" sz="2900" dirty="0">
+                <a:solidFill>
+                  <a:schemeClr val="bg1"/>
+                </a:solidFill>
+                <a:effectLst/>
+                <a:latin typeface="Calibri" panose="020F0502020204030204" pitchFamily="34" charset="0"/>
+                <a:ea typeface="Calibri" panose="020F0502020204030204" pitchFamily="34" charset="0"/>
+                <a:cs typeface="Times New Roman" panose="02020603050405020304" pitchFamily="18" charset="0"/>
+              </a:rPr>
+              <a:t> + </a:t>
+            </a:r>
+            <a:r>
+              <a:rPr lang="en-US" sz="2900" dirty="0" err="1">
+                <a:solidFill>
+                  <a:schemeClr val="bg1"/>
+                </a:solidFill>
+                <a:effectLst/>
+                <a:latin typeface="Calibri" panose="020F0502020204030204" pitchFamily="34" charset="0"/>
+                <a:ea typeface="Calibri" panose="020F0502020204030204" pitchFamily="34" charset="0"/>
+                <a:cs typeface="Times New Roman" panose="02020603050405020304" pitchFamily="18" charset="0"/>
+              </a:rPr>
+              <a:t>MobDI</a:t>
+            </a:r>
+            <a:r>
+              <a:rPr lang="en-US" sz="2900" dirty="0">
+                <a:solidFill>
+                  <a:schemeClr val="bg1"/>
+                </a:solidFill>
+                <a:effectLst/>
+                <a:latin typeface="Calibri" panose="020F0502020204030204" pitchFamily="34" charset="0"/>
+                <a:ea typeface="Calibri" panose="020F0502020204030204" pitchFamily="34" charset="0"/>
+                <a:cs typeface="Times New Roman" panose="02020603050405020304" pitchFamily="18" charset="0"/>
+              </a:rPr>
+              <a:t> + </a:t>
+            </a:r>
+            <a:r>
+              <a:rPr lang="en-US" sz="2900" dirty="0" err="1">
+                <a:solidFill>
+                  <a:schemeClr val="bg1"/>
+                </a:solidFill>
+                <a:effectLst/>
+                <a:latin typeface="Calibri" panose="020F0502020204030204" pitchFamily="34" charset="0"/>
+                <a:ea typeface="Calibri" panose="020F0502020204030204" pitchFamily="34" charset="0"/>
+                <a:cs typeface="Times New Roman" panose="02020603050405020304" pitchFamily="18" charset="0"/>
+              </a:rPr>
+              <a:t>MobDT</a:t>
+            </a:r>
+            <a:endParaRPr lang="en-US" sz="2900" dirty="0">
+              <a:solidFill>
+                <a:schemeClr val="bg1"/>
+              </a:solidFill>
+              <a:effectLst/>
+              <a:latin typeface="Calibri" panose="020F0502020204030204" pitchFamily="34" charset="0"/>
+              <a:ea typeface="Calibri" panose="020F0502020204030204" pitchFamily="34" charset="0"/>
+              <a:cs typeface="Times New Roman" panose="02020603050405020304" pitchFamily="18" charset="0"/>
+            </a:endParaRPr>
           </a:p>
           <a:p>
             <a:pPr marL="0" marR="0" indent="0">
@@ -5937,31 +8223,7 @@
                 <a:ea typeface="Calibri" panose="020F0502020204030204" pitchFamily="34" charset="0"/>
                 <a:cs typeface="Times New Roman" panose="02020603050405020304" pitchFamily="18" charset="0"/>
               </a:rPr>
-              <a:t>3</a:t>
-            </a:r>
-            <a:r>
-              <a:rPr lang="en-US" sz="2900" b="1" baseline="30000" dirty="0">
-                <a:solidFill>
-                  <a:schemeClr val="bg1"/>
-                </a:solidFill>
-                <a:effectLst/>
-                <a:latin typeface="Calibri" panose="020F0502020204030204" pitchFamily="34" charset="0"/>
-                <a:ea typeface="Calibri" panose="020F0502020204030204" pitchFamily="34" charset="0"/>
-                <a:cs typeface="Times New Roman" panose="02020603050405020304" pitchFamily="18" charset="0"/>
-              </a:rPr>
-              <a:t>rd</a:t>
-            </a:r>
-            <a:r>
-              <a:rPr lang="en-US" sz="2900" b="1" dirty="0">
-                <a:solidFill>
-                  <a:schemeClr val="bg1"/>
-                </a:solidFill>
-                <a:effectLst/>
-                <a:latin typeface="Calibri" panose="020F0502020204030204" pitchFamily="34" charset="0"/>
-                <a:ea typeface="Calibri" panose="020F0502020204030204" pitchFamily="34" charset="0"/>
-                <a:cs typeface="Times New Roman" panose="02020603050405020304" pitchFamily="18" charset="0"/>
-              </a:rPr>
-              <a:t> party</a:t>
+              <a:t>3rdParty</a:t>
             </a:r>
             <a:r>
               <a:rPr lang="en-US" sz="2900" dirty="0">
@@ -6035,7 +8297,7 @@
                 <a:ea typeface="Calibri" panose="020F0502020204030204" pitchFamily="34" charset="0"/>
                 <a:cs typeface="Times New Roman" panose="02020603050405020304" pitchFamily="18" charset="0"/>
               </a:rPr>
-              <a:t>: Total sales done through the traditional drive-thru process</a:t>
+              <a:t>: Total sales done through the traditional drive-thru process.</a:t>
             </a:r>
           </a:p>
           <a:p>
@@ -6073,7 +8335,30 @@
                 <a:ea typeface="Calibri" panose="020F0502020204030204" pitchFamily="34" charset="0"/>
                 <a:cs typeface="Times New Roman" panose="02020603050405020304" pitchFamily="18" charset="0"/>
               </a:rPr>
-              <a:t>: Total sales through the traditional carryout process.</a:t>
+              <a:t>: The gues</a:t>
+            </a:r>
+            <a:r>
+              <a:rPr lang="en-US" sz="2900" dirty="0">
+                <a:solidFill>
+                  <a:schemeClr val="bg1"/>
+                </a:solidFill>
+                <a:latin typeface="Calibri" panose="020F0502020204030204" pitchFamily="34" charset="0"/>
+                <a:ea typeface="Calibri" panose="020F0502020204030204" pitchFamily="34" charset="0"/>
+                <a:cs typeface="Times New Roman" panose="02020603050405020304" pitchFamily="18" charset="0"/>
+              </a:rPr>
+              <a:t>t walks inside, orders at the counter, then takes their meal to go</a:t>
+            </a:r>
+            <a:r>
+              <a:rPr lang="en-US" sz="2900" dirty="0">
+                <a:solidFill>
+                  <a:schemeClr val="bg1"/>
+                </a:solidFill>
+                <a:effectLst/>
+                <a:latin typeface="Calibri" panose="020F0502020204030204" pitchFamily="34" charset="0"/>
+                <a:ea typeface="Calibri" panose="020F0502020204030204" pitchFamily="34" charset="0"/>
+                <a:cs typeface="Times New Roman" panose="02020603050405020304" pitchFamily="18" charset="0"/>
+              </a:rPr>
+              <a:t>.</a:t>
             </a:r>
           </a:p>
           <a:p>
@@ -6350,7 +8635,31 @@
                 <a:ea typeface="Calibri" panose="020F0502020204030204" pitchFamily="34" charset="0"/>
                 <a:cs typeface="Times New Roman" panose="02020603050405020304" pitchFamily="18" charset="0"/>
               </a:rPr>
-              <a:t> Sales/ HoursUsed – CFA’s metric for productivity</a:t>
+              <a:t> Sales/</a:t>
+            </a:r>
+            <a:r>
+              <a:rPr lang="en-US" sz="2900" dirty="0" err="1">
+                <a:solidFill>
+                  <a:schemeClr val="bg1"/>
+                </a:solidFill>
+                <a:effectLst/>
+                <a:latin typeface="Calibri" panose="020F0502020204030204" pitchFamily="34" charset="0"/>
+                <a:ea typeface="Calibri" panose="020F0502020204030204" pitchFamily="34" charset="0"/>
+                <a:cs typeface="Times New Roman" panose="02020603050405020304" pitchFamily="18" charset="0"/>
+              </a:rPr>
+              <a:t>HoursUsed</a:t>
+            </a:r>
+            <a:r>
+              <a:rPr lang="en-US" sz="2900" dirty="0">
+                <a:solidFill>
+                  <a:schemeClr val="bg1"/>
+                </a:solidFill>
+                <a:effectLst/>
+                <a:latin typeface="Calibri" panose="020F0502020204030204" pitchFamily="34" charset="0"/>
+                <a:ea typeface="Calibri" panose="020F0502020204030204" pitchFamily="34" charset="0"/>
+                <a:cs typeface="Times New Roman" panose="02020603050405020304" pitchFamily="18" charset="0"/>
+              </a:rPr>
+              <a:t> – Total Sales per person on the clock per hour.</a:t>
             </a:r>
           </a:p>
           <a:p>
@@ -6371,7 +8680,7 @@
 </p:sld>
 </file>
 
-<file path=ppt/slides/slide7.xml><?xml version="1.0" encoding="utf-8"?>
+<file path=ppt/slides/slide8.xml><?xml version="1.0" encoding="utf-8"?>
 <p:sld xmlns:a="http://schemas.openxmlformats.org/drawingml/2006/main" xmlns:r="http://schemas.openxmlformats.org/officeDocument/2006/relationships" xmlns:p="http://schemas.openxmlformats.org/presentationml/2006/main">
   <p:cSld>
     <p:bg>
@@ -8076,7 +10385,7 @@
 </p:sld>
 </file>
 
-<file path=ppt/slides/slide8.xml><?xml version="1.0" encoding="utf-8"?>
+<file path=ppt/slides/slide9.xml><?xml version="1.0" encoding="utf-8"?>
 <p:sld xmlns:a="http://schemas.openxmlformats.org/drawingml/2006/main" xmlns:r="http://schemas.openxmlformats.org/officeDocument/2006/relationships" xmlns:p="http://schemas.openxmlformats.org/presentationml/2006/main">
   <p:cSld>
     <p:bg>
@@ -9733,1672 +12042,6 @@
     <p:extLst>
       <p:ext uri="{BB962C8B-B14F-4D97-AF65-F5344CB8AC3E}">
         <p14:creationId xmlns:p14="http://schemas.microsoft.com/office/powerpoint/2010/main" val="3925067938"/>
-      </p:ext>
-    </p:extLst>
-  </p:cSld>
-  <p:clrMapOvr>
-    <a:masterClrMapping/>
-  </p:clrMapOvr>
-</p:sld>
-</file>
-
-<file path=ppt/slides/slide9.xml><?xml version="1.0" encoding="utf-8"?>
-<p:sld xmlns:a="http://schemas.openxmlformats.org/drawingml/2006/main" xmlns:r="http://schemas.openxmlformats.org/officeDocument/2006/relationships" xmlns:p="http://schemas.openxmlformats.org/presentationml/2006/main">
-  <p:cSld>
-    <p:bg>
-      <p:bgPr>
-        <a:solidFill>
-          <a:schemeClr val="bg1"/>
-        </a:solidFill>
-        <a:effectLst/>
-      </p:bgPr>
-    </p:bg>
-    <p:spTree>
-      <p:nvGrpSpPr>
-        <p:cNvPr id="1" name=""/>
-        <p:cNvGrpSpPr/>
-        <p:nvPr/>
-      </p:nvGrpSpPr>
-      <p:grpSpPr>
-        <a:xfrm>
-          <a:off x="0" y="0"/>
-          <a:ext cx="0" cy="0"/>
-          <a:chOff x="0" y="0"/>
-          <a:chExt cx="0" cy="0"/>
-        </a:xfrm>
-      </p:grpSpPr>
-      <p:sp>
-        <p:nvSpPr>
-          <p:cNvPr id="15" name="Freeform 5">
-            <a:extLst>
-              <a:ext uri="{FF2B5EF4-FFF2-40B4-BE49-F238E27FC236}">
-                <a16:creationId xmlns:a16="http://schemas.microsoft.com/office/drawing/2014/main" id="{07322A9E-F1EC-405E-8971-BA906EFFCCB8}"/>
-              </a:ext>
-              <a:ext uri="{C183D7F6-B498-43B3-948B-1728B52AA6E4}">
-                <adec:decorative xmlns:adec="http://schemas.microsoft.com/office/drawing/2017/decorative" val="1"/>
-              </a:ext>
-            </a:extLst>
-          </p:cNvPr>
-          <p:cNvSpPr>
-            <a:spLocks noGrp="1" noRot="1" noChangeAspect="1" noMove="1" noResize="1" noEditPoints="1" noAdjustHandles="1" noChangeArrowheads="1" noChangeShapeType="1" noTextEdit="1"/>
-          </p:cNvSpPr>
-          <p:nvPr>
-            <p:extLst>
-              <p:ext uri="{386F3935-93C4-4BCD-93E2-E3B085C9AB24}">
-                <p16:designElem xmlns:p16="http://schemas.microsoft.com/office/powerpoint/2015/main" val="1"/>
-              </p:ext>
-            </p:extLst>
-          </p:nvPr>
-        </p:nvSpPr>
-        <p:spPr bwMode="auto">
-          <a:xfrm>
-            <a:off x="-329674" y="1290909"/>
-            <a:ext cx="9702800" cy="5573512"/>
-          </a:xfrm>
-          <a:custGeom>
-            <a:avLst/>
-            <a:gdLst>
-              <a:gd name="T0" fmla="*/ 1752 w 2038"/>
-              <a:gd name="T1" fmla="*/ 1169 h 1169"/>
-              <a:gd name="T2" fmla="*/ 1487 w 2038"/>
-              <a:gd name="T3" fmla="*/ 334 h 1169"/>
-              <a:gd name="T4" fmla="*/ 860 w 2038"/>
-              <a:gd name="T5" fmla="*/ 22 h 1169"/>
-              <a:gd name="T6" fmla="*/ 199 w 2038"/>
-              <a:gd name="T7" fmla="*/ 318 h 1169"/>
-              <a:gd name="T8" fmla="*/ 399 w 2038"/>
-              <a:gd name="T9" fmla="*/ 1165 h 1169"/>
-            </a:gdLst>
-            <a:ahLst/>
-            <a:cxnLst>
-              <a:cxn ang="0">
-                <a:pos x="T0" y="T1"/>
-              </a:cxn>
-              <a:cxn ang="0">
-                <a:pos x="T2" y="T3"/>
-              </a:cxn>
-              <a:cxn ang="0">
-                <a:pos x="T4" y="T5"/>
-              </a:cxn>
-              <a:cxn ang="0">
-                <a:pos x="T6" y="T7"/>
-              </a:cxn>
-              <a:cxn ang="0">
-                <a:pos x="T8" y="T9"/>
-              </a:cxn>
-            </a:cxnLst>
-            <a:rect l="0" t="0" r="r" b="b"/>
-            <a:pathLst>
-              <a:path w="2038" h="1169">
-                <a:moveTo>
-                  <a:pt x="1752" y="1169"/>
-                </a:moveTo>
-                <a:cubicBezTo>
-                  <a:pt x="2038" y="928"/>
-                  <a:pt x="1673" y="513"/>
-                  <a:pt x="1487" y="334"/>
-                </a:cubicBezTo>
-                <a:cubicBezTo>
-                  <a:pt x="1316" y="170"/>
-                  <a:pt x="1099" y="43"/>
-                  <a:pt x="860" y="22"/>
-                </a:cubicBezTo>
-                <a:cubicBezTo>
-                  <a:pt x="621" y="0"/>
-                  <a:pt x="341" y="128"/>
-                  <a:pt x="199" y="318"/>
-                </a:cubicBezTo>
-                <a:cubicBezTo>
-                  <a:pt x="0" y="586"/>
-                  <a:pt x="184" y="965"/>
-                  <a:pt x="399" y="1165"/>
-                </a:cubicBezTo>
-              </a:path>
-            </a:pathLst>
-          </a:custGeom>
-          <a:noFill/>
-          <a:ln w="9525" cap="flat">
-            <a:solidFill>
-              <a:schemeClr val="tx1">
-                <a:alpha val="20000"/>
-              </a:schemeClr>
-            </a:solidFill>
-            <a:prstDash val="solid"/>
-            <a:miter lim="800000"/>
-            <a:headEnd/>
-            <a:tailEnd/>
-          </a:ln>
-          <a:extLst>
-            <a:ext uri="{909E8E84-426E-40DD-AFC4-6F175D3DCCD1}">
-              <a14:hiddenFill xmlns:a14="http://schemas.microsoft.com/office/drawing/2010/main">
-                <a:solidFill>
-                  <a:srgbClr val="FFFFFF"/>
-                </a:solidFill>
-              </a14:hiddenFill>
-            </a:ext>
-          </a:extLst>
-        </p:spPr>
-        <p:txBody>
-          <a:bodyPr vert="horz" wrap="square" lIns="91440" tIns="45720" rIns="91440" bIns="45720" numCol="1" anchor="t" anchorCtr="0" compatLnSpc="1">
-            <a:prstTxWarp prst="textNoShape">
-              <a:avLst/>
-            </a:prstTxWarp>
-          </a:bodyPr>
-          <a:lstStyle/>
-          <a:p>
-            <a:endParaRPr lang="en-US"/>
-          </a:p>
-        </p:txBody>
-      </p:sp>
-      <p:sp>
-        <p:nvSpPr>
-          <p:cNvPr id="17" name="Freeform 6">
-            <a:extLst>
-              <a:ext uri="{FF2B5EF4-FFF2-40B4-BE49-F238E27FC236}">
-                <a16:creationId xmlns:a16="http://schemas.microsoft.com/office/drawing/2014/main" id="{A5704422-1118-4FD1-95AD-29A064EB80D9}"/>
-              </a:ext>
-              <a:ext uri="{C183D7F6-B498-43B3-948B-1728B52AA6E4}">
-                <adec:decorative xmlns:adec="http://schemas.microsoft.com/office/drawing/2017/decorative" val="1"/>
-              </a:ext>
-            </a:extLst>
-          </p:cNvPr>
-          <p:cNvSpPr>
-            <a:spLocks noGrp="1" noRot="1" noChangeAspect="1" noMove="1" noResize="1" noEditPoints="1" noAdjustHandles="1" noChangeArrowheads="1" noChangeShapeType="1" noTextEdit="1"/>
-          </p:cNvSpPr>
-          <p:nvPr>
-            <p:extLst>
-              <p:ext uri="{386F3935-93C4-4BCD-93E2-E3B085C9AB24}">
-                <p16:designElem xmlns:p16="http://schemas.microsoft.com/office/powerpoint/2015/main" val="1"/>
-              </p:ext>
-            </p:extLst>
-          </p:nvPr>
-        </p:nvSpPr>
-        <p:spPr bwMode="auto">
-          <a:xfrm>
-            <a:off x="670451" y="2010741"/>
-            <a:ext cx="7373938" cy="4848892"/>
-          </a:xfrm>
-          <a:custGeom>
-            <a:avLst/>
-            <a:gdLst>
-              <a:gd name="T0" fmla="*/ 1025 w 1549"/>
-              <a:gd name="T1" fmla="*/ 1016 h 1017"/>
-              <a:gd name="T2" fmla="*/ 1443 w 1549"/>
-              <a:gd name="T3" fmla="*/ 592 h 1017"/>
-              <a:gd name="T4" fmla="*/ 782 w 1549"/>
-              <a:gd name="T5" fmla="*/ 53 h 1017"/>
-              <a:gd name="T6" fmla="*/ 150 w 1549"/>
-              <a:gd name="T7" fmla="*/ 329 h 1017"/>
-              <a:gd name="T8" fmla="*/ 477 w 1549"/>
-              <a:gd name="T9" fmla="*/ 1017 h 1017"/>
-            </a:gdLst>
-            <a:ahLst/>
-            <a:cxnLst>
-              <a:cxn ang="0">
-                <a:pos x="T0" y="T1"/>
-              </a:cxn>
-              <a:cxn ang="0">
-                <a:pos x="T2" y="T3"/>
-              </a:cxn>
-              <a:cxn ang="0">
-                <a:pos x="T4" y="T5"/>
-              </a:cxn>
-              <a:cxn ang="0">
-                <a:pos x="T6" y="T7"/>
-              </a:cxn>
-              <a:cxn ang="0">
-                <a:pos x="T8" y="T9"/>
-              </a:cxn>
-            </a:cxnLst>
-            <a:rect l="0" t="0" r="r" b="b"/>
-            <a:pathLst>
-              <a:path w="1549" h="1017">
-                <a:moveTo>
-                  <a:pt x="1025" y="1016"/>
-                </a:moveTo>
-                <a:cubicBezTo>
-                  <a:pt x="1223" y="971"/>
-                  <a:pt x="1549" y="857"/>
-                  <a:pt x="1443" y="592"/>
-                </a:cubicBezTo>
-                <a:cubicBezTo>
-                  <a:pt x="1344" y="344"/>
-                  <a:pt x="1041" y="111"/>
-                  <a:pt x="782" y="53"/>
-                </a:cubicBezTo>
-                <a:cubicBezTo>
-                  <a:pt x="545" y="0"/>
-                  <a:pt x="275" y="117"/>
-                  <a:pt x="150" y="329"/>
-                </a:cubicBezTo>
-                <a:cubicBezTo>
-                  <a:pt x="0" y="584"/>
-                  <a:pt x="243" y="911"/>
-                  <a:pt x="477" y="1017"/>
-                </a:cubicBezTo>
-              </a:path>
-            </a:pathLst>
-          </a:custGeom>
-          <a:noFill/>
-          <a:ln w="9525" cap="flat">
-            <a:solidFill>
-              <a:schemeClr val="tx1">
-                <a:alpha val="20000"/>
-              </a:schemeClr>
-            </a:solidFill>
-            <a:prstDash val="solid"/>
-            <a:miter lim="800000"/>
-            <a:headEnd/>
-            <a:tailEnd/>
-          </a:ln>
-          <a:extLst>
-            <a:ext uri="{909E8E84-426E-40DD-AFC4-6F175D3DCCD1}">
-              <a14:hiddenFill xmlns:a14="http://schemas.microsoft.com/office/drawing/2010/main">
-                <a:solidFill>
-                  <a:srgbClr val="FFFFFF"/>
-                </a:solidFill>
-              </a14:hiddenFill>
-            </a:ext>
-          </a:extLst>
-        </p:spPr>
-        <p:txBody>
-          <a:bodyPr vert="horz" wrap="square" lIns="91440" tIns="45720" rIns="91440" bIns="45720" numCol="1" anchor="t" anchorCtr="0" compatLnSpc="1">
-            <a:prstTxWarp prst="textNoShape">
-              <a:avLst/>
-            </a:prstTxWarp>
-          </a:bodyPr>
-          <a:lstStyle/>
-          <a:p>
-            <a:endParaRPr lang="en-US"/>
-          </a:p>
-        </p:txBody>
-      </p:sp>
-      <p:sp>
-        <p:nvSpPr>
-          <p:cNvPr id="19" name="Freeform 7">
-            <a:extLst>
-              <a:ext uri="{FF2B5EF4-FFF2-40B4-BE49-F238E27FC236}">
-                <a16:creationId xmlns:a16="http://schemas.microsoft.com/office/drawing/2014/main" id="{A88B2AAA-B805-498E-A9E6-98B885855498}"/>
-              </a:ext>
-              <a:ext uri="{C183D7F6-B498-43B3-948B-1728B52AA6E4}">
-                <adec:decorative xmlns:adec="http://schemas.microsoft.com/office/drawing/2017/decorative" val="1"/>
-              </a:ext>
-            </a:extLst>
-          </p:cNvPr>
-          <p:cNvSpPr>
-            <a:spLocks noGrp="1" noRot="1" noChangeAspect="1" noMove="1" noResize="1" noEditPoints="1" noAdjustHandles="1" noChangeArrowheads="1" noChangeShapeType="1" noTextEdit="1"/>
-          </p:cNvSpPr>
-          <p:nvPr>
-            <p:extLst>
-              <p:ext uri="{386F3935-93C4-4BCD-93E2-E3B085C9AB24}">
-                <p16:designElem xmlns:p16="http://schemas.microsoft.com/office/powerpoint/2015/main" val="1"/>
-              </p:ext>
-            </p:extLst>
-          </p:nvPr>
-        </p:nvSpPr>
-        <p:spPr bwMode="auto">
-          <a:xfrm>
-            <a:off x="251351" y="1780905"/>
-            <a:ext cx="8035925" cy="5083516"/>
-          </a:xfrm>
-          <a:custGeom>
-            <a:avLst/>
-            <a:gdLst>
-              <a:gd name="T0" fmla="*/ 1302 w 1688"/>
-              <a:gd name="T1" fmla="*/ 1066 h 1066"/>
-              <a:gd name="T2" fmla="*/ 1613 w 1688"/>
-              <a:gd name="T3" fmla="*/ 850 h 1066"/>
-              <a:gd name="T4" fmla="*/ 1517 w 1688"/>
-              <a:gd name="T5" fmla="*/ 471 h 1066"/>
-              <a:gd name="T6" fmla="*/ 798 w 1688"/>
-              <a:gd name="T7" fmla="*/ 28 h 1066"/>
-              <a:gd name="T8" fmla="*/ 181 w 1688"/>
-              <a:gd name="T9" fmla="*/ 333 h 1066"/>
-              <a:gd name="T10" fmla="*/ 420 w 1688"/>
-              <a:gd name="T11" fmla="*/ 1066 h 1066"/>
-            </a:gdLst>
-            <a:ahLst/>
-            <a:cxnLst>
-              <a:cxn ang="0">
-                <a:pos x="T0" y="T1"/>
-              </a:cxn>
-              <a:cxn ang="0">
-                <a:pos x="T2" y="T3"/>
-              </a:cxn>
-              <a:cxn ang="0">
-                <a:pos x="T4" y="T5"/>
-              </a:cxn>
-              <a:cxn ang="0">
-                <a:pos x="T6" y="T7"/>
-              </a:cxn>
-              <a:cxn ang="0">
-                <a:pos x="T8" y="T9"/>
-              </a:cxn>
-              <a:cxn ang="0">
-                <a:pos x="T10" y="T11"/>
-              </a:cxn>
-            </a:cxnLst>
-            <a:rect l="0" t="0" r="r" b="b"/>
-            <a:pathLst>
-              <a:path w="1688" h="1066">
-                <a:moveTo>
-                  <a:pt x="1302" y="1066"/>
-                </a:moveTo>
-                <a:cubicBezTo>
-                  <a:pt x="1416" y="1024"/>
-                  <a:pt x="1551" y="962"/>
-                  <a:pt x="1613" y="850"/>
-                </a:cubicBezTo>
-                <a:cubicBezTo>
-                  <a:pt x="1688" y="715"/>
-                  <a:pt x="1606" y="575"/>
-                  <a:pt x="1517" y="471"/>
-                </a:cubicBezTo>
-                <a:cubicBezTo>
-                  <a:pt x="1336" y="258"/>
-                  <a:pt x="1084" y="62"/>
-                  <a:pt x="798" y="28"/>
-                </a:cubicBezTo>
-                <a:cubicBezTo>
-                  <a:pt x="559" y="0"/>
-                  <a:pt x="317" y="138"/>
-                  <a:pt x="181" y="333"/>
-                </a:cubicBezTo>
-                <a:cubicBezTo>
-                  <a:pt x="0" y="592"/>
-                  <a:pt x="191" y="907"/>
-                  <a:pt x="420" y="1066"/>
-                </a:cubicBezTo>
-              </a:path>
-            </a:pathLst>
-          </a:custGeom>
-          <a:noFill/>
-          <a:ln w="9525" cap="flat">
-            <a:solidFill>
-              <a:schemeClr val="tx1">
-                <a:alpha val="20000"/>
-              </a:schemeClr>
-            </a:solidFill>
-            <a:prstDash val="dash"/>
-            <a:miter lim="800000"/>
-            <a:headEnd/>
-            <a:tailEnd/>
-          </a:ln>
-          <a:extLst>
-            <a:ext uri="{909E8E84-426E-40DD-AFC4-6F175D3DCCD1}">
-              <a14:hiddenFill xmlns:a14="http://schemas.microsoft.com/office/drawing/2010/main">
-                <a:solidFill>
-                  <a:srgbClr val="FFFFFF"/>
-                </a:solidFill>
-              </a14:hiddenFill>
-            </a:ext>
-          </a:extLst>
-        </p:spPr>
-        <p:txBody>
-          <a:bodyPr vert="horz" wrap="square" lIns="91440" tIns="45720" rIns="91440" bIns="45720" numCol="1" anchor="t" anchorCtr="0" compatLnSpc="1">
-            <a:prstTxWarp prst="textNoShape">
-              <a:avLst/>
-            </a:prstTxWarp>
-          </a:bodyPr>
-          <a:lstStyle/>
-          <a:p>
-            <a:endParaRPr lang="en-US"/>
-          </a:p>
-        </p:txBody>
-      </p:sp>
-      <p:sp>
-        <p:nvSpPr>
-          <p:cNvPr id="21" name="Freeform 8">
-            <a:extLst>
-              <a:ext uri="{FF2B5EF4-FFF2-40B4-BE49-F238E27FC236}">
-                <a16:creationId xmlns:a16="http://schemas.microsoft.com/office/drawing/2014/main" id="{9B8051E0-19D7-43E1-BFD9-E6DBFEB3A3F1}"/>
-              </a:ext>
-              <a:ext uri="{C183D7F6-B498-43B3-948B-1728B52AA6E4}">
-                <adec:decorative xmlns:adec="http://schemas.microsoft.com/office/drawing/2017/decorative" val="1"/>
-              </a:ext>
-            </a:extLst>
-          </p:cNvPr>
-          <p:cNvSpPr>
-            <a:spLocks noGrp="1" noRot="1" noChangeAspect="1" noMove="1" noResize="1" noEditPoints="1" noAdjustHandles="1" noChangeArrowheads="1" noChangeShapeType="1" noTextEdit="1"/>
-          </p:cNvSpPr>
-          <p:nvPr>
-            <p:extLst>
-              <p:ext uri="{386F3935-93C4-4BCD-93E2-E3B085C9AB24}">
-                <p16:designElem xmlns:p16="http://schemas.microsoft.com/office/powerpoint/2015/main" val="1"/>
-              </p:ext>
-            </p:extLst>
-          </p:nvPr>
-        </p:nvSpPr>
-        <p:spPr bwMode="auto">
-          <a:xfrm>
-            <a:off x="-1061" y="542347"/>
-            <a:ext cx="10334625" cy="6322075"/>
-          </a:xfrm>
-          <a:custGeom>
-            <a:avLst/>
-            <a:gdLst>
-              <a:gd name="T0" fmla="*/ 1873 w 2171"/>
-              <a:gd name="T1" fmla="*/ 1326 h 1326"/>
-              <a:gd name="T2" fmla="*/ 1609 w 2171"/>
-              <a:gd name="T3" fmla="*/ 473 h 1326"/>
-              <a:gd name="T4" fmla="*/ 880 w 2171"/>
-              <a:gd name="T5" fmla="*/ 63 h 1326"/>
-              <a:gd name="T6" fmla="*/ 0 w 2171"/>
-              <a:gd name="T7" fmla="*/ 423 h 1326"/>
-            </a:gdLst>
-            <a:ahLst/>
-            <a:cxnLst>
-              <a:cxn ang="0">
-                <a:pos x="T0" y="T1"/>
-              </a:cxn>
-              <a:cxn ang="0">
-                <a:pos x="T2" y="T3"/>
-              </a:cxn>
-              <a:cxn ang="0">
-                <a:pos x="T4" y="T5"/>
-              </a:cxn>
-              <a:cxn ang="0">
-                <a:pos x="T6" y="T7"/>
-              </a:cxn>
-            </a:cxnLst>
-            <a:rect l="0" t="0" r="r" b="b"/>
-            <a:pathLst>
-              <a:path w="2171" h="1326">
-                <a:moveTo>
-                  <a:pt x="1873" y="1326"/>
-                </a:moveTo>
-                <a:cubicBezTo>
-                  <a:pt x="2171" y="1045"/>
-                  <a:pt x="1825" y="678"/>
-                  <a:pt x="1609" y="473"/>
-                </a:cubicBezTo>
-                <a:cubicBezTo>
-                  <a:pt x="1406" y="281"/>
-                  <a:pt x="1159" y="116"/>
-                  <a:pt x="880" y="63"/>
-                </a:cubicBezTo>
-                <a:cubicBezTo>
-                  <a:pt x="545" y="0"/>
-                  <a:pt x="214" y="161"/>
-                  <a:pt x="0" y="423"/>
-                </a:cubicBezTo>
-              </a:path>
-            </a:pathLst>
-          </a:custGeom>
-          <a:noFill/>
-          <a:ln w="9525" cap="flat">
-            <a:solidFill>
-              <a:schemeClr val="tx1">
-                <a:alpha val="20000"/>
-              </a:schemeClr>
-            </a:solidFill>
-            <a:prstDash val="solid"/>
-            <a:miter lim="800000"/>
-            <a:headEnd/>
-            <a:tailEnd/>
-          </a:ln>
-          <a:extLst>
-            <a:ext uri="{909E8E84-426E-40DD-AFC4-6F175D3DCCD1}">
-              <a14:hiddenFill xmlns:a14="http://schemas.microsoft.com/office/drawing/2010/main">
-                <a:solidFill>
-                  <a:srgbClr val="FFFFFF"/>
-                </a:solidFill>
-              </a14:hiddenFill>
-            </a:ext>
-          </a:extLst>
-        </p:spPr>
-        <p:txBody>
-          <a:bodyPr vert="horz" wrap="square" lIns="91440" tIns="45720" rIns="91440" bIns="45720" numCol="1" anchor="t" anchorCtr="0" compatLnSpc="1">
-            <a:prstTxWarp prst="textNoShape">
-              <a:avLst/>
-            </a:prstTxWarp>
-          </a:bodyPr>
-          <a:lstStyle/>
-          <a:p>
-            <a:endParaRPr lang="en-US"/>
-          </a:p>
-        </p:txBody>
-      </p:sp>
-      <p:sp>
-        <p:nvSpPr>
-          <p:cNvPr id="23" name="Freeform 9">
-            <a:extLst>
-              <a:ext uri="{FF2B5EF4-FFF2-40B4-BE49-F238E27FC236}">
-                <a16:creationId xmlns:a16="http://schemas.microsoft.com/office/drawing/2014/main" id="{4EDB2B02-86A2-46F5-A4BE-B7D9B10411D6}"/>
-              </a:ext>
-              <a:ext uri="{C183D7F6-B498-43B3-948B-1728B52AA6E4}">
-                <adec:decorative xmlns:adec="http://schemas.microsoft.com/office/drawing/2017/decorative" val="1"/>
-              </a:ext>
-            </a:extLst>
-          </p:cNvPr>
-          <p:cNvSpPr>
-            <a:spLocks noGrp="1" noRot="1" noChangeAspect="1" noMove="1" noResize="1" noEditPoints="1" noAdjustHandles="1" noChangeArrowheads="1" noChangeShapeType="1" noTextEdit="1"/>
-          </p:cNvSpPr>
-          <p:nvPr>
-            <p:extLst>
-              <p:ext uri="{386F3935-93C4-4BCD-93E2-E3B085C9AB24}">
-                <p16:designElem xmlns:p16="http://schemas.microsoft.com/office/powerpoint/2015/main" val="1"/>
-              </p:ext>
-            </p:extLst>
-          </p:nvPr>
-        </p:nvSpPr>
-        <p:spPr bwMode="auto">
-          <a:xfrm>
-            <a:off x="3701" y="6178751"/>
-            <a:ext cx="504825" cy="681527"/>
-          </a:xfrm>
-          <a:custGeom>
-            <a:avLst/>
-            <a:gdLst>
-              <a:gd name="T0" fmla="*/ 0 w 106"/>
-              <a:gd name="T1" fmla="*/ 0 h 143"/>
-              <a:gd name="T2" fmla="*/ 106 w 106"/>
-              <a:gd name="T3" fmla="*/ 143 h 143"/>
-            </a:gdLst>
-            <a:ahLst/>
-            <a:cxnLst>
-              <a:cxn ang="0">
-                <a:pos x="T0" y="T1"/>
-              </a:cxn>
-              <a:cxn ang="0">
-                <a:pos x="T2" y="T3"/>
-              </a:cxn>
-            </a:cxnLst>
-            <a:rect l="0" t="0" r="r" b="b"/>
-            <a:pathLst>
-              <a:path w="106" h="143">
-                <a:moveTo>
-                  <a:pt x="0" y="0"/>
-                </a:moveTo>
-                <a:cubicBezTo>
-                  <a:pt x="35" y="54"/>
-                  <a:pt x="70" y="101"/>
-                  <a:pt x="106" y="143"/>
-                </a:cubicBezTo>
-              </a:path>
-            </a:pathLst>
-          </a:custGeom>
-          <a:noFill/>
-          <a:ln w="4763" cap="flat">
-            <a:solidFill>
-              <a:schemeClr val="tx1">
-                <a:alpha val="20000"/>
-              </a:schemeClr>
-            </a:solidFill>
-            <a:prstDash val="solid"/>
-            <a:miter lim="800000"/>
-            <a:headEnd/>
-            <a:tailEnd/>
-          </a:ln>
-          <a:extLst>
-            <a:ext uri="{909E8E84-426E-40DD-AFC4-6F175D3DCCD1}">
-              <a14:hiddenFill xmlns:a14="http://schemas.microsoft.com/office/drawing/2010/main">
-                <a:solidFill>
-                  <a:srgbClr val="FFFFFF"/>
-                </a:solidFill>
-              </a14:hiddenFill>
-            </a:ext>
-          </a:extLst>
-        </p:spPr>
-        <p:txBody>
-          <a:bodyPr vert="horz" wrap="square" lIns="91440" tIns="45720" rIns="91440" bIns="45720" numCol="1" anchor="t" anchorCtr="0" compatLnSpc="1">
-            <a:prstTxWarp prst="textNoShape">
-              <a:avLst/>
-            </a:prstTxWarp>
-          </a:bodyPr>
-          <a:lstStyle/>
-          <a:p>
-            <a:endParaRPr lang="en-US"/>
-          </a:p>
-        </p:txBody>
-      </p:sp>
-      <p:sp>
-        <p:nvSpPr>
-          <p:cNvPr id="25" name="Freeform 10">
-            <a:extLst>
-              <a:ext uri="{FF2B5EF4-FFF2-40B4-BE49-F238E27FC236}">
-                <a16:creationId xmlns:a16="http://schemas.microsoft.com/office/drawing/2014/main" id="{43954639-FB5D-41F4-9560-6F6DFE778425}"/>
-              </a:ext>
-              <a:ext uri="{C183D7F6-B498-43B3-948B-1728B52AA6E4}">
-                <adec:decorative xmlns:adec="http://schemas.microsoft.com/office/drawing/2017/decorative" val="1"/>
-              </a:ext>
-            </a:extLst>
-          </p:cNvPr>
-          <p:cNvSpPr>
-            <a:spLocks noGrp="1" noRot="1" noChangeAspect="1" noMove="1" noResize="1" noEditPoints="1" noAdjustHandles="1" noChangeArrowheads="1" noChangeShapeType="1" noTextEdit="1"/>
-          </p:cNvSpPr>
-          <p:nvPr>
-            <p:extLst>
-              <p:ext uri="{386F3935-93C4-4BCD-93E2-E3B085C9AB24}">
-                <p16:designElem xmlns:p16="http://schemas.microsoft.com/office/powerpoint/2015/main" val="1"/>
-              </p:ext>
-            </p:extLst>
-          </p:nvPr>
-        </p:nvSpPr>
-        <p:spPr bwMode="auto">
-          <a:xfrm>
-            <a:off x="-1061" y="-59376"/>
-            <a:ext cx="11091863" cy="6923796"/>
-          </a:xfrm>
-          <a:custGeom>
-            <a:avLst/>
-            <a:gdLst>
-              <a:gd name="T0" fmla="*/ 2046 w 2330"/>
-              <a:gd name="T1" fmla="*/ 1452 h 1452"/>
-              <a:gd name="T2" fmla="*/ 1813 w 2330"/>
-              <a:gd name="T3" fmla="*/ 601 h 1452"/>
-              <a:gd name="T4" fmla="*/ 956 w 2330"/>
-              <a:gd name="T5" fmla="*/ 97 h 1452"/>
-              <a:gd name="T6" fmla="*/ 0 w 2330"/>
-              <a:gd name="T7" fmla="*/ 366 h 1452"/>
-            </a:gdLst>
-            <a:ahLst/>
-            <a:cxnLst>
-              <a:cxn ang="0">
-                <a:pos x="T0" y="T1"/>
-              </a:cxn>
-              <a:cxn ang="0">
-                <a:pos x="T2" y="T3"/>
-              </a:cxn>
-              <a:cxn ang="0">
-                <a:pos x="T4" y="T5"/>
-              </a:cxn>
-              <a:cxn ang="0">
-                <a:pos x="T6" y="T7"/>
-              </a:cxn>
-            </a:cxnLst>
-            <a:rect l="0" t="0" r="r" b="b"/>
-            <a:pathLst>
-              <a:path w="2330" h="1452">
-                <a:moveTo>
-                  <a:pt x="2046" y="1452"/>
-                </a:moveTo>
-                <a:cubicBezTo>
-                  <a:pt x="2330" y="1153"/>
-                  <a:pt x="2049" y="821"/>
-                  <a:pt x="1813" y="601"/>
-                </a:cubicBezTo>
-                <a:cubicBezTo>
-                  <a:pt x="1569" y="375"/>
-                  <a:pt x="1282" y="179"/>
-                  <a:pt x="956" y="97"/>
-                </a:cubicBezTo>
-                <a:cubicBezTo>
-                  <a:pt x="572" y="0"/>
-                  <a:pt x="292" y="101"/>
-                  <a:pt x="0" y="366"/>
-                </a:cubicBezTo>
-              </a:path>
-            </a:pathLst>
-          </a:custGeom>
-          <a:noFill/>
-          <a:ln w="9525" cap="flat">
-            <a:solidFill>
-              <a:schemeClr val="tx1">
-                <a:alpha val="20000"/>
-              </a:schemeClr>
-            </a:solidFill>
-            <a:prstDash val="solid"/>
-            <a:miter lim="800000"/>
-            <a:headEnd/>
-            <a:tailEnd/>
-          </a:ln>
-          <a:extLst>
-            <a:ext uri="{909E8E84-426E-40DD-AFC4-6F175D3DCCD1}">
-              <a14:hiddenFill xmlns:a14="http://schemas.microsoft.com/office/drawing/2010/main">
-                <a:solidFill>
-                  <a:srgbClr val="FFFFFF"/>
-                </a:solidFill>
-              </a14:hiddenFill>
-            </a:ext>
-          </a:extLst>
-        </p:spPr>
-        <p:txBody>
-          <a:bodyPr vert="horz" wrap="square" lIns="91440" tIns="45720" rIns="91440" bIns="45720" numCol="1" anchor="t" anchorCtr="0" compatLnSpc="1">
-            <a:prstTxWarp prst="textNoShape">
-              <a:avLst/>
-            </a:prstTxWarp>
-          </a:bodyPr>
-          <a:lstStyle/>
-          <a:p>
-            <a:endParaRPr lang="en-US"/>
-          </a:p>
-        </p:txBody>
-      </p:sp>
-      <p:sp>
-        <p:nvSpPr>
-          <p:cNvPr id="27" name="Freeform 12">
-            <a:extLst>
-              <a:ext uri="{FF2B5EF4-FFF2-40B4-BE49-F238E27FC236}">
-                <a16:creationId xmlns:a16="http://schemas.microsoft.com/office/drawing/2014/main" id="{E898931C-0323-41FA-A036-20F818B1FF81}"/>
-              </a:ext>
-              <a:ext uri="{C183D7F6-B498-43B3-948B-1728B52AA6E4}">
-                <adec:decorative xmlns:adec="http://schemas.microsoft.com/office/drawing/2017/decorative" val="1"/>
-              </a:ext>
-            </a:extLst>
-          </p:cNvPr>
-          <p:cNvSpPr>
-            <a:spLocks noGrp="1" noRot="1" noChangeAspect="1" noMove="1" noResize="1" noEditPoints="1" noAdjustHandles="1" noChangeArrowheads="1" noChangeShapeType="1" noTextEdit="1"/>
-          </p:cNvSpPr>
-          <p:nvPr>
-            <p:extLst>
-              <p:ext uri="{386F3935-93C4-4BCD-93E2-E3B085C9AB24}">
-                <p16:designElem xmlns:p16="http://schemas.microsoft.com/office/powerpoint/2015/main" val="1"/>
-              </p:ext>
-            </p:extLst>
-          </p:nvPr>
-        </p:nvSpPr>
-        <p:spPr bwMode="auto">
-          <a:xfrm>
-            <a:off x="-1061" y="-1916"/>
-            <a:ext cx="1057275" cy="614491"/>
-          </a:xfrm>
-          <a:custGeom>
-            <a:avLst/>
-            <a:gdLst>
-              <a:gd name="T0" fmla="*/ 222 w 222"/>
-              <a:gd name="T1" fmla="*/ 0 h 129"/>
-              <a:gd name="T2" fmla="*/ 0 w 222"/>
-              <a:gd name="T3" fmla="*/ 129 h 129"/>
-            </a:gdLst>
-            <a:ahLst/>
-            <a:cxnLst>
-              <a:cxn ang="0">
-                <a:pos x="T0" y="T1"/>
-              </a:cxn>
-              <a:cxn ang="0">
-                <a:pos x="T2" y="T3"/>
-              </a:cxn>
-            </a:cxnLst>
-            <a:rect l="0" t="0" r="r" b="b"/>
-            <a:pathLst>
-              <a:path w="222" h="129">
-                <a:moveTo>
-                  <a:pt x="222" y="0"/>
-                </a:moveTo>
-                <a:cubicBezTo>
-                  <a:pt x="152" y="35"/>
-                  <a:pt x="76" y="78"/>
-                  <a:pt x="0" y="129"/>
-                </a:cubicBezTo>
-              </a:path>
-            </a:pathLst>
-          </a:custGeom>
-          <a:noFill/>
-          <a:ln w="9525" cap="flat">
-            <a:solidFill>
-              <a:schemeClr val="tx1">
-                <a:alpha val="20000"/>
-              </a:schemeClr>
-            </a:solidFill>
-            <a:prstDash val="solid"/>
-            <a:miter lim="800000"/>
-            <a:headEnd/>
-            <a:tailEnd/>
-          </a:ln>
-          <a:extLst>
-            <a:ext uri="{909E8E84-426E-40DD-AFC4-6F175D3DCCD1}">
-              <a14:hiddenFill xmlns:a14="http://schemas.microsoft.com/office/drawing/2010/main">
-                <a:solidFill>
-                  <a:srgbClr val="FFFFFF"/>
-                </a:solidFill>
-              </a14:hiddenFill>
-            </a:ext>
-          </a:extLst>
-        </p:spPr>
-        <p:txBody>
-          <a:bodyPr vert="horz" wrap="square" lIns="91440" tIns="45720" rIns="91440" bIns="45720" numCol="1" anchor="t" anchorCtr="0" compatLnSpc="1">
-            <a:prstTxWarp prst="textNoShape">
-              <a:avLst/>
-            </a:prstTxWarp>
-          </a:bodyPr>
-          <a:lstStyle/>
-          <a:p>
-            <a:endParaRPr lang="en-US"/>
-          </a:p>
-        </p:txBody>
-      </p:sp>
-      <p:sp>
-        <p:nvSpPr>
-          <p:cNvPr id="29" name="Freeform 14">
-            <a:extLst>
-              <a:ext uri="{FF2B5EF4-FFF2-40B4-BE49-F238E27FC236}">
-                <a16:creationId xmlns:a16="http://schemas.microsoft.com/office/drawing/2014/main" id="{89AFE9DD-0792-4B98-B4EB-97ACA17E6AA8}"/>
-              </a:ext>
-              <a:ext uri="{C183D7F6-B498-43B3-948B-1728B52AA6E4}">
-                <adec:decorative xmlns:adec="http://schemas.microsoft.com/office/drawing/2017/decorative" val="1"/>
-              </a:ext>
-            </a:extLst>
-          </p:cNvPr>
-          <p:cNvSpPr>
-            <a:spLocks noGrp="1" noRot="1" noChangeAspect="1" noMove="1" noResize="1" noEditPoints="1" noAdjustHandles="1" noChangeArrowheads="1" noChangeShapeType="1" noTextEdit="1"/>
-          </p:cNvSpPr>
-          <p:nvPr>
-            <p:extLst>
-              <p:ext uri="{386F3935-93C4-4BCD-93E2-E3B085C9AB24}">
-                <p16:designElem xmlns:p16="http://schemas.microsoft.com/office/powerpoint/2015/main" val="1"/>
-              </p:ext>
-            </p:extLst>
-          </p:nvPr>
-        </p:nvSpPr>
-        <p:spPr bwMode="auto">
-          <a:xfrm>
-            <a:off x="3701" y="-6705"/>
-            <a:ext cx="595313" cy="352734"/>
-          </a:xfrm>
-          <a:custGeom>
-            <a:avLst/>
-            <a:gdLst>
-              <a:gd name="T0" fmla="*/ 125 w 125"/>
-              <a:gd name="T1" fmla="*/ 0 h 74"/>
-              <a:gd name="T2" fmla="*/ 0 w 125"/>
-              <a:gd name="T3" fmla="*/ 74 h 74"/>
-            </a:gdLst>
-            <a:ahLst/>
-            <a:cxnLst>
-              <a:cxn ang="0">
-                <a:pos x="T0" y="T1"/>
-              </a:cxn>
-              <a:cxn ang="0">
-                <a:pos x="T2" y="T3"/>
-              </a:cxn>
-            </a:cxnLst>
-            <a:rect l="0" t="0" r="r" b="b"/>
-            <a:pathLst>
-              <a:path w="125" h="74">
-                <a:moveTo>
-                  <a:pt x="125" y="0"/>
-                </a:moveTo>
-                <a:cubicBezTo>
-                  <a:pt x="85" y="22"/>
-                  <a:pt x="43" y="47"/>
-                  <a:pt x="0" y="74"/>
-                </a:cubicBezTo>
-              </a:path>
-            </a:pathLst>
-          </a:custGeom>
-          <a:noFill/>
-          <a:ln w="9525" cap="flat">
-            <a:solidFill>
-              <a:schemeClr val="tx1">
-                <a:alpha val="20000"/>
-              </a:schemeClr>
-            </a:solidFill>
-            <a:prstDash val="dash"/>
-            <a:miter lim="800000"/>
-            <a:headEnd/>
-            <a:tailEnd/>
-          </a:ln>
-          <a:extLst>
-            <a:ext uri="{909E8E84-426E-40DD-AFC4-6F175D3DCCD1}">
-              <a14:hiddenFill xmlns:a14="http://schemas.microsoft.com/office/drawing/2010/main">
-                <a:solidFill>
-                  <a:srgbClr val="FFFFFF"/>
-                </a:solidFill>
-              </a14:hiddenFill>
-            </a:ext>
-          </a:extLst>
-        </p:spPr>
-        <p:txBody>
-          <a:bodyPr vert="horz" wrap="square" lIns="91440" tIns="45720" rIns="91440" bIns="45720" numCol="1" anchor="t" anchorCtr="0" compatLnSpc="1">
-            <a:prstTxWarp prst="textNoShape">
-              <a:avLst/>
-            </a:prstTxWarp>
-          </a:bodyPr>
-          <a:lstStyle/>
-          <a:p>
-            <a:endParaRPr lang="en-US"/>
-          </a:p>
-        </p:txBody>
-      </p:sp>
-      <p:sp>
-        <p:nvSpPr>
-          <p:cNvPr id="31" name="Freeform 16">
-            <a:extLst>
-              <a:ext uri="{FF2B5EF4-FFF2-40B4-BE49-F238E27FC236}">
-                <a16:creationId xmlns:a16="http://schemas.microsoft.com/office/drawing/2014/main" id="{3981F5C4-9AE1-404E-AF44-A4E6DB374F9D}"/>
-              </a:ext>
-              <a:ext uri="{C183D7F6-B498-43B3-948B-1728B52AA6E4}">
-                <adec:decorative xmlns:adec="http://schemas.microsoft.com/office/drawing/2017/decorative" val="1"/>
-              </a:ext>
-            </a:extLst>
-          </p:cNvPr>
-          <p:cNvSpPr>
-            <a:spLocks noGrp="1" noRot="1" noChangeAspect="1" noMove="1" noResize="1" noEditPoints="1" noAdjustHandles="1" noChangeArrowheads="1" noChangeShapeType="1" noTextEdit="1"/>
-          </p:cNvSpPr>
-          <p:nvPr>
-            <p:extLst>
-              <p:ext uri="{386F3935-93C4-4BCD-93E2-E3B085C9AB24}">
-                <p16:designElem xmlns:p16="http://schemas.microsoft.com/office/powerpoint/2015/main" val="1"/>
-              </p:ext>
-            </p:extLst>
-          </p:nvPr>
-        </p:nvSpPr>
-        <p:spPr bwMode="auto">
-          <a:xfrm>
-            <a:off x="-1061" y="-1916"/>
-            <a:ext cx="357188" cy="213875"/>
-          </a:xfrm>
-          <a:custGeom>
-            <a:avLst/>
-            <a:gdLst>
-              <a:gd name="T0" fmla="*/ 75 w 75"/>
-              <a:gd name="T1" fmla="*/ 0 h 45"/>
-              <a:gd name="T2" fmla="*/ 0 w 75"/>
-              <a:gd name="T3" fmla="*/ 45 h 45"/>
-            </a:gdLst>
-            <a:ahLst/>
-            <a:cxnLst>
-              <a:cxn ang="0">
-                <a:pos x="T0" y="T1"/>
-              </a:cxn>
-              <a:cxn ang="0">
-                <a:pos x="T2" y="T3"/>
-              </a:cxn>
-            </a:cxnLst>
-            <a:rect l="0" t="0" r="r" b="b"/>
-            <a:pathLst>
-              <a:path w="75" h="45">
-                <a:moveTo>
-                  <a:pt x="75" y="0"/>
-                </a:moveTo>
-                <a:cubicBezTo>
-                  <a:pt x="50" y="14"/>
-                  <a:pt x="25" y="29"/>
-                  <a:pt x="0" y="45"/>
-                </a:cubicBezTo>
-              </a:path>
-            </a:pathLst>
-          </a:custGeom>
-          <a:noFill/>
-          <a:ln w="12700" cap="flat">
-            <a:solidFill>
-              <a:schemeClr val="tx1">
-                <a:alpha val="20000"/>
-              </a:schemeClr>
-            </a:solidFill>
-            <a:prstDash val="dashDot"/>
-            <a:miter lim="800000"/>
-            <a:headEnd/>
-            <a:tailEnd/>
-          </a:ln>
-          <a:extLst>
-            <a:ext uri="{909E8E84-426E-40DD-AFC4-6F175D3DCCD1}">
-              <a14:hiddenFill xmlns:a14="http://schemas.microsoft.com/office/drawing/2010/main">
-                <a:solidFill>
-                  <a:srgbClr val="FFFFFF"/>
-                </a:solidFill>
-              </a14:hiddenFill>
-            </a:ext>
-          </a:extLst>
-        </p:spPr>
-        <p:txBody>
-          <a:bodyPr vert="horz" wrap="square" lIns="91440" tIns="45720" rIns="91440" bIns="45720" numCol="1" anchor="t" anchorCtr="0" compatLnSpc="1">
-            <a:prstTxWarp prst="textNoShape">
-              <a:avLst/>
-            </a:prstTxWarp>
-          </a:bodyPr>
-          <a:lstStyle/>
-          <a:p>
-            <a:endParaRPr lang="en-US"/>
-          </a:p>
-        </p:txBody>
-      </p:sp>
-      <p:sp>
-        <p:nvSpPr>
-          <p:cNvPr id="33" name="Freeform 11">
-            <a:extLst>
-              <a:ext uri="{FF2B5EF4-FFF2-40B4-BE49-F238E27FC236}">
-                <a16:creationId xmlns:a16="http://schemas.microsoft.com/office/drawing/2014/main" id="{763C1781-8726-4FAC-8C45-FF40376BE409}"/>
-              </a:ext>
-              <a:ext uri="{C183D7F6-B498-43B3-948B-1728B52AA6E4}">
-                <adec:decorative xmlns:adec="http://schemas.microsoft.com/office/drawing/2017/decorative" val="1"/>
-              </a:ext>
-            </a:extLst>
-          </p:cNvPr>
-          <p:cNvSpPr>
-            <a:spLocks noGrp="1" noRot="1" noChangeAspect="1" noMove="1" noResize="1" noEditPoints="1" noAdjustHandles="1" noChangeArrowheads="1" noChangeShapeType="1" noTextEdit="1"/>
-          </p:cNvSpPr>
-          <p:nvPr>
-            <p:extLst>
-              <p:ext uri="{386F3935-93C4-4BCD-93E2-E3B085C9AB24}">
-                <p16:designElem xmlns:p16="http://schemas.microsoft.com/office/powerpoint/2015/main" val="1"/>
-              </p:ext>
-            </p:extLst>
-          </p:nvPr>
-        </p:nvSpPr>
-        <p:spPr bwMode="auto">
-          <a:xfrm>
-            <a:off x="5426601" y="-1916"/>
-            <a:ext cx="5788025" cy="6847184"/>
-          </a:xfrm>
-          <a:custGeom>
-            <a:avLst/>
-            <a:gdLst>
-              <a:gd name="T0" fmla="*/ 1094 w 1216"/>
-              <a:gd name="T1" fmla="*/ 1436 h 1436"/>
-              <a:gd name="T2" fmla="*/ 709 w 1216"/>
-              <a:gd name="T3" fmla="*/ 551 h 1436"/>
-              <a:gd name="T4" fmla="*/ 0 w 1216"/>
-              <a:gd name="T5" fmla="*/ 0 h 1436"/>
-            </a:gdLst>
-            <a:ahLst/>
-            <a:cxnLst>
-              <a:cxn ang="0">
-                <a:pos x="T0" y="T1"/>
-              </a:cxn>
-              <a:cxn ang="0">
-                <a:pos x="T2" y="T3"/>
-              </a:cxn>
-              <a:cxn ang="0">
-                <a:pos x="T4" y="T5"/>
-              </a:cxn>
-            </a:cxnLst>
-            <a:rect l="0" t="0" r="r" b="b"/>
-            <a:pathLst>
-              <a:path w="1216" h="1436">
-                <a:moveTo>
-                  <a:pt x="1094" y="1436"/>
-                </a:moveTo>
-                <a:cubicBezTo>
-                  <a:pt x="1216" y="1114"/>
-                  <a:pt x="904" y="770"/>
-                  <a:pt x="709" y="551"/>
-                </a:cubicBezTo>
-                <a:cubicBezTo>
-                  <a:pt x="509" y="327"/>
-                  <a:pt x="274" y="127"/>
-                  <a:pt x="0" y="0"/>
-                </a:cubicBezTo>
-              </a:path>
-            </a:pathLst>
-          </a:custGeom>
-          <a:noFill/>
-          <a:ln w="9525" cap="flat">
-            <a:solidFill>
-              <a:schemeClr val="tx1">
-                <a:alpha val="20000"/>
-              </a:schemeClr>
-            </a:solidFill>
-            <a:prstDash val="solid"/>
-            <a:miter lim="800000"/>
-            <a:headEnd/>
-            <a:tailEnd/>
-          </a:ln>
-          <a:extLst>
-            <a:ext uri="{909E8E84-426E-40DD-AFC4-6F175D3DCCD1}">
-              <a14:hiddenFill xmlns:a14="http://schemas.microsoft.com/office/drawing/2010/main">
-                <a:solidFill>
-                  <a:srgbClr val="FFFFFF"/>
-                </a:solidFill>
-              </a14:hiddenFill>
-            </a:ext>
-          </a:extLst>
-        </p:spPr>
-        <p:txBody>
-          <a:bodyPr vert="horz" wrap="square" lIns="91440" tIns="45720" rIns="91440" bIns="45720" numCol="1" anchor="t" anchorCtr="0" compatLnSpc="1">
-            <a:prstTxWarp prst="textNoShape">
-              <a:avLst/>
-            </a:prstTxWarp>
-          </a:bodyPr>
-          <a:lstStyle/>
-          <a:p>
-            <a:endParaRPr lang="en-US"/>
-          </a:p>
-        </p:txBody>
-      </p:sp>
-      <p:sp>
-        <p:nvSpPr>
-          <p:cNvPr id="35" name="Freeform 21">
-            <a:extLst>
-              <a:ext uri="{FF2B5EF4-FFF2-40B4-BE49-F238E27FC236}">
-                <a16:creationId xmlns:a16="http://schemas.microsoft.com/office/drawing/2014/main" id="{301491B5-56C7-43DC-A3D9-861EECCA056A}"/>
-              </a:ext>
-              <a:ext uri="{C183D7F6-B498-43B3-948B-1728B52AA6E4}">
-                <adec:decorative xmlns:adec="http://schemas.microsoft.com/office/drawing/2017/decorative" val="1"/>
-              </a:ext>
-            </a:extLst>
-          </p:cNvPr>
-          <p:cNvSpPr>
-            <a:spLocks noGrp="1" noRot="1" noChangeAspect="1" noMove="1" noResize="1" noEditPoints="1" noAdjustHandles="1" noChangeArrowheads="1" noChangeShapeType="1" noTextEdit="1"/>
-          </p:cNvSpPr>
-          <p:nvPr>
-            <p:extLst>
-              <p:ext uri="{386F3935-93C4-4BCD-93E2-E3B085C9AB24}">
-                <p16:designElem xmlns:p16="http://schemas.microsoft.com/office/powerpoint/2015/main" val="1"/>
-              </p:ext>
-            </p:extLst>
-          </p:nvPr>
-        </p:nvSpPr>
-        <p:spPr bwMode="auto">
-          <a:xfrm>
-            <a:off x="9235014" y="2872"/>
-            <a:ext cx="2951163" cy="2555325"/>
-          </a:xfrm>
-          <a:custGeom>
-            <a:avLst/>
-            <a:gdLst>
-              <a:gd name="T0" fmla="*/ 620 w 620"/>
-              <a:gd name="T1" fmla="*/ 536 h 536"/>
-              <a:gd name="T2" fmla="*/ 0 w 620"/>
-              <a:gd name="T3" fmla="*/ 0 h 536"/>
-            </a:gdLst>
-            <a:ahLst/>
-            <a:cxnLst>
-              <a:cxn ang="0">
-                <a:pos x="T0" y="T1"/>
-              </a:cxn>
-              <a:cxn ang="0">
-                <a:pos x="T2" y="T3"/>
-              </a:cxn>
-            </a:cxnLst>
-            <a:rect l="0" t="0" r="r" b="b"/>
-            <a:pathLst>
-              <a:path w="620" h="536">
-                <a:moveTo>
-                  <a:pt x="620" y="536"/>
-                </a:moveTo>
-                <a:cubicBezTo>
-                  <a:pt x="404" y="314"/>
-                  <a:pt x="196" y="138"/>
-                  <a:pt x="0" y="0"/>
-                </a:cubicBezTo>
-              </a:path>
-            </a:pathLst>
-          </a:custGeom>
-          <a:noFill/>
-          <a:ln w="9525" cap="flat">
-            <a:solidFill>
-              <a:schemeClr val="tx1">
-                <a:alpha val="20000"/>
-              </a:schemeClr>
-            </a:solidFill>
-            <a:prstDash val="solid"/>
-            <a:miter lim="800000"/>
-            <a:headEnd/>
-            <a:tailEnd/>
-          </a:ln>
-          <a:extLst>
-            <a:ext uri="{909E8E84-426E-40DD-AFC4-6F175D3DCCD1}">
-              <a14:hiddenFill xmlns:a14="http://schemas.microsoft.com/office/drawing/2010/main">
-                <a:solidFill>
-                  <a:srgbClr val="FFFFFF"/>
-                </a:solidFill>
-              </a14:hiddenFill>
-            </a:ext>
-          </a:extLst>
-        </p:spPr>
-        <p:txBody>
-          <a:bodyPr vert="horz" wrap="square" lIns="91440" tIns="45720" rIns="91440" bIns="45720" numCol="1" anchor="t" anchorCtr="0" compatLnSpc="1">
-            <a:prstTxWarp prst="textNoShape">
-              <a:avLst/>
-            </a:prstTxWarp>
-          </a:bodyPr>
-          <a:lstStyle/>
-          <a:p>
-            <a:endParaRPr lang="en-US"/>
-          </a:p>
-        </p:txBody>
-      </p:sp>
-      <p:sp>
-        <p:nvSpPr>
-          <p:cNvPr id="2" name="Title 1">
-            <a:extLst>
-              <a:ext uri="{FF2B5EF4-FFF2-40B4-BE49-F238E27FC236}">
-                <a16:creationId xmlns:a16="http://schemas.microsoft.com/office/drawing/2014/main" id="{D1CAD71B-8A0D-4167-B114-8C9D3F9ED1D2}"/>
-              </a:ext>
-            </a:extLst>
-          </p:cNvPr>
-          <p:cNvSpPr>
-            <a:spLocks noGrp="1"/>
-          </p:cNvSpPr>
-          <p:nvPr>
-            <p:ph type="title"/>
-          </p:nvPr>
-        </p:nvSpPr>
-        <p:spPr>
-          <a:xfrm>
-            <a:off x="251351" y="214385"/>
-            <a:ext cx="11591607" cy="748561"/>
-          </a:xfrm>
-        </p:spPr>
-        <p:txBody>
-          <a:bodyPr vert="horz" lIns="91440" tIns="45720" rIns="91440" bIns="45720" rtlCol="0" anchor="b">
-            <a:normAutofit/>
-          </a:bodyPr>
-          <a:lstStyle/>
-          <a:p>
-            <a:r>
-              <a:rPr lang="en-US" sz="4000" dirty="0"/>
-              <a:t>Obj 3:  How has ordering changed during Covid?</a:t>
-            </a:r>
-          </a:p>
-        </p:txBody>
-      </p:sp>
-      <p:sp>
-        <p:nvSpPr>
-          <p:cNvPr id="37" name="Freeform 22">
-            <a:extLst>
-              <a:ext uri="{FF2B5EF4-FFF2-40B4-BE49-F238E27FC236}">
-                <a16:creationId xmlns:a16="http://schemas.microsoft.com/office/drawing/2014/main" id="{237E2353-22DF-46E0-A200-FB30F8F394E2}"/>
-              </a:ext>
-              <a:ext uri="{C183D7F6-B498-43B3-948B-1728B52AA6E4}">
-                <adec:decorative xmlns:adec="http://schemas.microsoft.com/office/drawing/2017/decorative" val="1"/>
-              </a:ext>
-            </a:extLst>
-          </p:cNvPr>
-          <p:cNvSpPr>
-            <a:spLocks noGrp="1" noRot="1" noChangeAspect="1" noMove="1" noResize="1" noEditPoints="1" noAdjustHandles="1" noChangeArrowheads="1" noChangeShapeType="1" noTextEdit="1"/>
-          </p:cNvSpPr>
-          <p:nvPr>
-            <p:extLst>
-              <p:ext uri="{386F3935-93C4-4BCD-93E2-E3B085C9AB24}">
-                <p16:designElem xmlns:p16="http://schemas.microsoft.com/office/powerpoint/2015/main" val="1"/>
-              </p:ext>
-            </p:extLst>
-          </p:nvPr>
-        </p:nvSpPr>
-        <p:spPr bwMode="auto">
-          <a:xfrm>
-            <a:off x="10020826" y="-1916"/>
-            <a:ext cx="2165350" cy="1358265"/>
-          </a:xfrm>
-          <a:custGeom>
-            <a:avLst/>
-            <a:gdLst>
-              <a:gd name="T0" fmla="*/ 0 w 455"/>
-              <a:gd name="T1" fmla="*/ 0 h 285"/>
-              <a:gd name="T2" fmla="*/ 455 w 455"/>
-              <a:gd name="T3" fmla="*/ 285 h 285"/>
-            </a:gdLst>
-            <a:ahLst/>
-            <a:cxnLst>
-              <a:cxn ang="0">
-                <a:pos x="T0" y="T1"/>
-              </a:cxn>
-              <a:cxn ang="0">
-                <a:pos x="T2" y="T3"/>
-              </a:cxn>
-            </a:cxnLst>
-            <a:rect l="0" t="0" r="r" b="b"/>
-            <a:pathLst>
-              <a:path w="455" h="285">
-                <a:moveTo>
-                  <a:pt x="0" y="0"/>
-                </a:moveTo>
-                <a:cubicBezTo>
-                  <a:pt x="153" y="85"/>
-                  <a:pt x="308" y="180"/>
-                  <a:pt x="455" y="285"/>
-                </a:cubicBezTo>
-              </a:path>
-            </a:pathLst>
-          </a:custGeom>
-          <a:noFill/>
-          <a:ln w="9525" cap="flat">
-            <a:solidFill>
-              <a:schemeClr val="tx1">
-                <a:alpha val="20000"/>
-              </a:schemeClr>
-            </a:solidFill>
-            <a:prstDash val="dash"/>
-            <a:miter lim="800000"/>
-            <a:headEnd/>
-            <a:tailEnd/>
-          </a:ln>
-          <a:extLst>
-            <a:ext uri="{909E8E84-426E-40DD-AFC4-6F175D3DCCD1}">
-              <a14:hiddenFill xmlns:a14="http://schemas.microsoft.com/office/drawing/2010/main">
-                <a:solidFill>
-                  <a:srgbClr val="FFFFFF"/>
-                </a:solidFill>
-              </a14:hiddenFill>
-            </a:ext>
-          </a:extLst>
-        </p:spPr>
-        <p:txBody>
-          <a:bodyPr vert="horz" wrap="square" lIns="91440" tIns="45720" rIns="91440" bIns="45720" numCol="1" anchor="t" anchorCtr="0" compatLnSpc="1">
-            <a:prstTxWarp prst="textNoShape">
-              <a:avLst/>
-            </a:prstTxWarp>
-          </a:bodyPr>
-          <a:lstStyle/>
-          <a:p>
-            <a:endParaRPr lang="en-US"/>
-          </a:p>
-        </p:txBody>
-      </p:sp>
-      <p:sp>
-        <p:nvSpPr>
-          <p:cNvPr id="39" name="Freeform 23">
-            <a:extLst>
-              <a:ext uri="{FF2B5EF4-FFF2-40B4-BE49-F238E27FC236}">
-                <a16:creationId xmlns:a16="http://schemas.microsoft.com/office/drawing/2014/main" id="{DD6138DB-057B-45F7-A5F4-E7BFDA20D02C}"/>
-              </a:ext>
-              <a:ext uri="{C183D7F6-B498-43B3-948B-1728B52AA6E4}">
-                <adec:decorative xmlns:adec="http://schemas.microsoft.com/office/drawing/2017/decorative" val="1"/>
-              </a:ext>
-            </a:extLst>
-          </p:cNvPr>
-          <p:cNvSpPr>
-            <a:spLocks noGrp="1" noRot="1" noChangeAspect="1" noMove="1" noResize="1" noEditPoints="1" noAdjustHandles="1" noChangeArrowheads="1" noChangeShapeType="1" noTextEdit="1"/>
-          </p:cNvSpPr>
-          <p:nvPr>
-            <p:extLst>
-              <p:ext uri="{386F3935-93C4-4BCD-93E2-E3B085C9AB24}">
-                <p16:designElem xmlns:p16="http://schemas.microsoft.com/office/powerpoint/2015/main" val="1"/>
-              </p:ext>
-            </p:extLst>
-          </p:nvPr>
-        </p:nvSpPr>
-        <p:spPr bwMode="auto">
-          <a:xfrm>
-            <a:off x="11290826" y="-1916"/>
-            <a:ext cx="895350" cy="534687"/>
-          </a:xfrm>
-          <a:custGeom>
-            <a:avLst/>
-            <a:gdLst>
-              <a:gd name="T0" fmla="*/ 0 w 188"/>
-              <a:gd name="T1" fmla="*/ 0 h 112"/>
-              <a:gd name="T2" fmla="*/ 188 w 188"/>
-              <a:gd name="T3" fmla="*/ 112 h 112"/>
-            </a:gdLst>
-            <a:ahLst/>
-            <a:cxnLst>
-              <a:cxn ang="0">
-                <a:pos x="T0" y="T1"/>
-              </a:cxn>
-              <a:cxn ang="0">
-                <a:pos x="T2" y="T3"/>
-              </a:cxn>
-            </a:cxnLst>
-            <a:rect l="0" t="0" r="r" b="b"/>
-            <a:pathLst>
-              <a:path w="188" h="112">
-                <a:moveTo>
-                  <a:pt x="0" y="0"/>
-                </a:moveTo>
-                <a:cubicBezTo>
-                  <a:pt x="63" y="36"/>
-                  <a:pt x="126" y="73"/>
-                  <a:pt x="188" y="112"/>
-                </a:cubicBezTo>
-              </a:path>
-            </a:pathLst>
-          </a:custGeom>
-          <a:noFill/>
-          <a:ln w="9525" cap="flat">
-            <a:solidFill>
-              <a:schemeClr val="tx1">
-                <a:alpha val="20000"/>
-              </a:schemeClr>
-            </a:solidFill>
-            <a:prstDash val="solid"/>
-            <a:miter lim="800000"/>
-            <a:headEnd/>
-            <a:tailEnd/>
-          </a:ln>
-          <a:extLst>
-            <a:ext uri="{909E8E84-426E-40DD-AFC4-6F175D3DCCD1}">
-              <a14:hiddenFill xmlns:a14="http://schemas.microsoft.com/office/drawing/2010/main">
-                <a:solidFill>
-                  <a:srgbClr val="FFFFFF"/>
-                </a:solidFill>
-              </a14:hiddenFill>
-            </a:ext>
-          </a:extLst>
-        </p:spPr>
-        <p:txBody>
-          <a:bodyPr vert="horz" wrap="square" lIns="91440" tIns="45720" rIns="91440" bIns="45720" numCol="1" anchor="t" anchorCtr="0" compatLnSpc="1">
-            <a:prstTxWarp prst="textNoShape">
-              <a:avLst/>
-            </a:prstTxWarp>
-          </a:bodyPr>
-          <a:lstStyle/>
-          <a:p>
-            <a:endParaRPr lang="en-US"/>
-          </a:p>
-        </p:txBody>
-      </p:sp>
-      <p:sp>
-        <p:nvSpPr>
-          <p:cNvPr id="41" name="Freeform: Shape 40">
-            <a:extLst>
-              <a:ext uri="{FF2B5EF4-FFF2-40B4-BE49-F238E27FC236}">
-                <a16:creationId xmlns:a16="http://schemas.microsoft.com/office/drawing/2014/main" id="{79A54AB1-B64F-4843-BFAB-81CB74E66B65}"/>
-              </a:ext>
-              <a:ext uri="{C183D7F6-B498-43B3-948B-1728B52AA6E4}">
-                <adec:decorative xmlns:adec="http://schemas.microsoft.com/office/drawing/2017/decorative" val="1"/>
-              </a:ext>
-            </a:extLst>
-          </p:cNvPr>
-          <p:cNvSpPr>
-            <a:spLocks noGrp="1" noRot="1" noChangeAspect="1" noMove="1" noResize="1" noEditPoints="1" noAdjustHandles="1" noChangeArrowheads="1" noChangeShapeType="1" noTextEdit="1"/>
-          </p:cNvSpPr>
-          <p:nvPr>
-            <p:extLst>
-              <p:ext uri="{386F3935-93C4-4BCD-93E2-E3B085C9AB24}">
-                <p16:designElem xmlns:p16="http://schemas.microsoft.com/office/powerpoint/2015/main" val="1"/>
-              </p:ext>
-            </p:extLst>
-          </p:nvPr>
-        </p:nvSpPr>
-        <p:spPr>
-          <a:xfrm rot="20931529">
-            <a:off x="752078" y="2218040"/>
-            <a:ext cx="4418757" cy="4259609"/>
-          </a:xfrm>
-          <a:custGeom>
-            <a:avLst/>
-            <a:gdLst>
-              <a:gd name="connsiteX0" fmla="*/ 404107 w 4507111"/>
-              <a:gd name="connsiteY0" fmla="*/ 0 h 4344781"/>
-              <a:gd name="connsiteX1" fmla="*/ 371857 w 4507111"/>
-              <a:gd name="connsiteY1" fmla="*/ 117359 h 4344781"/>
-              <a:gd name="connsiteX2" fmla="*/ 307833 w 4507111"/>
-              <a:gd name="connsiteY2" fmla="*/ 632970 h 4344781"/>
-              <a:gd name="connsiteX3" fmla="*/ 3569418 w 4507111"/>
-              <a:gd name="connsiteY3" fmla="*/ 4141149 h 4344781"/>
-              <a:gd name="connsiteX4" fmla="*/ 4440861 w 4507111"/>
-              <a:gd name="connsiteY4" fmla="*/ 4332480 h 4344781"/>
-              <a:gd name="connsiteX5" fmla="*/ 4507111 w 4507111"/>
-              <a:gd name="connsiteY5" fmla="*/ 4341752 h 4344781"/>
-              <a:gd name="connsiteX6" fmla="*/ 4296045 w 4507111"/>
-              <a:gd name="connsiteY6" fmla="*/ 4344781 h 4344781"/>
-              <a:gd name="connsiteX7" fmla="*/ 3749565 w 4507111"/>
-              <a:gd name="connsiteY7" fmla="*/ 4321853 h 4344781"/>
-              <a:gd name="connsiteX8" fmla="*/ 36764 w 4507111"/>
-              <a:gd name="connsiteY8" fmla="*/ 1629794 h 4344781"/>
-              <a:gd name="connsiteX9" fmla="*/ 300069 w 4507111"/>
-              <a:gd name="connsiteY9" fmla="*/ 144750 h 4344781"/>
-            </a:gdLst>
-            <a:ahLst/>
-            <a:cxnLst>
-              <a:cxn ang="0">
-                <a:pos x="connsiteX0" y="connsiteY0"/>
-              </a:cxn>
-              <a:cxn ang="0">
-                <a:pos x="connsiteX1" y="connsiteY1"/>
-              </a:cxn>
-              <a:cxn ang="0">
-                <a:pos x="connsiteX2" y="connsiteY2"/>
-              </a:cxn>
-              <a:cxn ang="0">
-                <a:pos x="connsiteX3" y="connsiteY3"/>
-              </a:cxn>
-              <a:cxn ang="0">
-                <a:pos x="connsiteX4" y="connsiteY4"/>
-              </a:cxn>
-              <a:cxn ang="0">
-                <a:pos x="connsiteX5" y="connsiteY5"/>
-              </a:cxn>
-              <a:cxn ang="0">
-                <a:pos x="connsiteX6" y="connsiteY6"/>
-              </a:cxn>
-              <a:cxn ang="0">
-                <a:pos x="connsiteX7" y="connsiteY7"/>
-              </a:cxn>
-              <a:cxn ang="0">
-                <a:pos x="connsiteX8" y="connsiteY8"/>
-              </a:cxn>
-              <a:cxn ang="0">
-                <a:pos x="connsiteX9" y="connsiteY9"/>
-              </a:cxn>
-            </a:cxnLst>
-            <a:rect l="l" t="t" r="r" b="b"/>
-            <a:pathLst>
-              <a:path w="4507111" h="4344781">
-                <a:moveTo>
-                  <a:pt x="404107" y="0"/>
-                </a:moveTo>
-                <a:lnTo>
-                  <a:pt x="371857" y="117359"/>
-                </a:lnTo>
-                <a:cubicBezTo>
-                  <a:pt x="333827" y="278567"/>
-                  <a:pt x="311875" y="450459"/>
-                  <a:pt x="307833" y="632970"/>
-                </a:cubicBezTo>
-                <a:cubicBezTo>
-                  <a:pt x="264711" y="2579752"/>
-                  <a:pt x="2253987" y="3769243"/>
-                  <a:pt x="3569418" y="4141149"/>
-                </a:cubicBezTo>
-                <a:cubicBezTo>
-                  <a:pt x="3816061" y="4210881"/>
-                  <a:pt x="4114807" y="4279754"/>
-                  <a:pt x="4440861" y="4332480"/>
-                </a:cubicBezTo>
-                <a:lnTo>
-                  <a:pt x="4507111" y="4341752"/>
-                </a:lnTo>
-                <a:lnTo>
-                  <a:pt x="4296045" y="4344781"/>
-                </a:lnTo>
-                <a:cubicBezTo>
-                  <a:pt x="4097363" y="4343711"/>
-                  <a:pt x="3912623" y="4335104"/>
-                  <a:pt x="3749565" y="4321853"/>
-                </a:cubicBezTo>
-                <a:cubicBezTo>
-                  <a:pt x="2445102" y="4215850"/>
-                  <a:pt x="356405" y="3466499"/>
-                  <a:pt x="36764" y="1629794"/>
-                </a:cubicBezTo>
-                <a:cubicBezTo>
-                  <a:pt x="-63123" y="1055823"/>
-                  <a:pt x="45741" y="555869"/>
-                  <a:pt x="300069" y="144750"/>
-                </a:cubicBezTo>
-                <a:close/>
-              </a:path>
-            </a:pathLst>
-          </a:custGeom>
-          <a:solidFill>
-            <a:schemeClr val="tx1">
-              <a:alpha val="70000"/>
-            </a:schemeClr>
-          </a:solidFill>
-          <a:ln>
-            <a:noFill/>
-          </a:ln>
-        </p:spPr>
-        <p:style>
-          <a:lnRef idx="2">
-            <a:schemeClr val="accent1">
-              <a:shade val="50000"/>
-            </a:schemeClr>
-          </a:lnRef>
-          <a:fillRef idx="1">
-            <a:schemeClr val="accent1"/>
-          </a:fillRef>
-          <a:effectRef idx="0">
-            <a:schemeClr val="accent1"/>
-          </a:effectRef>
-          <a:fontRef idx="minor">
-            <a:schemeClr val="lt1"/>
-          </a:fontRef>
-        </p:style>
-        <p:txBody>
-          <a:bodyPr wrap="square" rtlCol="0" anchor="ctr">
-            <a:noAutofit/>
-          </a:bodyPr>
-          <a:lstStyle/>
-          <a:p>
-            <a:pPr marL="0" marR="0" lvl="0" indent="0" algn="ctr" defTabSz="457200" rtl="0" eaLnBrk="1" fontAlgn="auto" latinLnBrk="0" hangingPunct="1">
-              <a:lnSpc>
-                <a:spcPct val="100000"/>
-              </a:lnSpc>
-              <a:spcBef>
-                <a:spcPts val="0"/>
-              </a:spcBef>
-              <a:spcAft>
-                <a:spcPts val="0"/>
-              </a:spcAft>
-              <a:buClrTx/>
-              <a:buSzTx/>
-              <a:buFontTx/>
-              <a:buNone/>
-              <a:tabLst/>
-              <a:defRPr/>
-            </a:pPr>
-            <a:endParaRPr kumimoji="0" lang="en-US" sz="1800" b="0" i="0" u="none" strike="noStrike" kern="1200" cap="none" spc="0" normalizeH="0" baseline="0" noProof="0">
-              <a:ln>
-                <a:noFill/>
-              </a:ln>
-              <a:solidFill>
-                <a:prstClr val="white"/>
-              </a:solidFill>
-              <a:effectLst/>
-              <a:uLnTx/>
-              <a:uFillTx/>
-              <a:latin typeface="Rockwell" panose="02060603020205020403"/>
-              <a:ea typeface="+mn-ea"/>
-              <a:cs typeface="+mn-cs"/>
-            </a:endParaRPr>
-          </a:p>
-        </p:txBody>
-      </p:sp>
-      <p:pic>
-        <p:nvPicPr>
-          <p:cNvPr id="7" name="Content Placeholder 6" descr="A hamburger on a plate&#10;&#10;Description automatically generated with low confidence">
-            <a:extLst>
-              <a:ext uri="{FF2B5EF4-FFF2-40B4-BE49-F238E27FC236}">
-                <a16:creationId xmlns:a16="http://schemas.microsoft.com/office/drawing/2014/main" id="{3AACC0DC-68F9-4C1D-8808-B5923ED94969}"/>
-              </a:ext>
-            </a:extLst>
-          </p:cNvPr>
-          <p:cNvPicPr>
-            <a:picLocks noGrp="1" noChangeAspect="1"/>
-          </p:cNvPicPr>
-          <p:nvPr>
-            <p:ph idx="1"/>
-          </p:nvPr>
-        </p:nvPicPr>
-        <p:blipFill>
-          <a:blip r:embed="rId2">
-            <a:extLst>
-              <a:ext uri="{28A0092B-C50C-407E-A947-70E740481C1C}">
-                <a14:useLocalDpi xmlns:a14="http://schemas.microsoft.com/office/drawing/2010/main" val="0"/>
-              </a:ext>
-            </a:extLst>
-          </a:blip>
-          <a:stretch>
-            <a:fillRect/>
-          </a:stretch>
-        </p:blipFill>
-        <p:spPr>
-          <a:xfrm>
-            <a:off x="1617394" y="1827413"/>
-            <a:ext cx="4351338" cy="4351338"/>
-          </a:xfrm>
-        </p:spPr>
-      </p:pic>
-    </p:spTree>
-    <p:extLst>
-      <p:ext uri="{BB962C8B-B14F-4D97-AF65-F5344CB8AC3E}">
-        <p14:creationId xmlns:p14="http://schemas.microsoft.com/office/powerpoint/2010/main" val="3304196944"/>
       </p:ext>
     </p:extLst>
   </p:cSld>

</xml_diff>